<commit_message>
BC first, then BV and BA
</commit_message>
<xml_diff>
--- a/plots/ModelOverview.pptx
+++ b/plots/ModelOverview.pptx
@@ -2,12 +2,12 @@
 <file path=ppt/presentation.xml><?xml version="1.0" encoding="utf-8"?>
 <p:presentation xmlns:a="http://schemas.openxmlformats.org/drawingml/2006/main" xmlns:r="http://schemas.openxmlformats.org/officeDocument/2006/relationships" xmlns:p="http://schemas.openxmlformats.org/presentationml/2006/main" saveSubsetFonts="1">
   <p:sldMasterIdLst>
-    <p:sldMasterId id="2147483660" r:id="rId1"/>
+    <p:sldMasterId id="2147483672" r:id="rId1"/>
   </p:sldMasterIdLst>
   <p:sldIdLst>
     <p:sldId id="257" r:id="rId2"/>
   </p:sldIdLst>
-  <p:sldSz cx="9144000" cy="6858000" type="screen4x3"/>
+  <p:sldSz cx="9144000" cy="7040563"/>
   <p:notesSz cx="6858000" cy="9144000"/>
   <p:defaultTextStyle>
     <a:defPPr>
@@ -141,8 +141,8 @@
         </p:nvSpPr>
         <p:spPr>
           <a:xfrm>
-            <a:off x="685800" y="1122363"/>
-            <a:ext cx="7772400" cy="2387600"/>
+            <a:off x="685800" y="1152241"/>
+            <a:ext cx="7772400" cy="2451159"/>
           </a:xfrm>
         </p:spPr>
         <p:txBody>
@@ -173,8 +173,8 @@
         </p:nvSpPr>
         <p:spPr>
           <a:xfrm>
-            <a:off x="1143000" y="3602038"/>
-            <a:ext cx="6858000" cy="1655762"/>
+            <a:off x="1143000" y="3697926"/>
+            <a:ext cx="6858000" cy="1699839"/>
           </a:xfrm>
         </p:spPr>
         <p:txBody>
@@ -243,7 +243,7 @@
           <a:p>
             <a:fld id="{EB9CE717-B66F-42F4-9EDB-EAEF10641B24}" type="datetimeFigureOut">
               <a:rPr lang="zh-CN" altLang="en-US" smtClean="0"/>
-              <a:t>2023/5/30</a:t>
+              <a:t>2023/6/13</a:t>
             </a:fld>
             <a:endParaRPr lang="zh-CN" altLang="en-US"/>
           </a:p>
@@ -294,7 +294,7 @@
     </p:spTree>
     <p:extLst>
       <p:ext uri="{BB962C8B-B14F-4D97-AF65-F5344CB8AC3E}">
-        <p14:creationId xmlns:p14="http://schemas.microsoft.com/office/powerpoint/2010/main" val="905216172"/>
+        <p14:creationId xmlns:p14="http://schemas.microsoft.com/office/powerpoint/2010/main" val="3885419601"/>
       </p:ext>
     </p:extLst>
   </p:cSld>
@@ -413,7 +413,7 @@
           <a:p>
             <a:fld id="{EB9CE717-B66F-42F4-9EDB-EAEF10641B24}" type="datetimeFigureOut">
               <a:rPr lang="zh-CN" altLang="en-US" smtClean="0"/>
-              <a:t>2023/5/30</a:t>
+              <a:t>2023/6/13</a:t>
             </a:fld>
             <a:endParaRPr lang="zh-CN" altLang="en-US"/>
           </a:p>
@@ -464,7 +464,7 @@
     </p:spTree>
     <p:extLst>
       <p:ext uri="{BB962C8B-B14F-4D97-AF65-F5344CB8AC3E}">
-        <p14:creationId xmlns:p14="http://schemas.microsoft.com/office/powerpoint/2010/main" val="3848195347"/>
+        <p14:creationId xmlns:p14="http://schemas.microsoft.com/office/powerpoint/2010/main" val="2691049454"/>
       </p:ext>
     </p:extLst>
   </p:cSld>
@@ -503,8 +503,8 @@
         </p:nvSpPr>
         <p:spPr>
           <a:xfrm>
-            <a:off x="6543675" y="365125"/>
-            <a:ext cx="1971675" cy="5811838"/>
+            <a:off x="6543676" y="374845"/>
+            <a:ext cx="1971675" cy="5966552"/>
           </a:xfrm>
         </p:spPr>
         <p:txBody>
@@ -531,8 +531,8 @@
         </p:nvSpPr>
         <p:spPr>
           <a:xfrm>
-            <a:off x="628650" y="365125"/>
-            <a:ext cx="5800725" cy="5811838"/>
+            <a:off x="628651" y="374845"/>
+            <a:ext cx="5800725" cy="5966552"/>
           </a:xfrm>
         </p:spPr>
         <p:txBody>
@@ -593,7 +593,7 @@
           <a:p>
             <a:fld id="{EB9CE717-B66F-42F4-9EDB-EAEF10641B24}" type="datetimeFigureOut">
               <a:rPr lang="zh-CN" altLang="en-US" smtClean="0"/>
-              <a:t>2023/5/30</a:t>
+              <a:t>2023/6/13</a:t>
             </a:fld>
             <a:endParaRPr lang="zh-CN" altLang="en-US"/>
           </a:p>
@@ -644,7 +644,7 @@
     </p:spTree>
     <p:extLst>
       <p:ext uri="{BB962C8B-B14F-4D97-AF65-F5344CB8AC3E}">
-        <p14:creationId xmlns:p14="http://schemas.microsoft.com/office/powerpoint/2010/main" val="3005933992"/>
+        <p14:creationId xmlns:p14="http://schemas.microsoft.com/office/powerpoint/2010/main" val="3572131178"/>
       </p:ext>
     </p:extLst>
   </p:cSld>
@@ -763,7 +763,7 @@
           <a:p>
             <a:fld id="{EB9CE717-B66F-42F4-9EDB-EAEF10641B24}" type="datetimeFigureOut">
               <a:rPr lang="zh-CN" altLang="en-US" smtClean="0"/>
-              <a:t>2023/5/30</a:t>
+              <a:t>2023/6/13</a:t>
             </a:fld>
             <a:endParaRPr lang="zh-CN" altLang="en-US"/>
           </a:p>
@@ -814,7 +814,7 @@
     </p:spTree>
     <p:extLst>
       <p:ext uri="{BB962C8B-B14F-4D97-AF65-F5344CB8AC3E}">
-        <p14:creationId xmlns:p14="http://schemas.microsoft.com/office/powerpoint/2010/main" val="2656806653"/>
+        <p14:creationId xmlns:p14="http://schemas.microsoft.com/office/powerpoint/2010/main" val="586800794"/>
       </p:ext>
     </p:extLst>
   </p:cSld>
@@ -853,8 +853,8 @@
         </p:nvSpPr>
         <p:spPr>
           <a:xfrm>
-            <a:off x="623888" y="1709739"/>
-            <a:ext cx="7886700" cy="2852737"/>
+            <a:off x="623888" y="1755254"/>
+            <a:ext cx="7886700" cy="2928678"/>
           </a:xfrm>
         </p:spPr>
         <p:txBody>
@@ -885,8 +885,8 @@
         </p:nvSpPr>
         <p:spPr>
           <a:xfrm>
-            <a:off x="623888" y="4589464"/>
-            <a:ext cx="7886700" cy="1500187"/>
+            <a:off x="623888" y="4711638"/>
+            <a:ext cx="7886700" cy="1540123"/>
           </a:xfrm>
         </p:spPr>
         <p:txBody>
@@ -1007,7 +1007,7 @@
           <a:p>
             <a:fld id="{EB9CE717-B66F-42F4-9EDB-EAEF10641B24}" type="datetimeFigureOut">
               <a:rPr lang="zh-CN" altLang="en-US" smtClean="0"/>
-              <a:t>2023/5/30</a:t>
+              <a:t>2023/6/13</a:t>
             </a:fld>
             <a:endParaRPr lang="zh-CN" altLang="en-US"/>
           </a:p>
@@ -1058,7 +1058,7 @@
     </p:spTree>
     <p:extLst>
       <p:ext uri="{BB962C8B-B14F-4D97-AF65-F5344CB8AC3E}">
-        <p14:creationId xmlns:p14="http://schemas.microsoft.com/office/powerpoint/2010/main" val="1412556555"/>
+        <p14:creationId xmlns:p14="http://schemas.microsoft.com/office/powerpoint/2010/main" val="2907587479"/>
       </p:ext>
     </p:extLst>
   </p:cSld>
@@ -1120,8 +1120,8 @@
         </p:nvSpPr>
         <p:spPr>
           <a:xfrm>
-            <a:off x="628650" y="1825625"/>
-            <a:ext cx="3886200" cy="4351338"/>
+            <a:off x="628650" y="1874224"/>
+            <a:ext cx="3886200" cy="4467173"/>
           </a:xfrm>
         </p:spPr>
         <p:txBody>
@@ -1177,8 +1177,8 @@
         </p:nvSpPr>
         <p:spPr>
           <a:xfrm>
-            <a:off x="4629150" y="1825625"/>
-            <a:ext cx="3886200" cy="4351338"/>
+            <a:off x="4629150" y="1874224"/>
+            <a:ext cx="3886200" cy="4467173"/>
           </a:xfrm>
         </p:spPr>
         <p:txBody>
@@ -1239,7 +1239,7 @@
           <a:p>
             <a:fld id="{EB9CE717-B66F-42F4-9EDB-EAEF10641B24}" type="datetimeFigureOut">
               <a:rPr lang="zh-CN" altLang="en-US" smtClean="0"/>
-              <a:t>2023/5/30</a:t>
+              <a:t>2023/6/13</a:t>
             </a:fld>
             <a:endParaRPr lang="zh-CN" altLang="en-US"/>
           </a:p>
@@ -1290,7 +1290,7 @@
     </p:spTree>
     <p:extLst>
       <p:ext uri="{BB962C8B-B14F-4D97-AF65-F5344CB8AC3E}">
-        <p14:creationId xmlns:p14="http://schemas.microsoft.com/office/powerpoint/2010/main" val="3795282973"/>
+        <p14:creationId xmlns:p14="http://schemas.microsoft.com/office/powerpoint/2010/main" val="178964797"/>
       </p:ext>
     </p:extLst>
   </p:cSld>
@@ -1329,8 +1329,8 @@
         </p:nvSpPr>
         <p:spPr>
           <a:xfrm>
-            <a:off x="629841" y="365126"/>
-            <a:ext cx="7886700" cy="1325563"/>
+            <a:off x="629841" y="374846"/>
+            <a:ext cx="7886700" cy="1360850"/>
           </a:xfrm>
         </p:spPr>
         <p:txBody>
@@ -1357,8 +1357,8 @@
         </p:nvSpPr>
         <p:spPr>
           <a:xfrm>
-            <a:off x="629842" y="1681163"/>
-            <a:ext cx="3868340" cy="823912"/>
+            <a:off x="629842" y="1725916"/>
+            <a:ext cx="3868340" cy="845845"/>
           </a:xfrm>
         </p:spPr>
         <p:txBody>
@@ -1422,8 +1422,8 @@
         </p:nvSpPr>
         <p:spPr>
           <a:xfrm>
-            <a:off x="629842" y="2505075"/>
-            <a:ext cx="3868340" cy="3684588"/>
+            <a:off x="629842" y="2571761"/>
+            <a:ext cx="3868340" cy="3782673"/>
           </a:xfrm>
         </p:spPr>
         <p:txBody>
@@ -1479,8 +1479,8 @@
         </p:nvSpPr>
         <p:spPr>
           <a:xfrm>
-            <a:off x="4629150" y="1681163"/>
-            <a:ext cx="3887391" cy="823912"/>
+            <a:off x="4629151" y="1725916"/>
+            <a:ext cx="3887391" cy="845845"/>
           </a:xfrm>
         </p:spPr>
         <p:txBody>
@@ -1544,8 +1544,8 @@
         </p:nvSpPr>
         <p:spPr>
           <a:xfrm>
-            <a:off x="4629150" y="2505075"/>
-            <a:ext cx="3887391" cy="3684588"/>
+            <a:off x="4629151" y="2571761"/>
+            <a:ext cx="3887391" cy="3782673"/>
           </a:xfrm>
         </p:spPr>
         <p:txBody>
@@ -1606,7 +1606,7 @@
           <a:p>
             <a:fld id="{EB9CE717-B66F-42F4-9EDB-EAEF10641B24}" type="datetimeFigureOut">
               <a:rPr lang="zh-CN" altLang="en-US" smtClean="0"/>
-              <a:t>2023/5/30</a:t>
+              <a:t>2023/6/13</a:t>
             </a:fld>
             <a:endParaRPr lang="zh-CN" altLang="en-US"/>
           </a:p>
@@ -1657,7 +1657,7 @@
     </p:spTree>
     <p:extLst>
       <p:ext uri="{BB962C8B-B14F-4D97-AF65-F5344CB8AC3E}">
-        <p14:creationId xmlns:p14="http://schemas.microsoft.com/office/powerpoint/2010/main" val="397660087"/>
+        <p14:creationId xmlns:p14="http://schemas.microsoft.com/office/powerpoint/2010/main" val="1723431605"/>
       </p:ext>
     </p:extLst>
   </p:cSld>
@@ -1724,7 +1724,7 @@
           <a:p>
             <a:fld id="{EB9CE717-B66F-42F4-9EDB-EAEF10641B24}" type="datetimeFigureOut">
               <a:rPr lang="zh-CN" altLang="en-US" smtClean="0"/>
-              <a:t>2023/5/30</a:t>
+              <a:t>2023/6/13</a:t>
             </a:fld>
             <a:endParaRPr lang="zh-CN" altLang="en-US"/>
           </a:p>
@@ -1775,7 +1775,7 @@
     </p:spTree>
     <p:extLst>
       <p:ext uri="{BB962C8B-B14F-4D97-AF65-F5344CB8AC3E}">
-        <p14:creationId xmlns:p14="http://schemas.microsoft.com/office/powerpoint/2010/main" val="1774248769"/>
+        <p14:creationId xmlns:p14="http://schemas.microsoft.com/office/powerpoint/2010/main" val="1422835457"/>
       </p:ext>
     </p:extLst>
   </p:cSld>
@@ -1819,7 +1819,7 @@
           <a:p>
             <a:fld id="{EB9CE717-B66F-42F4-9EDB-EAEF10641B24}" type="datetimeFigureOut">
               <a:rPr lang="zh-CN" altLang="en-US" smtClean="0"/>
-              <a:t>2023/5/30</a:t>
+              <a:t>2023/6/13</a:t>
             </a:fld>
             <a:endParaRPr lang="zh-CN" altLang="en-US"/>
           </a:p>
@@ -1870,7 +1870,7 @@
     </p:spTree>
     <p:extLst>
       <p:ext uri="{BB962C8B-B14F-4D97-AF65-F5344CB8AC3E}">
-        <p14:creationId xmlns:p14="http://schemas.microsoft.com/office/powerpoint/2010/main" val="903782614"/>
+        <p14:creationId xmlns:p14="http://schemas.microsoft.com/office/powerpoint/2010/main" val="3949960340"/>
       </p:ext>
     </p:extLst>
   </p:cSld>
@@ -1909,8 +1909,8 @@
         </p:nvSpPr>
         <p:spPr>
           <a:xfrm>
-            <a:off x="629841" y="457200"/>
-            <a:ext cx="2949178" cy="1600200"/>
+            <a:off x="629841" y="469371"/>
+            <a:ext cx="2949178" cy="1642798"/>
           </a:xfrm>
         </p:spPr>
         <p:txBody>
@@ -1941,8 +1941,8 @@
         </p:nvSpPr>
         <p:spPr>
           <a:xfrm>
-            <a:off x="3887391" y="987426"/>
-            <a:ext cx="4629150" cy="4873625"/>
+            <a:off x="3887391" y="1013712"/>
+            <a:ext cx="4629150" cy="5003363"/>
           </a:xfrm>
         </p:spPr>
         <p:txBody>
@@ -2026,8 +2026,8 @@
         </p:nvSpPr>
         <p:spPr>
           <a:xfrm>
-            <a:off x="629841" y="2057400"/>
-            <a:ext cx="2949178" cy="3811588"/>
+            <a:off x="629841" y="2112169"/>
+            <a:ext cx="2949178" cy="3913054"/>
           </a:xfrm>
         </p:spPr>
         <p:txBody>
@@ -2096,7 +2096,7 @@
           <a:p>
             <a:fld id="{EB9CE717-B66F-42F4-9EDB-EAEF10641B24}" type="datetimeFigureOut">
               <a:rPr lang="zh-CN" altLang="en-US" smtClean="0"/>
-              <a:t>2023/5/30</a:t>
+              <a:t>2023/6/13</a:t>
             </a:fld>
             <a:endParaRPr lang="zh-CN" altLang="en-US"/>
           </a:p>
@@ -2147,7 +2147,7 @@
     </p:spTree>
     <p:extLst>
       <p:ext uri="{BB962C8B-B14F-4D97-AF65-F5344CB8AC3E}">
-        <p14:creationId xmlns:p14="http://schemas.microsoft.com/office/powerpoint/2010/main" val="541721801"/>
+        <p14:creationId xmlns:p14="http://schemas.microsoft.com/office/powerpoint/2010/main" val="1344070492"/>
       </p:ext>
     </p:extLst>
   </p:cSld>
@@ -2186,8 +2186,8 @@
         </p:nvSpPr>
         <p:spPr>
           <a:xfrm>
-            <a:off x="629841" y="457200"/>
-            <a:ext cx="2949178" cy="1600200"/>
+            <a:off x="629841" y="469371"/>
+            <a:ext cx="2949178" cy="1642798"/>
           </a:xfrm>
         </p:spPr>
         <p:txBody>
@@ -2218,8 +2218,8 @@
         </p:nvSpPr>
         <p:spPr>
           <a:xfrm>
-            <a:off x="3887391" y="987426"/>
-            <a:ext cx="4629150" cy="4873625"/>
+            <a:off x="3887391" y="1013712"/>
+            <a:ext cx="4629150" cy="5003363"/>
           </a:xfrm>
         </p:spPr>
         <p:txBody>
@@ -2283,8 +2283,8 @@
         </p:nvSpPr>
         <p:spPr>
           <a:xfrm>
-            <a:off x="629841" y="2057400"/>
-            <a:ext cx="2949178" cy="3811588"/>
+            <a:off x="629841" y="2112169"/>
+            <a:ext cx="2949178" cy="3913054"/>
           </a:xfrm>
         </p:spPr>
         <p:txBody>
@@ -2353,7 +2353,7 @@
           <a:p>
             <a:fld id="{EB9CE717-B66F-42F4-9EDB-EAEF10641B24}" type="datetimeFigureOut">
               <a:rPr lang="zh-CN" altLang="en-US" smtClean="0"/>
-              <a:t>2023/5/30</a:t>
+              <a:t>2023/6/13</a:t>
             </a:fld>
             <a:endParaRPr lang="zh-CN" altLang="en-US"/>
           </a:p>
@@ -2404,7 +2404,7 @@
     </p:spTree>
     <p:extLst>
       <p:ext uri="{BB962C8B-B14F-4D97-AF65-F5344CB8AC3E}">
-        <p14:creationId xmlns:p14="http://schemas.microsoft.com/office/powerpoint/2010/main" val="705534765"/>
+        <p14:creationId xmlns:p14="http://schemas.microsoft.com/office/powerpoint/2010/main" val="279082136"/>
       </p:ext>
     </p:extLst>
   </p:cSld>
@@ -2448,8 +2448,8 @@
         </p:nvSpPr>
         <p:spPr>
           <a:xfrm>
-            <a:off x="628650" y="365126"/>
-            <a:ext cx="7886700" cy="1325563"/>
+            <a:off x="628650" y="374846"/>
+            <a:ext cx="7886700" cy="1360850"/>
           </a:xfrm>
           <a:prstGeom prst="rect">
             <a:avLst/>
@@ -2481,8 +2481,8 @@
         </p:nvSpPr>
         <p:spPr>
           <a:xfrm>
-            <a:off x="628650" y="1825625"/>
-            <a:ext cx="7886700" cy="4351338"/>
+            <a:off x="628650" y="1874224"/>
+            <a:ext cx="7886700" cy="4467173"/>
           </a:xfrm>
           <a:prstGeom prst="rect">
             <a:avLst/>
@@ -2543,8 +2543,8 @@
         </p:nvSpPr>
         <p:spPr>
           <a:xfrm>
-            <a:off x="628650" y="6356351"/>
-            <a:ext cx="2057400" cy="365125"/>
+            <a:off x="628650" y="6525560"/>
+            <a:ext cx="2057400" cy="374845"/>
           </a:xfrm>
           <a:prstGeom prst="rect">
             <a:avLst/>
@@ -2566,7 +2566,7 @@
           <a:p>
             <a:fld id="{EB9CE717-B66F-42F4-9EDB-EAEF10641B24}" type="datetimeFigureOut">
               <a:rPr lang="zh-CN" altLang="en-US" smtClean="0"/>
-              <a:t>2023/5/30</a:t>
+              <a:t>2023/6/13</a:t>
             </a:fld>
             <a:endParaRPr lang="zh-CN" altLang="en-US"/>
           </a:p>
@@ -2584,8 +2584,8 @@
         </p:nvSpPr>
         <p:spPr>
           <a:xfrm>
-            <a:off x="3028950" y="6356351"/>
-            <a:ext cx="3086100" cy="365125"/>
+            <a:off x="3028950" y="6525560"/>
+            <a:ext cx="3086100" cy="374845"/>
           </a:xfrm>
           <a:prstGeom prst="rect">
             <a:avLst/>
@@ -2621,8 +2621,8 @@
         </p:nvSpPr>
         <p:spPr>
           <a:xfrm>
-            <a:off x="6457950" y="6356351"/>
-            <a:ext cx="2057400" cy="365125"/>
+            <a:off x="6457950" y="6525560"/>
+            <a:ext cx="2057400" cy="374845"/>
           </a:xfrm>
           <a:prstGeom prst="rect">
             <a:avLst/>
@@ -2653,23 +2653,23 @@
     </p:spTree>
     <p:extLst>
       <p:ext uri="{BB962C8B-B14F-4D97-AF65-F5344CB8AC3E}">
-        <p14:creationId xmlns:p14="http://schemas.microsoft.com/office/powerpoint/2010/main" val="2110969290"/>
+        <p14:creationId xmlns:p14="http://schemas.microsoft.com/office/powerpoint/2010/main" val="208390690"/>
       </p:ext>
     </p:extLst>
   </p:cSld>
   <p:clrMap bg1="lt1" tx1="dk1" bg2="lt2" tx2="dk2" accent1="accent1" accent2="accent2" accent3="accent3" accent4="accent4" accent5="accent5" accent6="accent6" hlink="hlink" folHlink="folHlink"/>
   <p:sldLayoutIdLst>
-    <p:sldLayoutId id="2147483661" r:id="rId1"/>
-    <p:sldLayoutId id="2147483662" r:id="rId2"/>
-    <p:sldLayoutId id="2147483663" r:id="rId3"/>
-    <p:sldLayoutId id="2147483664" r:id="rId4"/>
-    <p:sldLayoutId id="2147483665" r:id="rId5"/>
-    <p:sldLayoutId id="2147483666" r:id="rId6"/>
-    <p:sldLayoutId id="2147483667" r:id="rId7"/>
-    <p:sldLayoutId id="2147483668" r:id="rId8"/>
-    <p:sldLayoutId id="2147483669" r:id="rId9"/>
-    <p:sldLayoutId id="2147483670" r:id="rId10"/>
-    <p:sldLayoutId id="2147483671" r:id="rId11"/>
+    <p:sldLayoutId id="2147483673" r:id="rId1"/>
+    <p:sldLayoutId id="2147483674" r:id="rId2"/>
+    <p:sldLayoutId id="2147483675" r:id="rId3"/>
+    <p:sldLayoutId id="2147483676" r:id="rId4"/>
+    <p:sldLayoutId id="2147483677" r:id="rId5"/>
+    <p:sldLayoutId id="2147483678" r:id="rId6"/>
+    <p:sldLayoutId id="2147483679" r:id="rId7"/>
+    <p:sldLayoutId id="2147483680" r:id="rId8"/>
+    <p:sldLayoutId id="2147483681" r:id="rId9"/>
+    <p:sldLayoutId id="2147483682" r:id="rId10"/>
+    <p:sldLayoutId id="2147483683" r:id="rId11"/>
   </p:sldLayoutIdLst>
   <p:txStyles>
     <p:titleStyle>
@@ -2985,7 +2985,7 @@
         </p:nvSpPr>
         <p:spPr>
           <a:xfrm>
-            <a:off x="3718280" y="104501"/>
+            <a:off x="3718280" y="302105"/>
             <a:ext cx="5389144" cy="6708951"/>
           </a:xfrm>
           <a:prstGeom prst="roundRect">
@@ -3041,7 +3041,7 @@
         </p:nvSpPr>
         <p:spPr>
           <a:xfrm>
-            <a:off x="6778516" y="1114906"/>
+            <a:off x="6778519" y="1312507"/>
             <a:ext cx="2036299" cy="2418060"/>
           </a:xfrm>
           <a:prstGeom prst="roundRect">
@@ -3099,7 +3099,7 @@
         </p:nvCxnSpPr>
         <p:spPr>
           <a:xfrm>
-            <a:off x="8474902" y="2912415"/>
+            <a:off x="8474905" y="3110019"/>
             <a:ext cx="18741" cy="919681"/>
           </a:xfrm>
           <a:prstGeom prst="straightConnector1">
@@ -3142,7 +3142,7 @@
         </p:nvSpPr>
         <p:spPr>
           <a:xfrm>
-            <a:off x="4007219" y="1082284"/>
+            <a:off x="4007222" y="1279888"/>
             <a:ext cx="2036299" cy="2418061"/>
           </a:xfrm>
           <a:prstGeom prst="roundRect">
@@ -3200,7 +3200,7 @@
         </p:nvCxnSpPr>
         <p:spPr>
           <a:xfrm>
-            <a:off x="5696176" y="2918100"/>
+            <a:off x="5696179" y="3115704"/>
             <a:ext cx="18741" cy="919681"/>
           </a:xfrm>
           <a:prstGeom prst="straightConnector1">
@@ -3243,7 +3243,7 @@
         </p:nvSpPr>
         <p:spPr>
           <a:xfrm>
-            <a:off x="1714284" y="117904"/>
+            <a:off x="1714287" y="315508"/>
             <a:ext cx="1886003" cy="6690859"/>
           </a:xfrm>
           <a:prstGeom prst="roundRect">
@@ -3301,7 +3301,7 @@
         </p:nvCxnSpPr>
         <p:spPr>
           <a:xfrm>
-            <a:off x="2691042" y="3008102"/>
+            <a:off x="2691045" y="3205703"/>
             <a:ext cx="8171" cy="900504"/>
           </a:xfrm>
           <a:prstGeom prst="straightConnector1">
@@ -3346,7 +3346,7 @@
         </p:nvCxnSpPr>
         <p:spPr>
           <a:xfrm>
-            <a:off x="2675045" y="1637093"/>
+            <a:off x="2675048" y="1834694"/>
             <a:ext cx="8171" cy="900504"/>
           </a:xfrm>
           <a:prstGeom prst="straightConnector1">
@@ -3391,7 +3391,7 @@
             </p:nvSpPr>
             <p:spPr>
               <a:xfrm>
-                <a:off x="6155812" y="374497"/>
+                <a:off x="6155815" y="572101"/>
                 <a:ext cx="537211" cy="516989"/>
               </a:xfrm>
               <a:prstGeom prst="ellipse">
@@ -3434,7 +3434,7 @@
                     </m:oMathParaPr>
                     <m:oMath xmlns:m="http://schemas.openxmlformats.org/officeDocument/2006/math">
                       <m:r>
-                        <a:rPr lang="en-US" altLang="zh-CN" sz="2400" b="0" i="1" smtClean="0">
+                        <a:rPr lang="en-US" altLang="zh-CN" sz="2400" i="1">
                           <a:solidFill>
                             <a:schemeClr val="tx1"/>
                           </a:solidFill>
@@ -3443,7 +3443,7 @@
                         <m:t> </m:t>
                       </m:r>
                       <m:r>
-                        <a:rPr lang="en-US" altLang="zh-CN" sz="2400" b="0" i="1" smtClean="0">
+                        <a:rPr lang="en-US" altLang="zh-CN" sz="2400" i="1">
                           <a:solidFill>
                             <a:schemeClr val="tx1"/>
                           </a:solidFill>
@@ -3476,7 +3476,7 @@
             </p:nvSpPr>
             <p:spPr>
               <a:xfrm>
-                <a:off x="6155812" y="374497"/>
+                <a:off x="6155815" y="572101"/>
                 <a:ext cx="537211" cy="516989"/>
               </a:xfrm>
               <a:prstGeom prst="ellipse">
@@ -3523,7 +3523,7 @@
         </p:nvSpPr>
         <p:spPr>
           <a:xfrm>
-            <a:off x="1636889" y="132915"/>
+            <a:off x="1636889" y="330516"/>
             <a:ext cx="2064434" cy="369332"/>
           </a:xfrm>
           <a:prstGeom prst="rect">
@@ -3569,7 +3569,7 @@
         </p:nvSpPr>
         <p:spPr>
           <a:xfrm>
-            <a:off x="3552974" y="135329"/>
+            <a:off x="3552974" y="332930"/>
             <a:ext cx="2064434" cy="369332"/>
           </a:xfrm>
           <a:prstGeom prst="rect">
@@ -3615,7 +3615,7 @@
         </p:nvSpPr>
         <p:spPr>
           <a:xfrm>
-            <a:off x="4174279" y="4715780"/>
+            <a:off x="4174279" y="4913384"/>
             <a:ext cx="4536034" cy="1311123"/>
           </a:xfrm>
           <a:prstGeom prst="roundRect">
@@ -3673,7 +3673,7 @@
         </p:nvSpPr>
         <p:spPr>
           <a:xfrm>
-            <a:off x="7146864" y="6152627"/>
+            <a:off x="7146867" y="6350231"/>
             <a:ext cx="537211" cy="516989"/>
           </a:xfrm>
           <a:prstGeom prst="ellipse">
@@ -3727,7 +3727,7 @@
         </p:nvSpPr>
         <p:spPr>
           <a:xfrm>
-            <a:off x="5490376" y="3822630"/>
+            <a:off x="5490376" y="4020231"/>
             <a:ext cx="789172" cy="662408"/>
           </a:xfrm>
           <a:prstGeom prst="ellipse">
@@ -3781,7 +3781,7 @@
         </p:nvSpPr>
         <p:spPr>
           <a:xfrm>
-            <a:off x="8173102" y="2573185"/>
+            <a:off x="8173105" y="2770789"/>
             <a:ext cx="537211" cy="516989"/>
           </a:xfrm>
           <a:prstGeom prst="ellipse">
@@ -3835,7 +3835,7 @@
         </p:nvSpPr>
         <p:spPr>
           <a:xfrm>
-            <a:off x="6925290" y="2580035"/>
+            <a:off x="6925293" y="2777639"/>
             <a:ext cx="537211" cy="516989"/>
           </a:xfrm>
           <a:prstGeom prst="ellipse">
@@ -3889,7 +3889,7 @@
         </p:nvSpPr>
         <p:spPr>
           <a:xfrm>
-            <a:off x="2415686" y="1177683"/>
+            <a:off x="2415686" y="1375287"/>
             <a:ext cx="548640" cy="516989"/>
           </a:xfrm>
           <a:prstGeom prst="ellipse">
@@ -3943,7 +3943,7 @@
         </p:nvSpPr>
         <p:spPr>
           <a:xfrm>
-            <a:off x="2415687" y="2538167"/>
+            <a:off x="2415690" y="2735771"/>
             <a:ext cx="537211" cy="516989"/>
           </a:xfrm>
           <a:prstGeom prst="ellipse">
@@ -3997,7 +3997,7 @@
         </p:nvSpPr>
         <p:spPr>
           <a:xfrm>
-            <a:off x="2408913" y="3898360"/>
+            <a:off x="2408913" y="4095964"/>
             <a:ext cx="548640" cy="516989"/>
           </a:xfrm>
           <a:prstGeom prst="ellipse">
@@ -4051,7 +4051,7 @@
         </p:nvSpPr>
         <p:spPr>
           <a:xfrm>
-            <a:off x="2418102" y="6154878"/>
+            <a:off x="2418102" y="6352482"/>
             <a:ext cx="548640" cy="516989"/>
           </a:xfrm>
           <a:prstGeom prst="ellipse">
@@ -4105,7 +4105,7 @@
         </p:nvSpPr>
         <p:spPr>
           <a:xfrm>
-            <a:off x="4751048" y="1220581"/>
+            <a:off x="4751048" y="1418185"/>
             <a:ext cx="548640" cy="516989"/>
           </a:xfrm>
           <a:prstGeom prst="ellipse">
@@ -4159,7 +4159,7 @@
         </p:nvSpPr>
         <p:spPr>
           <a:xfrm>
-            <a:off x="6907879" y="1220580"/>
+            <a:off x="6907879" y="1418184"/>
             <a:ext cx="548640" cy="516989"/>
           </a:xfrm>
           <a:prstGeom prst="ellipse">
@@ -4213,7 +4213,7 @@
         </p:nvSpPr>
         <p:spPr>
           <a:xfrm>
-            <a:off x="8153455" y="1220579"/>
+            <a:off x="8153455" y="1418183"/>
             <a:ext cx="548640" cy="516989"/>
           </a:xfrm>
           <a:prstGeom prst="ellipse">
@@ -4253,8 +4253,8 @@
           </a:p>
         </p:txBody>
       </p:sp>
-      <mc:AlternateContent xmlns:mc="http://schemas.openxmlformats.org/markup-compatibility/2006" xmlns:a14="http://schemas.microsoft.com/office/drawing/2010/main">
-        <mc:Choice Requires="a14">
+      <mc:AlternateContent xmlns:mc="http://schemas.openxmlformats.org/markup-compatibility/2006">
+        <mc:Choice xmlns:a14="http://schemas.microsoft.com/office/drawing/2010/main" Requires="a14">
           <p:sp>
             <p:nvSpPr>
               <p:cNvPr id="410" name="Oval 409">
@@ -4269,7 +4269,7 @@
             </p:nvSpPr>
             <p:spPr>
               <a:xfrm>
-                <a:off x="4152279" y="2581066"/>
+                <a:off x="4152282" y="2778670"/>
                 <a:ext cx="537211" cy="516989"/>
               </a:xfrm>
               <a:prstGeom prst="ellipse">
@@ -4312,7 +4312,7 @@
                     </m:oMathParaPr>
                     <m:oMath xmlns:m="http://schemas.openxmlformats.org/officeDocument/2006/math">
                       <m:r>
-                        <a:rPr lang="en-US" altLang="zh-CN" sz="3000" i="1" dirty="0" smtClean="0">
+                        <a:rPr lang="en-US" altLang="zh-CN" sz="3000" i="1" dirty="0">
                           <a:solidFill>
                             <a:schemeClr val="tx1"/>
                           </a:solidFill>
@@ -4328,7 +4328,7 @@
             </p:txBody>
           </p:sp>
         </mc:Choice>
-        <mc:Fallback xmlns="">
+        <mc:Fallback>
           <p:sp>
             <p:nvSpPr>
               <p:cNvPr id="410" name="Oval 409">
@@ -4345,7 +4345,7 @@
             </p:nvSpPr>
             <p:spPr>
               <a:xfrm>
-                <a:off x="4152279" y="2581066"/>
+                <a:off x="4152282" y="2778670"/>
                 <a:ext cx="537211" cy="516989"/>
               </a:xfrm>
               <a:prstGeom prst="ellipse">
@@ -4392,7 +4392,7 @@
         </p:nvSpPr>
         <p:spPr>
           <a:xfrm>
-            <a:off x="5403814" y="2581066"/>
+            <a:off x="5403817" y="2778670"/>
             <a:ext cx="537211" cy="516989"/>
           </a:xfrm>
           <a:prstGeom prst="ellipse">
@@ -4448,7 +4448,7 @@
             </p:nvSpPr>
             <p:spPr>
               <a:xfrm>
-                <a:off x="2427291" y="1171077"/>
+                <a:off x="2427291" y="1368681"/>
                 <a:ext cx="530262" cy="461665"/>
               </a:xfrm>
               <a:prstGeom prst="rect">
@@ -4473,7 +4473,7 @@
                     </m:oMathParaPr>
                     <m:oMath xmlns:m="http://schemas.openxmlformats.org/officeDocument/2006/math">
                       <m:r>
-                        <a:rPr lang="en-US" altLang="zh-CN" sz="2400" b="0" i="1" smtClean="0">
+                        <a:rPr lang="en-US" altLang="zh-CN" sz="2400" i="1">
                           <a:latin typeface="Cambria Math" panose="02040503050406030204" pitchFamily="18" charset="0"/>
                         </a:rPr>
                         <m:t>𝑠</m:t>
@@ -4503,7 +4503,7 @@
             </p:nvSpPr>
             <p:spPr>
               <a:xfrm>
-                <a:off x="2427291" y="1171077"/>
+                <a:off x="2427291" y="1368681"/>
                 <a:ext cx="530262" cy="461665"/>
               </a:xfrm>
               <a:prstGeom prst="rect">
@@ -4550,7 +4550,7 @@
             </p:nvSpPr>
             <p:spPr>
               <a:xfrm>
-                <a:off x="6917068" y="1197973"/>
+                <a:off x="6917068" y="1395577"/>
                 <a:ext cx="530262" cy="461665"/>
               </a:xfrm>
               <a:prstGeom prst="rect">
@@ -4577,14 +4577,14 @@
                       <m:sSub>
                         <m:sSubPr>
                           <m:ctrlPr>
-                            <a:rPr lang="en-US" altLang="zh-CN" sz="2400" b="0" i="1" smtClean="0">
+                            <a:rPr lang="en-US" altLang="zh-CN" sz="2400" i="1">
                               <a:latin typeface="Cambria Math" panose="02040503050406030204" pitchFamily="18" charset="0"/>
                             </a:rPr>
                           </m:ctrlPr>
                         </m:sSubPr>
                         <m:e>
                           <m:r>
-                            <a:rPr lang="en-US" altLang="zh-CN" sz="2400" b="0" i="1" smtClean="0">
+                            <a:rPr lang="en-US" altLang="zh-CN" sz="2400" i="1">
                               <a:latin typeface="Cambria Math" panose="02040503050406030204" pitchFamily="18" charset="0"/>
                             </a:rPr>
                             <m:t>𝑠</m:t>
@@ -4595,10 +4595,10 @@
                             <m:rPr>
                               <m:sty m:val="p"/>
                             </m:rPr>
-                            <a:rPr lang="en-US" altLang="zh-CN" sz="2400" b="0" i="0" smtClean="0">
+                            <a:rPr lang="en-US" altLang="zh-CN" sz="2400">
                               <a:latin typeface="Cambria Math" panose="02040503050406030204" pitchFamily="18" charset="0"/>
                             </a:rPr>
-                            <m:t>A</m:t>
+                            <m:t>V</m:t>
                           </m:r>
                         </m:sub>
                       </m:sSub>
@@ -4627,7 +4627,7 @@
             </p:nvSpPr>
             <p:spPr>
               <a:xfrm>
-                <a:off x="6917068" y="1197973"/>
+                <a:off x="6917068" y="1395577"/>
                 <a:ext cx="530262" cy="461665"/>
               </a:xfrm>
               <a:prstGeom prst="rect">
@@ -4636,7 +4636,7 @@
               <a:blipFill>
                 <a:blip r:embed="rId5"/>
                 <a:stretch>
-                  <a:fillRect b="-2667"/>
+                  <a:fillRect b="-1316"/>
                 </a:stretch>
               </a:blipFill>
               <a:ln w="19050">
@@ -4674,7 +4674,7 @@
             </p:nvSpPr>
             <p:spPr>
               <a:xfrm>
-                <a:off x="4760237" y="1213172"/>
+                <a:off x="4760237" y="1410776"/>
                 <a:ext cx="530262" cy="461665"/>
               </a:xfrm>
               <a:prstGeom prst="rect">
@@ -4699,7 +4699,7 @@
                     </m:oMathParaPr>
                     <m:oMath xmlns:m="http://schemas.openxmlformats.org/officeDocument/2006/math">
                       <m:r>
-                        <a:rPr lang="en-US" altLang="zh-CN" sz="2400" b="0" i="1" smtClean="0">
+                        <a:rPr lang="en-US" altLang="zh-CN" sz="2400" i="1">
                           <a:latin typeface="Cambria Math" panose="02040503050406030204" pitchFamily="18" charset="0"/>
                         </a:rPr>
                         <m:t>𝑠</m:t>
@@ -4729,7 +4729,7 @@
             </p:nvSpPr>
             <p:spPr>
               <a:xfrm>
-                <a:off x="4760237" y="1213172"/>
+                <a:off x="4760237" y="1410776"/>
                 <a:ext cx="530262" cy="461665"/>
               </a:xfrm>
               <a:prstGeom prst="rect">
@@ -4776,7 +4776,7 @@
             </p:nvSpPr>
             <p:spPr>
               <a:xfrm>
-                <a:off x="2424057" y="2536623"/>
+                <a:off x="2424057" y="2734227"/>
                 <a:ext cx="530262" cy="461665"/>
               </a:xfrm>
               <a:prstGeom prst="rect">
@@ -4801,7 +4801,7 @@
                     </m:oMathParaPr>
                     <m:oMath xmlns:m="http://schemas.openxmlformats.org/officeDocument/2006/math">
                       <m:r>
-                        <a:rPr lang="en-US" altLang="zh-CN" sz="2400" b="0" i="1" smtClean="0">
+                        <a:rPr lang="en-US" altLang="zh-CN" sz="2400" i="1">
                           <a:latin typeface="Cambria Math" panose="02040503050406030204" pitchFamily="18" charset="0"/>
                         </a:rPr>
                         <m:t>𝑥</m:t>
@@ -4831,7 +4831,7 @@
             </p:nvSpPr>
             <p:spPr>
               <a:xfrm>
-                <a:off x="2424057" y="2536623"/>
+                <a:off x="2424057" y="2734227"/>
                 <a:ext cx="530262" cy="461665"/>
               </a:xfrm>
               <a:prstGeom prst="rect">
@@ -4878,7 +4878,7 @@
             </p:nvSpPr>
             <p:spPr>
               <a:xfrm>
-                <a:off x="8188100" y="1197973"/>
+                <a:off x="8188100" y="1395577"/>
                 <a:ext cx="530262" cy="461665"/>
               </a:xfrm>
               <a:prstGeom prst="rect">
@@ -4905,14 +4905,14 @@
                       <m:sSub>
                         <m:sSubPr>
                           <m:ctrlPr>
-                            <a:rPr lang="en-US" altLang="zh-CN" sz="2400" b="0" i="1" smtClean="0">
+                            <a:rPr lang="en-US" altLang="zh-CN" sz="2400" i="1">
                               <a:latin typeface="Cambria Math" panose="02040503050406030204" pitchFamily="18" charset="0"/>
                             </a:rPr>
                           </m:ctrlPr>
                         </m:sSubPr>
                         <m:e>
                           <m:r>
-                            <a:rPr lang="en-US" altLang="zh-CN" sz="2400" b="0" i="1" smtClean="0">
+                            <a:rPr lang="en-US" altLang="zh-CN" sz="2400" i="1">
                               <a:latin typeface="Cambria Math" panose="02040503050406030204" pitchFamily="18" charset="0"/>
                             </a:rPr>
                             <m:t>𝑠</m:t>
@@ -4923,10 +4923,10 @@
                             <m:rPr>
                               <m:sty m:val="p"/>
                             </m:rPr>
-                            <a:rPr lang="en-US" altLang="zh-CN" sz="2400" b="0" i="0" smtClean="0">
+                            <a:rPr lang="en-US" altLang="zh-CN" sz="2400">
                               <a:latin typeface="Cambria Math" panose="02040503050406030204" pitchFamily="18" charset="0"/>
                             </a:rPr>
-                            <m:t>V</m:t>
+                            <m:t>A</m:t>
                           </m:r>
                         </m:sub>
                       </m:sSub>
@@ -4955,7 +4955,7 @@
             </p:nvSpPr>
             <p:spPr>
               <a:xfrm>
-                <a:off x="8188100" y="1197973"/>
+                <a:off x="8188100" y="1395577"/>
                 <a:ext cx="530262" cy="461665"/>
               </a:xfrm>
               <a:prstGeom prst="rect">
@@ -4964,7 +4964,7 @@
               <a:blipFill>
                 <a:blip r:embed="rId8"/>
                 <a:stretch>
-                  <a:fillRect b="-2667"/>
+                  <a:fillRect b="-1316"/>
                 </a:stretch>
               </a:blipFill>
               <a:ln w="19050">
@@ -5002,7 +5002,7 @@
             </p:nvSpPr>
             <p:spPr>
               <a:xfrm>
-                <a:off x="2425738" y="3909771"/>
+                <a:off x="2425738" y="4107375"/>
                 <a:ext cx="530262" cy="461665"/>
               </a:xfrm>
               <a:prstGeom prst="rect">
@@ -5030,14 +5030,14 @@
                         <m:accPr>
                           <m:chr m:val="̂"/>
                           <m:ctrlPr>
-                            <a:rPr lang="en-US" altLang="zh-CN" sz="2400" b="0" i="1" smtClean="0">
+                            <a:rPr lang="en-US" altLang="zh-CN" sz="2400" i="1">
                               <a:latin typeface="Cambria Math" panose="02040503050406030204" pitchFamily="18" charset="0"/>
                             </a:rPr>
                           </m:ctrlPr>
                         </m:accPr>
                         <m:e>
                           <m:r>
-                            <a:rPr lang="en-US" altLang="zh-CN" sz="2400" b="0" i="1" smtClean="0">
+                            <a:rPr lang="en-US" altLang="zh-CN" sz="2400" i="1">
                               <a:latin typeface="Cambria Math" panose="02040503050406030204" pitchFamily="18" charset="0"/>
                             </a:rPr>
                             <m:t>𝑠</m:t>
@@ -5069,7 +5069,7 @@
             </p:nvSpPr>
             <p:spPr>
               <a:xfrm>
-                <a:off x="2425738" y="3909771"/>
+                <a:off x="2425738" y="4107375"/>
                 <a:ext cx="530262" cy="461665"/>
               </a:xfrm>
               <a:prstGeom prst="rect">
@@ -5116,7 +5116,7 @@
             </p:nvSpPr>
             <p:spPr>
               <a:xfrm>
-                <a:off x="4178983" y="2560542"/>
+                <a:off x="4178983" y="2758146"/>
                 <a:ext cx="530262" cy="461665"/>
               </a:xfrm>
               <a:prstGeom prst="rect">
@@ -5143,14 +5143,14 @@
                       <m:sSub>
                         <m:sSubPr>
                           <m:ctrlPr>
-                            <a:rPr lang="en-US" altLang="zh-CN" sz="2400" b="0" i="1" smtClean="0">
+                            <a:rPr lang="en-US" altLang="zh-CN" sz="2400" i="1">
                               <a:latin typeface="Cambria Math" panose="02040503050406030204" pitchFamily="18" charset="0"/>
                             </a:rPr>
                           </m:ctrlPr>
                         </m:sSubPr>
                         <m:e>
                           <m:r>
-                            <a:rPr lang="en-US" altLang="zh-CN" sz="2400" b="0" i="1" smtClean="0">
+                            <a:rPr lang="en-US" altLang="zh-CN" sz="2400" i="1">
                               <a:latin typeface="Cambria Math" panose="02040503050406030204" pitchFamily="18" charset="0"/>
                             </a:rPr>
                             <m:t>𝑥</m:t>
@@ -5161,10 +5161,10 @@
                             <m:rPr>
                               <m:sty m:val="p"/>
                             </m:rPr>
-                            <a:rPr lang="en-US" altLang="zh-CN" sz="2400" b="0" i="0" smtClean="0">
+                            <a:rPr lang="en-US" altLang="zh-CN" sz="2400">
                               <a:latin typeface="Cambria Math" panose="02040503050406030204" pitchFamily="18" charset="0"/>
                             </a:rPr>
-                            <m:t>A</m:t>
+                            <m:t>V</m:t>
                           </m:r>
                         </m:sub>
                       </m:sSub>
@@ -5193,7 +5193,7 @@
             </p:nvSpPr>
             <p:spPr>
               <a:xfrm>
-                <a:off x="4178983" y="2560542"/>
+                <a:off x="4178983" y="2758146"/>
                 <a:ext cx="530262" cy="461665"/>
               </a:xfrm>
               <a:prstGeom prst="rect">
@@ -5240,7 +5240,7 @@
             </p:nvSpPr>
             <p:spPr>
               <a:xfrm>
-                <a:off x="6947769" y="2541481"/>
+                <a:off x="6947769" y="2739085"/>
                 <a:ext cx="530262" cy="461665"/>
               </a:xfrm>
               <a:prstGeom prst="rect">
@@ -5267,14 +5267,14 @@
                       <m:sSub>
                         <m:sSubPr>
                           <m:ctrlPr>
-                            <a:rPr lang="en-US" altLang="zh-CN" sz="2400" b="0" i="1" smtClean="0">
+                            <a:rPr lang="en-US" altLang="zh-CN" sz="2400" i="1">
                               <a:latin typeface="Cambria Math" panose="02040503050406030204" pitchFamily="18" charset="0"/>
                             </a:rPr>
                           </m:ctrlPr>
                         </m:sSubPr>
                         <m:e>
                           <m:r>
-                            <a:rPr lang="en-US" altLang="zh-CN" sz="2400" b="0" i="1" smtClean="0">
+                            <a:rPr lang="en-US" altLang="zh-CN" sz="2400" i="1">
                               <a:latin typeface="Cambria Math" panose="02040503050406030204" pitchFamily="18" charset="0"/>
                             </a:rPr>
                             <m:t>𝑥</m:t>
@@ -5285,10 +5285,10 @@
                             <m:rPr>
                               <m:sty m:val="p"/>
                             </m:rPr>
-                            <a:rPr lang="en-US" altLang="zh-CN" sz="2400" b="0" i="0" smtClean="0">
+                            <a:rPr lang="en-US" altLang="zh-CN" sz="2400">
                               <a:latin typeface="Cambria Math" panose="02040503050406030204" pitchFamily="18" charset="0"/>
                             </a:rPr>
-                            <m:t>A</m:t>
+                            <m:t>V</m:t>
                           </m:r>
                         </m:sub>
                       </m:sSub>
@@ -5317,7 +5317,7 @@
             </p:nvSpPr>
             <p:spPr>
               <a:xfrm>
-                <a:off x="6947769" y="2541481"/>
+                <a:off x="6947769" y="2739085"/>
                 <a:ext cx="530262" cy="461665"/>
               </a:xfrm>
               <a:prstGeom prst="rect">
@@ -5326,7 +5326,7 @@
               <a:blipFill>
                 <a:blip r:embed="rId11"/>
                 <a:stretch>
-                  <a:fillRect b="-1316"/>
+                  <a:fillRect b="-2632"/>
                 </a:stretch>
               </a:blipFill>
               <a:ln w="19050">
@@ -5364,7 +5364,7 @@
             </p:nvSpPr>
             <p:spPr>
               <a:xfrm>
-                <a:off x="5406565" y="2566315"/>
+                <a:off x="5406565" y="2763919"/>
                 <a:ext cx="530262" cy="461665"/>
               </a:xfrm>
               <a:prstGeom prst="rect">
@@ -5391,14 +5391,14 @@
                       <m:sSub>
                         <m:sSubPr>
                           <m:ctrlPr>
-                            <a:rPr lang="en-US" altLang="zh-CN" sz="2400" b="0" i="1" smtClean="0">
+                            <a:rPr lang="en-US" altLang="zh-CN" sz="2400" i="1">
                               <a:latin typeface="Cambria Math" panose="02040503050406030204" pitchFamily="18" charset="0"/>
                             </a:rPr>
                           </m:ctrlPr>
                         </m:sSubPr>
                         <m:e>
                           <m:r>
-                            <a:rPr lang="en-US" altLang="zh-CN" sz="2400" b="0" i="1" smtClean="0">
+                            <a:rPr lang="en-US" altLang="zh-CN" sz="2400" i="1">
                               <a:latin typeface="Cambria Math" panose="02040503050406030204" pitchFamily="18" charset="0"/>
                             </a:rPr>
                             <m:t>𝑥</m:t>
@@ -5409,10 +5409,10 @@
                             <m:rPr>
                               <m:sty m:val="p"/>
                             </m:rPr>
-                            <a:rPr lang="en-US" altLang="zh-CN" sz="2400" b="0" i="0" smtClean="0">
+                            <a:rPr lang="en-US" altLang="zh-CN" sz="2400">
                               <a:latin typeface="Cambria Math" panose="02040503050406030204" pitchFamily="18" charset="0"/>
                             </a:rPr>
-                            <m:t>V</m:t>
+                            <m:t>A</m:t>
                           </m:r>
                         </m:sub>
                       </m:sSub>
@@ -5441,7 +5441,7 @@
             </p:nvSpPr>
             <p:spPr>
               <a:xfrm>
-                <a:off x="5406565" y="2566315"/>
+                <a:off x="5406565" y="2763919"/>
                 <a:ext cx="530262" cy="461665"/>
               </a:xfrm>
               <a:prstGeom prst="rect">
@@ -5450,7 +5450,7 @@
               <a:blipFill>
                 <a:blip r:embed="rId12"/>
                 <a:stretch>
-                  <a:fillRect b="-1316"/>
+                  <a:fillRect b="-2632"/>
                 </a:stretch>
               </a:blipFill>
               <a:ln w="19050">
@@ -5488,7 +5488,7 @@
             </p:nvSpPr>
             <p:spPr>
               <a:xfrm>
-                <a:off x="8189099" y="2543241"/>
+                <a:off x="8189099" y="2740845"/>
                 <a:ext cx="530262" cy="461665"/>
               </a:xfrm>
               <a:prstGeom prst="rect">
@@ -5515,14 +5515,14 @@
                       <m:sSub>
                         <m:sSubPr>
                           <m:ctrlPr>
-                            <a:rPr lang="en-US" altLang="zh-CN" sz="2400" b="0" i="1" smtClean="0">
+                            <a:rPr lang="en-US" altLang="zh-CN" sz="2400" i="1">
                               <a:latin typeface="Cambria Math" panose="02040503050406030204" pitchFamily="18" charset="0"/>
                             </a:rPr>
                           </m:ctrlPr>
                         </m:sSubPr>
                         <m:e>
                           <m:r>
-                            <a:rPr lang="en-US" altLang="zh-CN" sz="2400" b="0" i="1" smtClean="0">
+                            <a:rPr lang="en-US" altLang="zh-CN" sz="2400" i="1">
                               <a:latin typeface="Cambria Math" panose="02040503050406030204" pitchFamily="18" charset="0"/>
                             </a:rPr>
                             <m:t>𝑥</m:t>
@@ -5533,10 +5533,10 @@
                             <m:rPr>
                               <m:sty m:val="p"/>
                             </m:rPr>
-                            <a:rPr lang="en-US" altLang="zh-CN" sz="2400" b="0" i="0" smtClean="0">
+                            <a:rPr lang="en-US" altLang="zh-CN" sz="2400">
                               <a:latin typeface="Cambria Math" panose="02040503050406030204" pitchFamily="18" charset="0"/>
                             </a:rPr>
-                            <m:t>V</m:t>
+                            <m:t>A</m:t>
                           </m:r>
                         </m:sub>
                       </m:sSub>
@@ -5565,7 +5565,7 @@
             </p:nvSpPr>
             <p:spPr>
               <a:xfrm>
-                <a:off x="8189099" y="2543241"/>
+                <a:off x="8189099" y="2740845"/>
                 <a:ext cx="530262" cy="461665"/>
               </a:xfrm>
               <a:prstGeom prst="rect">
@@ -5574,7 +5574,7 @@
               <a:blipFill>
                 <a:blip r:embed="rId13"/>
                 <a:stretch>
-                  <a:fillRect b="-2632"/>
+                  <a:fillRect b="-2667"/>
                 </a:stretch>
               </a:blipFill>
               <a:ln w="19050">
@@ -5610,7 +5610,7 @@
         </p:nvSpPr>
         <p:spPr>
           <a:xfrm>
-            <a:off x="3784489" y="3836544"/>
+            <a:off x="3784489" y="4034148"/>
             <a:ext cx="1655974" cy="601561"/>
           </a:xfrm>
           <a:prstGeom prst="roundRect">
@@ -5666,7 +5666,7 @@
             </p:nvSpPr>
             <p:spPr>
               <a:xfrm>
-                <a:off x="5451786" y="3878751"/>
+                <a:off x="5451789" y="4076355"/>
                 <a:ext cx="938195" cy="461665"/>
               </a:xfrm>
               <a:prstGeom prst="rect">
@@ -5693,7 +5693,7 @@
                       <m:sSub>
                         <m:sSubPr>
                           <m:ctrlPr>
-                            <a:rPr lang="en-US" altLang="zh-CN" sz="2400" b="0" i="1" smtClean="0">
+                            <a:rPr lang="en-US" altLang="zh-CN" sz="2400" i="1">
                               <a:latin typeface="Cambria Math" panose="02040503050406030204" pitchFamily="18" charset="0"/>
                             </a:rPr>
                           </m:ctrlPr>
@@ -5703,14 +5703,14 @@
                             <m:accPr>
                               <m:chr m:val="̂"/>
                               <m:ctrlPr>
-                                <a:rPr lang="en-US" altLang="zh-CN" sz="2400" b="0" i="1" smtClean="0">
+                                <a:rPr lang="en-US" altLang="zh-CN" sz="2400" i="1">
                                   <a:latin typeface="Cambria Math" panose="02040503050406030204" pitchFamily="18" charset="0"/>
                                 </a:rPr>
                               </m:ctrlPr>
                             </m:accPr>
                             <m:e>
                               <m:r>
-                                <a:rPr lang="en-US" altLang="zh-CN" sz="2400" b="0" i="1" smtClean="0">
+                                <a:rPr lang="en-US" altLang="zh-CN" sz="2400" i="1">
                                   <a:latin typeface="Cambria Math" panose="02040503050406030204" pitchFamily="18" charset="0"/>
                                 </a:rPr>
                                 <m:t>𝑠</m:t>
@@ -5720,13 +5720,13 @@
                         </m:e>
                         <m:sub>
                           <m:r>
-                            <a:rPr lang="en-US" altLang="zh-CN" sz="2400" b="0" i="1" smtClean="0">
+                            <a:rPr lang="en-US" altLang="zh-CN" sz="2400" i="1">
                               <a:latin typeface="Cambria Math" panose="02040503050406030204" pitchFamily="18" charset="0"/>
                             </a:rPr>
                             <m:t>𝐶</m:t>
                           </m:r>
                           <m:r>
-                            <a:rPr lang="en-US" altLang="zh-CN" sz="2400" b="0" i="1" smtClean="0">
+                            <a:rPr lang="en-US" altLang="zh-CN" sz="2400" i="1">
                               <a:latin typeface="Cambria Math" panose="02040503050406030204" pitchFamily="18" charset="0"/>
                             </a:rPr>
                             <m:t>=1 </m:t>
@@ -5758,7 +5758,7 @@
             </p:nvSpPr>
             <p:spPr>
               <a:xfrm>
-                <a:off x="5451786" y="3878751"/>
+                <a:off x="5451789" y="4076355"/>
                 <a:ext cx="938195" cy="461665"/>
               </a:xfrm>
               <a:prstGeom prst="rect">
@@ -5767,7 +5767,7 @@
               <a:blipFill>
                 <a:blip r:embed="rId14"/>
                 <a:stretch>
-                  <a:fillRect t="-3947" b="-1316"/>
+                  <a:fillRect t="-4000" b="-2667"/>
                 </a:stretch>
               </a:blipFill>
               <a:ln w="19050">
@@ -5805,7 +5805,7 @@
             </p:nvSpPr>
             <p:spPr>
               <a:xfrm>
-                <a:off x="3652866" y="3955695"/>
+                <a:off x="3652866" y="4153296"/>
                 <a:ext cx="1929172" cy="369332"/>
               </a:xfrm>
               <a:prstGeom prst="rect">
@@ -5830,25 +5830,25 @@
                     </m:oMathParaPr>
                     <m:oMath xmlns:m="http://schemas.openxmlformats.org/officeDocument/2006/math">
                       <m:r>
-                        <a:rPr lang="en-US" altLang="zh-CN" b="0" i="1" smtClean="0">
+                        <a:rPr lang="en-US" altLang="zh-CN" i="1">
                           <a:latin typeface="Cambria Math" panose="02040503050406030204" pitchFamily="18" charset="0"/>
                         </a:rPr>
                         <m:t>𝑝</m:t>
                       </m:r>
                       <m:r>
-                        <a:rPr lang="en-US" altLang="zh-CN" b="0" i="1" smtClean="0">
+                        <a:rPr lang="en-US" altLang="zh-CN" i="1">
                           <a:latin typeface="Cambria Math" panose="02040503050406030204" pitchFamily="18" charset="0"/>
                         </a:rPr>
                         <m:t>(</m:t>
                       </m:r>
                       <m:r>
-                        <a:rPr lang="en-US" altLang="zh-CN" b="0" i="1" smtClean="0">
+                        <a:rPr lang="en-US" altLang="zh-CN" i="1">
                           <a:latin typeface="Cambria Math" panose="02040503050406030204" pitchFamily="18" charset="0"/>
                         </a:rPr>
                         <m:t>𝐶</m:t>
                       </m:r>
                       <m:r>
-                        <a:rPr lang="en-US" altLang="zh-CN" b="0" i="1" smtClean="0">
+                        <a:rPr lang="en-US" altLang="zh-CN" i="1">
                           <a:latin typeface="Cambria Math" panose="02040503050406030204" pitchFamily="18" charset="0"/>
                         </a:rPr>
                         <m:t>=1|</m:t>
@@ -5856,14 +5856,14 @@
                       <m:sSub>
                         <m:sSubPr>
                           <m:ctrlPr>
-                            <a:rPr lang="en-US" altLang="zh-CN" i="1" smtClean="0">
+                            <a:rPr lang="en-US" altLang="zh-CN" i="1">
                               <a:latin typeface="Cambria Math" panose="02040503050406030204" pitchFamily="18" charset="0"/>
                             </a:rPr>
                           </m:ctrlPr>
                         </m:sSubPr>
                         <m:e>
                           <m:r>
-                            <a:rPr lang="en-US" altLang="zh-CN" b="0" i="1" smtClean="0">
+                            <a:rPr lang="en-US" altLang="zh-CN" i="1">
                               <a:latin typeface="Cambria Math" panose="02040503050406030204" pitchFamily="18" charset="0"/>
                             </a:rPr>
                             <m:t>𝑥</m:t>
@@ -5874,15 +5874,15 @@
                             <m:rPr>
                               <m:sty m:val="p"/>
                             </m:rPr>
-                            <a:rPr lang="en-US" altLang="zh-CN" b="0" i="0" smtClean="0">
+                            <a:rPr lang="en-US" altLang="zh-CN">
                               <a:latin typeface="Cambria Math" panose="02040503050406030204" pitchFamily="18" charset="0"/>
                             </a:rPr>
-                            <m:t>A</m:t>
+                            <m:t>V</m:t>
                           </m:r>
                         </m:sub>
                       </m:sSub>
                       <m:r>
-                        <a:rPr lang="en-US" altLang="zh-CN" b="0" i="1" smtClean="0">
+                        <a:rPr lang="en-US" altLang="zh-CN" i="1">
                           <a:latin typeface="Cambria Math" panose="02040503050406030204" pitchFamily="18" charset="0"/>
                         </a:rPr>
                         <m:t>, </m:t>
@@ -5890,14 +5890,14 @@
                       <m:sSub>
                         <m:sSubPr>
                           <m:ctrlPr>
-                            <a:rPr lang="en-US" altLang="zh-CN" i="1" smtClean="0">
+                            <a:rPr lang="en-US" altLang="zh-CN" i="1">
                               <a:latin typeface="Cambria Math" panose="02040503050406030204" pitchFamily="18" charset="0"/>
                             </a:rPr>
                           </m:ctrlPr>
                         </m:sSubPr>
                         <m:e>
                           <m:r>
-                            <a:rPr lang="en-US" altLang="zh-CN" b="0" i="1" smtClean="0">
+                            <a:rPr lang="en-US" altLang="zh-CN" i="1">
                               <a:latin typeface="Cambria Math" panose="02040503050406030204" pitchFamily="18" charset="0"/>
                             </a:rPr>
                             <m:t>𝑥</m:t>
@@ -5908,15 +5908,15 @@
                             <m:rPr>
                               <m:sty m:val="p"/>
                             </m:rPr>
-                            <a:rPr lang="en-US" altLang="zh-CN" b="0" i="0" smtClean="0">
+                            <a:rPr lang="en-US" altLang="zh-CN">
                               <a:latin typeface="Cambria Math" panose="02040503050406030204" pitchFamily="18" charset="0"/>
                             </a:rPr>
-                            <m:t>V</m:t>
+                            <m:t>A</m:t>
                           </m:r>
                         </m:sub>
                       </m:sSub>
                       <m:r>
-                        <a:rPr lang="en-US" altLang="zh-CN" b="0" i="1" smtClean="0">
+                        <a:rPr lang="en-US" altLang="zh-CN" i="1">
                           <a:latin typeface="Cambria Math" panose="02040503050406030204" pitchFamily="18" charset="0"/>
                         </a:rPr>
                         <m:t>)</m:t>
@@ -5946,7 +5946,7 @@
             </p:nvSpPr>
             <p:spPr>
               <a:xfrm>
-                <a:off x="3652866" y="3955695"/>
+                <a:off x="3652866" y="4153296"/>
                 <a:ext cx="1929172" cy="369332"/>
               </a:xfrm>
               <a:prstGeom prst="rect">
@@ -5955,7 +5955,7 @@
               <a:blipFill>
                 <a:blip r:embed="rId15"/>
                 <a:stretch>
-                  <a:fillRect b="-13333"/>
+                  <a:fillRect b="-13115"/>
                 </a:stretch>
               </a:blipFill>
               <a:ln w="19050">
@@ -5991,7 +5991,7 @@
         </p:nvSpPr>
         <p:spPr>
           <a:xfrm>
-            <a:off x="6528344" y="3849680"/>
+            <a:off x="6528344" y="4047284"/>
             <a:ext cx="1625110" cy="601561"/>
           </a:xfrm>
           <a:prstGeom prst="roundRect">
@@ -6047,7 +6047,7 @@
             </p:nvSpPr>
             <p:spPr>
               <a:xfrm>
-                <a:off x="6465512" y="3972399"/>
+                <a:off x="6465512" y="4170000"/>
                 <a:ext cx="1791106" cy="369332"/>
               </a:xfrm>
               <a:prstGeom prst="rect">
@@ -6072,25 +6072,25 @@
                     </m:oMathParaPr>
                     <m:oMath xmlns:m="http://schemas.openxmlformats.org/officeDocument/2006/math">
                       <m:r>
-                        <a:rPr lang="en-US" altLang="zh-CN" b="0" i="1" smtClean="0">
+                        <a:rPr lang="en-US" altLang="zh-CN" i="1">
                           <a:latin typeface="Cambria Math" panose="02040503050406030204" pitchFamily="18" charset="0"/>
                         </a:rPr>
                         <m:t>𝑝</m:t>
                       </m:r>
                       <m:r>
-                        <a:rPr lang="en-US" altLang="zh-CN" b="0" i="1" smtClean="0">
+                        <a:rPr lang="en-US" altLang="zh-CN" i="1">
                           <a:latin typeface="Cambria Math" panose="02040503050406030204" pitchFamily="18" charset="0"/>
                         </a:rPr>
                         <m:t>(</m:t>
                       </m:r>
                       <m:r>
-                        <a:rPr lang="en-US" altLang="zh-CN" b="0" i="1" smtClean="0">
+                        <a:rPr lang="en-US" altLang="zh-CN" i="1">
                           <a:latin typeface="Cambria Math" panose="02040503050406030204" pitchFamily="18" charset="0"/>
                         </a:rPr>
                         <m:t>𝐶</m:t>
                       </m:r>
                       <m:r>
-                        <a:rPr lang="en-US" altLang="zh-CN" b="0" i="1" smtClean="0">
+                        <a:rPr lang="en-US" altLang="zh-CN" i="1">
                           <a:latin typeface="Cambria Math" panose="02040503050406030204" pitchFamily="18" charset="0"/>
                         </a:rPr>
                         <m:t>=2|</m:t>
@@ -6098,14 +6098,14 @@
                       <m:sSub>
                         <m:sSubPr>
                           <m:ctrlPr>
-                            <a:rPr lang="en-US" altLang="zh-CN" i="1" smtClean="0">
+                            <a:rPr lang="en-US" altLang="zh-CN" i="1">
                               <a:latin typeface="Cambria Math" panose="02040503050406030204" pitchFamily="18" charset="0"/>
                             </a:rPr>
                           </m:ctrlPr>
                         </m:sSubPr>
                         <m:e>
                           <m:r>
-                            <a:rPr lang="en-US" altLang="zh-CN" b="0" i="1" smtClean="0">
+                            <a:rPr lang="en-US" altLang="zh-CN" i="1">
                               <a:latin typeface="Cambria Math" panose="02040503050406030204" pitchFamily="18" charset="0"/>
                             </a:rPr>
                             <m:t>𝑥</m:t>
@@ -6116,15 +6116,15 @@
                             <m:rPr>
                               <m:sty m:val="p"/>
                             </m:rPr>
-                            <a:rPr lang="en-US" altLang="zh-CN" b="0" i="0" smtClean="0">
+                            <a:rPr lang="en-US" altLang="zh-CN">
                               <a:latin typeface="Cambria Math" panose="02040503050406030204" pitchFamily="18" charset="0"/>
                             </a:rPr>
-                            <m:t>A</m:t>
+                            <m:t>V</m:t>
                           </m:r>
                         </m:sub>
                       </m:sSub>
                       <m:r>
-                        <a:rPr lang="en-US" altLang="zh-CN" b="0" i="1" smtClean="0">
+                        <a:rPr lang="en-US" altLang="zh-CN" i="1">
                           <a:latin typeface="Cambria Math" panose="02040503050406030204" pitchFamily="18" charset="0"/>
                         </a:rPr>
                         <m:t>, </m:t>
@@ -6132,14 +6132,14 @@
                       <m:sSub>
                         <m:sSubPr>
                           <m:ctrlPr>
-                            <a:rPr lang="en-US" altLang="zh-CN" i="1" smtClean="0">
+                            <a:rPr lang="en-US" altLang="zh-CN" i="1">
                               <a:latin typeface="Cambria Math" panose="02040503050406030204" pitchFamily="18" charset="0"/>
                             </a:rPr>
                           </m:ctrlPr>
                         </m:sSubPr>
                         <m:e>
                           <m:r>
-                            <a:rPr lang="en-US" altLang="zh-CN" b="0" i="1" smtClean="0">
+                            <a:rPr lang="en-US" altLang="zh-CN" i="1">
                               <a:latin typeface="Cambria Math" panose="02040503050406030204" pitchFamily="18" charset="0"/>
                             </a:rPr>
                             <m:t>𝑥</m:t>
@@ -6150,15 +6150,15 @@
                             <m:rPr>
                               <m:sty m:val="p"/>
                             </m:rPr>
-                            <a:rPr lang="en-US" altLang="zh-CN" b="0" i="0" smtClean="0">
+                            <a:rPr lang="en-US" altLang="zh-CN">
                               <a:latin typeface="Cambria Math" panose="02040503050406030204" pitchFamily="18" charset="0"/>
                             </a:rPr>
-                            <m:t>V</m:t>
+                            <m:t>A</m:t>
                           </m:r>
                         </m:sub>
                       </m:sSub>
                       <m:r>
-                        <a:rPr lang="en-US" altLang="zh-CN" b="0" i="1" smtClean="0">
+                        <a:rPr lang="en-US" altLang="zh-CN" i="1">
                           <a:latin typeface="Cambria Math" panose="02040503050406030204" pitchFamily="18" charset="0"/>
                         </a:rPr>
                         <m:t>)</m:t>
@@ -6188,7 +6188,7 @@
             </p:nvSpPr>
             <p:spPr>
               <a:xfrm>
-                <a:off x="6465512" y="3972399"/>
+                <a:off x="6465512" y="4170000"/>
                 <a:ext cx="1791106" cy="369332"/>
               </a:xfrm>
               <a:prstGeom prst="rect">
@@ -6197,7 +6197,7 @@
               <a:blipFill>
                 <a:blip r:embed="rId16"/>
                 <a:stretch>
-                  <a:fillRect b="-13333"/>
+                  <a:fillRect b="-13115"/>
                 </a:stretch>
               </a:blipFill>
               <a:ln w="19050">
@@ -6235,7 +6235,7 @@
             </p:nvSpPr>
             <p:spPr>
               <a:xfrm>
-                <a:off x="2425605" y="6138137"/>
+                <a:off x="2425605" y="6335741"/>
                 <a:ext cx="530262" cy="461665"/>
               </a:xfrm>
               <a:prstGeom prst="rect">
@@ -6262,14 +6262,14 @@
                       <m:sSub>
                         <m:sSubPr>
                           <m:ctrlPr>
-                            <a:rPr lang="en-US" altLang="zh-CN" sz="2400" b="0" i="1" smtClean="0">
+                            <a:rPr lang="en-US" altLang="zh-CN" sz="2400" i="1">
                               <a:latin typeface="Cambria Math" panose="02040503050406030204" pitchFamily="18" charset="0"/>
                             </a:rPr>
                           </m:ctrlPr>
                         </m:sSubPr>
                         <m:e>
                           <m:r>
-                            <a:rPr lang="en-US" altLang="zh-CN" sz="2400" b="0" i="1" smtClean="0">
+                            <a:rPr lang="en-US" altLang="zh-CN" sz="2400" i="1">
                               <a:latin typeface="Cambria Math" panose="02040503050406030204" pitchFamily="18" charset="0"/>
                             </a:rPr>
                             <m:t>𝑟</m:t>
@@ -6280,7 +6280,7 @@
                             <m:rPr>
                               <m:sty m:val="p"/>
                             </m:rPr>
-                            <a:rPr lang="en-US" altLang="zh-CN" sz="2400" b="0" i="0" smtClean="0">
+                            <a:rPr lang="en-US" altLang="zh-CN" sz="2400">
                               <a:latin typeface="Cambria Math" panose="02040503050406030204" pitchFamily="18" charset="0"/>
                             </a:rPr>
                             <m:t>S</m:t>
@@ -6312,7 +6312,7 @@
             </p:nvSpPr>
             <p:spPr>
               <a:xfrm>
-                <a:off x="2425605" y="6138137"/>
+                <a:off x="2425605" y="6335741"/>
                 <a:ext cx="530262" cy="461665"/>
               </a:xfrm>
               <a:prstGeom prst="rect">
@@ -6321,7 +6321,7 @@
               <a:blipFill>
                 <a:blip r:embed="rId17"/>
                 <a:stretch>
-                  <a:fillRect b="-1316"/>
+                  <a:fillRect b="-2632"/>
                 </a:stretch>
               </a:blipFill>
               <a:ln w="19050">
@@ -6359,7 +6359,7 @@
             </p:nvSpPr>
             <p:spPr>
               <a:xfrm>
-                <a:off x="7146864" y="6132227"/>
+                <a:off x="7146864" y="6329831"/>
                 <a:ext cx="530262" cy="461665"/>
               </a:xfrm>
               <a:prstGeom prst="rect">
@@ -6386,14 +6386,14 @@
                       <m:sSub>
                         <m:sSubPr>
                           <m:ctrlPr>
-                            <a:rPr lang="en-US" altLang="zh-CN" sz="2400" b="0" i="1" smtClean="0">
+                            <a:rPr lang="en-US" altLang="zh-CN" sz="2400" i="1">
                               <a:latin typeface="Cambria Math" panose="02040503050406030204" pitchFamily="18" charset="0"/>
                             </a:rPr>
                           </m:ctrlPr>
                         </m:sSubPr>
                         <m:e>
                           <m:r>
-                            <a:rPr lang="en-US" altLang="zh-CN" sz="2400" i="1" smtClean="0">
+                            <a:rPr lang="en-US" altLang="zh-CN" sz="2400" i="1">
                               <a:latin typeface="Cambria Math" panose="02040503050406030204" pitchFamily="18" charset="0"/>
                             </a:rPr>
                             <m:t>𝑟</m:t>
@@ -6404,7 +6404,7 @@
                             <m:rPr>
                               <m:sty m:val="p"/>
                             </m:rPr>
-                            <a:rPr lang="en-US" altLang="zh-CN" sz="2400" b="0" i="0" smtClean="0">
+                            <a:rPr lang="en-US" altLang="zh-CN" sz="2400">
                               <a:latin typeface="Cambria Math" panose="02040503050406030204" pitchFamily="18" charset="0"/>
                             </a:rPr>
                             <m:t>S</m:t>
@@ -6436,7 +6436,7 @@
             </p:nvSpPr>
             <p:spPr>
               <a:xfrm>
-                <a:off x="7146864" y="6132227"/>
+                <a:off x="7146864" y="6329831"/>
                 <a:ext cx="530262" cy="461665"/>
               </a:xfrm>
               <a:prstGeom prst="rect">
@@ -6445,7 +6445,7 @@
               <a:blipFill>
                 <a:blip r:embed="rId18"/>
                 <a:stretch>
-                  <a:fillRect b="-1316"/>
+                  <a:fillRect b="-2632"/>
                 </a:stretch>
               </a:blipFill>
               <a:ln w="19050">
@@ -6481,7 +6481,7 @@
         </p:nvSpPr>
         <p:spPr>
           <a:xfrm>
-            <a:off x="4544918" y="5052217"/>
+            <a:off x="4544921" y="5249821"/>
             <a:ext cx="974339" cy="867825"/>
           </a:xfrm>
           <a:prstGeom prst="roundRect">
@@ -6533,7 +6533,7 @@
         </p:nvSpPr>
         <p:spPr>
           <a:xfrm>
-            <a:off x="5976013" y="5059608"/>
+            <a:off x="5976016" y="5257209"/>
             <a:ext cx="974339" cy="867826"/>
           </a:xfrm>
           <a:prstGeom prst="roundRect">
@@ -6585,7 +6585,7 @@
         </p:nvSpPr>
         <p:spPr>
           <a:xfrm>
-            <a:off x="7384351" y="5052217"/>
+            <a:off x="7384354" y="5249821"/>
             <a:ext cx="974339" cy="875217"/>
           </a:xfrm>
           <a:prstGeom prst="roundRect">
@@ -6637,7 +6637,7 @@
         </p:nvSpPr>
         <p:spPr>
           <a:xfrm>
-            <a:off x="4195179" y="4721054"/>
+            <a:off x="4195182" y="4918655"/>
             <a:ext cx="1719689" cy="338554"/>
           </a:xfrm>
           <a:prstGeom prst="rect">
@@ -6660,7 +6660,7 @@
                 <a:latin typeface="Arial" panose="020B0604020202020204" pitchFamily="34" charset="0"/>
                 <a:cs typeface="Arial" panose="020B0604020202020204" pitchFamily="34" charset="0"/>
               </a:rPr>
-              <a:t>Model Selection</a:t>
+              <a:t>MS</a:t>
             </a:r>
             <a:endParaRPr lang="zh-CN" altLang="en-US" sz="1600" dirty="0">
               <a:latin typeface="Arial" panose="020B0604020202020204" pitchFamily="34" charset="0"/>
@@ -6683,7 +6683,7 @@
         </p:nvSpPr>
         <p:spPr>
           <a:xfrm>
-            <a:off x="5591990" y="4713664"/>
+            <a:off x="5591993" y="4911265"/>
             <a:ext cx="1719689" cy="338554"/>
           </a:xfrm>
           <a:prstGeom prst="rect">
@@ -6706,7 +6706,7 @@
                 <a:latin typeface="Arial" panose="020B0604020202020204" pitchFamily="34" charset="0"/>
                 <a:cs typeface="Arial" panose="020B0604020202020204" pitchFamily="34" charset="0"/>
               </a:rPr>
-              <a:t>Model Avg</a:t>
+              <a:t>MA</a:t>
             </a:r>
             <a:endParaRPr lang="zh-CN" altLang="en-US" sz="1600" dirty="0">
               <a:latin typeface="Arial" panose="020B0604020202020204" pitchFamily="34" charset="0"/>
@@ -6729,7 +6729,7 @@
         </p:nvSpPr>
         <p:spPr>
           <a:xfrm>
-            <a:off x="6998673" y="4715452"/>
+            <a:off x="6998676" y="4913053"/>
             <a:ext cx="1719689" cy="338554"/>
           </a:xfrm>
           <a:prstGeom prst="rect">
@@ -6752,7 +6752,7 @@
                 <a:latin typeface="Arial" panose="020B0604020202020204" pitchFamily="34" charset="0"/>
                 <a:cs typeface="Arial" panose="020B0604020202020204" pitchFamily="34" charset="0"/>
               </a:rPr>
-              <a:t>Prob Selection</a:t>
+              <a:t>PM</a:t>
             </a:r>
             <a:endParaRPr lang="zh-CN" altLang="en-US" sz="1600" dirty="0">
               <a:latin typeface="Arial" panose="020B0604020202020204" pitchFamily="34" charset="0"/>
@@ -6761,8 +6761,8 @@
           </a:p>
         </p:txBody>
       </p:sp>
-      <mc:AlternateContent xmlns:mc="http://schemas.openxmlformats.org/markup-compatibility/2006" xmlns:a14="http://schemas.microsoft.com/office/drawing/2010/main">
-        <mc:Choice Requires="a14">
+      <mc:AlternateContent xmlns:mc="http://schemas.openxmlformats.org/markup-compatibility/2006">
+        <mc:Choice xmlns:a14="http://schemas.microsoft.com/office/drawing/2010/main" Requires="a14">
           <p:sp>
             <p:nvSpPr>
               <p:cNvPr id="437" name="TextBox 436">
@@ -6777,7 +6777,7 @@
             </p:nvSpPr>
             <p:spPr>
               <a:xfrm>
-                <a:off x="4538102" y="5158812"/>
+                <a:off x="4538102" y="5356416"/>
                 <a:ext cx="1057528" cy="584775"/>
               </a:xfrm>
               <a:prstGeom prst="rect">
@@ -6805,13 +6805,13 @@
                         <m:rPr>
                           <m:sty m:val="p"/>
                         </m:rPr>
-                        <a:rPr lang="en-US" altLang="zh-CN" sz="3200" i="1" dirty="0" smtClean="0">
+                        <a:rPr lang="en-US" altLang="zh-CN" sz="3200" i="1" dirty="0">
                           <a:latin typeface="Cambria Math" panose="02040503050406030204" pitchFamily="18" charset="0"/>
                         </a:rPr>
                         <m:t>max</m:t>
                       </m:r>
                       <m:r>
-                        <a:rPr lang="zh-CN" altLang="en-US" sz="3200" i="1" dirty="0" smtClean="0">
+                        <a:rPr lang="zh-CN" altLang="en-US" sz="3200" i="1" dirty="0">
                           <a:latin typeface="Cambria Math" panose="02040503050406030204" pitchFamily="18" charset="0"/>
                         </a:rPr>
                         <m:t>⁡</m:t>
@@ -6824,7 +6824,7 @@
             </p:txBody>
           </p:sp>
         </mc:Choice>
-        <mc:Fallback xmlns="">
+        <mc:Fallback>
           <p:sp>
             <p:nvSpPr>
               <p:cNvPr id="437" name="TextBox 436">
@@ -6841,14 +6841,14 @@
             </p:nvSpPr>
             <p:spPr>
               <a:xfrm>
-                <a:off x="4538102" y="5158812"/>
+                <a:off x="4538102" y="5356416"/>
                 <a:ext cx="1057528" cy="584775"/>
               </a:xfrm>
               <a:prstGeom prst="rect">
                 <a:avLst/>
               </a:prstGeom>
               <a:blipFill>
-                <a:blip r:embed="rId20"/>
+                <a:blip r:embed="rId19"/>
                 <a:stretch>
                   <a:fillRect/>
                 </a:stretch>
@@ -6872,8 +6872,8 @@
           </p:sp>
         </mc:Fallback>
       </mc:AlternateContent>
-      <mc:AlternateContent xmlns:mc="http://schemas.openxmlformats.org/markup-compatibility/2006" xmlns:a14="http://schemas.microsoft.com/office/drawing/2010/main">
-        <mc:Choice Requires="a14">
+      <mc:AlternateContent xmlns:mc="http://schemas.openxmlformats.org/markup-compatibility/2006">
+        <mc:Choice xmlns:a14="http://schemas.microsoft.com/office/drawing/2010/main" Requires="a14">
           <p:sp>
             <p:nvSpPr>
               <p:cNvPr id="438" name="TextBox 437">
@@ -6888,7 +6888,7 @@
             </p:nvSpPr>
             <p:spPr>
               <a:xfrm>
-                <a:off x="5901094" y="5077893"/>
+                <a:off x="5901094" y="5275497"/>
                 <a:ext cx="1057528" cy="830997"/>
               </a:xfrm>
               <a:prstGeom prst="rect">
@@ -6913,7 +6913,7 @@
                     </m:oMathParaPr>
                     <m:oMath xmlns:m="http://schemas.openxmlformats.org/officeDocument/2006/math">
                       <m:r>
-                        <a:rPr lang="zh-CN" altLang="en-US" sz="4800" i="1" dirty="0" smtClean="0">
+                        <a:rPr lang="zh-CN" altLang="en-US" sz="4800" i="1" dirty="0">
                           <a:latin typeface="Cambria Math" panose="02040503050406030204" pitchFamily="18" charset="0"/>
                         </a:rPr>
                         <m:t>⁡</m:t>
@@ -6922,7 +6922,7 @@
                         <m:rPr>
                           <m:sty m:val="p"/>
                         </m:rPr>
-                        <a:rPr lang="en-US" altLang="zh-CN" sz="4800" b="0" i="0" dirty="0" smtClean="0">
+                        <a:rPr lang="en-US" altLang="zh-CN" sz="4800" dirty="0">
                           <a:latin typeface="Cambria Math" panose="02040503050406030204" pitchFamily="18" charset="0"/>
                         </a:rPr>
                         <m:t>Σ</m:t>
@@ -6935,7 +6935,7 @@
             </p:txBody>
           </p:sp>
         </mc:Choice>
-        <mc:Fallback xmlns="">
+        <mc:Fallback>
           <p:sp>
             <p:nvSpPr>
               <p:cNvPr id="438" name="TextBox 437">
@@ -6952,14 +6952,14 @@
             </p:nvSpPr>
             <p:spPr>
               <a:xfrm>
-                <a:off x="5901094" y="5077893"/>
+                <a:off x="5901094" y="5275497"/>
                 <a:ext cx="1057528" cy="830997"/>
               </a:xfrm>
               <a:prstGeom prst="rect">
                 <a:avLst/>
               </a:prstGeom>
               <a:blipFill>
-                <a:blip r:embed="rId21"/>
+                <a:blip r:embed="rId20"/>
                 <a:stretch>
                   <a:fillRect/>
                 </a:stretch>
@@ -6998,13 +6998,13 @@
           <p:nvPr/>
         </p:nvPicPr>
         <p:blipFill>
-          <a:blip r:embed="rId22">
+          <a:blip r:embed="rId21">
             <a:extLst>
               <a:ext uri="{28A0092B-C50C-407E-A947-70E740481C1C}">
                 <a14:useLocalDpi xmlns:a14="http://schemas.microsoft.com/office/drawing/2010/main" val="0"/>
               </a:ext>
               <a:ext uri="{96DAC541-7B7A-43D3-8B79-37D633B846F1}">
-                <asvg:svgBlip xmlns:asvg="http://schemas.microsoft.com/office/drawing/2016/SVG/main" r:embed="rId23"/>
+                <asvg:svgBlip xmlns:asvg="http://schemas.microsoft.com/office/drawing/2016/SVG/main" r:embed="rId22"/>
               </a:ext>
             </a:extLst>
           </a:blip>
@@ -7014,7 +7014,7 @@
         </p:blipFill>
         <p:spPr>
           <a:xfrm>
-            <a:off x="7614002" y="5243040"/>
+            <a:off x="7614005" y="5440641"/>
             <a:ext cx="516489" cy="537484"/>
           </a:xfrm>
           <a:prstGeom prst="rect">
@@ -7039,7 +7039,7 @@
         </p:nvCxnSpPr>
         <p:spPr>
           <a:xfrm>
-            <a:off x="2683233" y="4415349"/>
+            <a:off x="2683236" y="4612950"/>
             <a:ext cx="10433" cy="1744208"/>
           </a:xfrm>
           <a:prstGeom prst="straightConnector1">
@@ -7085,7 +7085,7 @@
         </p:nvCxnSpPr>
         <p:spPr>
           <a:xfrm flipH="1">
-            <a:off x="4857381" y="632992"/>
+            <a:off x="4857384" y="830593"/>
             <a:ext cx="1298431" cy="421816"/>
           </a:xfrm>
           <a:prstGeom prst="straightConnector1">
@@ -7131,7 +7131,7 @@
         </p:nvCxnSpPr>
         <p:spPr>
           <a:xfrm>
-            <a:off x="6693023" y="632992"/>
+            <a:off x="6693023" y="830593"/>
             <a:ext cx="1241032" cy="439946"/>
           </a:xfrm>
           <a:prstGeom prst="straightConnector1">
@@ -7177,7 +7177,7 @@
         </p:nvCxnSpPr>
         <p:spPr>
           <a:xfrm>
-            <a:off x="7182199" y="1737569"/>
+            <a:off x="7182199" y="1935170"/>
             <a:ext cx="11556" cy="842466"/>
           </a:xfrm>
           <a:prstGeom prst="straightConnector1">
@@ -7222,7 +7222,7 @@
         </p:nvCxnSpPr>
         <p:spPr>
           <a:xfrm>
-            <a:off x="8431848" y="1737567"/>
+            <a:off x="8431848" y="1935171"/>
             <a:ext cx="5116" cy="843499"/>
           </a:xfrm>
           <a:prstGeom prst="straightConnector1">
@@ -7267,7 +7267,7 @@
         </p:nvCxnSpPr>
         <p:spPr>
           <a:xfrm flipH="1">
-            <a:off x="4400348" y="1700412"/>
+            <a:off x="4400351" y="1898013"/>
             <a:ext cx="455855" cy="880654"/>
           </a:xfrm>
           <a:prstGeom prst="straightConnector1">
@@ -7312,7 +7312,7 @@
         </p:nvCxnSpPr>
         <p:spPr>
           <a:xfrm>
-            <a:off x="5170494" y="1697971"/>
+            <a:off x="5170497" y="1895575"/>
             <a:ext cx="479675" cy="866291"/>
           </a:xfrm>
           <a:prstGeom prst="straightConnector1">
@@ -7357,7 +7357,7 @@
         </p:nvCxnSpPr>
         <p:spPr>
           <a:xfrm>
-            <a:off x="4363692" y="4450109"/>
+            <a:off x="4363692" y="4647713"/>
             <a:ext cx="0" cy="265469"/>
           </a:xfrm>
           <a:prstGeom prst="straightConnector1">
@@ -7402,7 +7402,7 @@
         </p:nvCxnSpPr>
         <p:spPr>
           <a:xfrm>
-            <a:off x="4350002" y="3101405"/>
+            <a:off x="4350002" y="3299009"/>
             <a:ext cx="0" cy="748275"/>
           </a:xfrm>
           <a:prstGeom prst="straightConnector1">
@@ -7447,7 +7447,7 @@
         </p:nvCxnSpPr>
         <p:spPr>
           <a:xfrm>
-            <a:off x="5739710" y="4479254"/>
+            <a:off x="5739710" y="4676858"/>
             <a:ext cx="0" cy="246955"/>
           </a:xfrm>
           <a:prstGeom prst="straightConnector1">
@@ -7492,7 +7492,7 @@
         </p:nvCxnSpPr>
         <p:spPr>
           <a:xfrm>
-            <a:off x="7133834" y="4463349"/>
+            <a:off x="7133834" y="4660950"/>
             <a:ext cx="0" cy="263168"/>
           </a:xfrm>
           <a:prstGeom prst="straightConnector1">
@@ -7537,7 +7537,7 @@
         </p:nvCxnSpPr>
         <p:spPr>
           <a:xfrm>
-            <a:off x="8505948" y="4485038"/>
+            <a:off x="8505948" y="4682642"/>
             <a:ext cx="0" cy="246955"/>
           </a:xfrm>
           <a:prstGeom prst="straightConnector1">
@@ -7582,7 +7582,7 @@
         </p:nvCxnSpPr>
         <p:spPr>
           <a:xfrm>
-            <a:off x="4451556" y="6026903"/>
+            <a:off x="4451559" y="6224507"/>
             <a:ext cx="656979" cy="285491"/>
           </a:xfrm>
           <a:prstGeom prst="straightConnector1">
@@ -7627,7 +7627,7 @@
         </p:nvCxnSpPr>
         <p:spPr>
           <a:xfrm flipH="1">
-            <a:off x="7633252" y="6026903"/>
+            <a:off x="7633255" y="6224504"/>
             <a:ext cx="814633" cy="259866"/>
           </a:xfrm>
           <a:prstGeom prst="straightConnector1">
@@ -7670,7 +7670,7 @@
         </p:nvSpPr>
         <p:spPr>
           <a:xfrm>
-            <a:off x="5539132" y="5263601"/>
+            <a:off x="5539135" y="5461202"/>
             <a:ext cx="415161" cy="400110"/>
           </a:xfrm>
           <a:prstGeom prst="rect">
@@ -7716,7 +7716,7 @@
         </p:nvSpPr>
         <p:spPr>
           <a:xfrm>
-            <a:off x="6960047" y="5259768"/>
+            <a:off x="6960050" y="5457369"/>
             <a:ext cx="415161" cy="400110"/>
           </a:xfrm>
           <a:prstGeom prst="rect">
@@ -7764,7 +7764,7 @@
             </p:nvSpPr>
             <p:spPr>
               <a:xfrm rot="1182294">
-                <a:off x="6804576" y="520824"/>
+                <a:off x="6804576" y="718425"/>
                 <a:ext cx="1250282" cy="338554"/>
               </a:xfrm>
               <a:prstGeom prst="rect">
@@ -7781,13 +7781,13 @@
                 <a14:m>
                   <m:oMath xmlns:m="http://schemas.openxmlformats.org/officeDocument/2006/math">
                     <m:r>
-                      <a:rPr lang="en-US" altLang="zh-CN" sz="1600" i="1" dirty="0" smtClean="0">
+                      <a:rPr lang="en-US" altLang="zh-CN" sz="1600" i="1" dirty="0">
                         <a:latin typeface="Cambria Math" panose="02040503050406030204" pitchFamily="18" charset="0"/>
                       </a:rPr>
                       <m:t>𝐶</m:t>
                     </m:r>
                     <m:r>
-                      <a:rPr lang="en-US" altLang="zh-CN" sz="1600" i="1" dirty="0" smtClean="0">
+                      <a:rPr lang="en-US" altLang="zh-CN" sz="1600" i="1" dirty="0">
                         <a:latin typeface="Cambria Math" panose="02040503050406030204" pitchFamily="18" charset="0"/>
                       </a:rPr>
                       <m:t>=2</m:t>
@@ -7833,16 +7833,16 @@
             </p:nvSpPr>
             <p:spPr>
               <a:xfrm rot="1182294">
-                <a:off x="6804576" y="520824"/>
+                <a:off x="6804576" y="718425"/>
                 <a:ext cx="1250282" cy="338554"/>
               </a:xfrm>
               <a:prstGeom prst="rect">
                 <a:avLst/>
               </a:prstGeom>
               <a:blipFill>
-                <a:blip r:embed="rId24"/>
+                <a:blip r:embed="rId23"/>
                 <a:stretch>
-                  <a:fillRect b="-820"/>
+                  <a:fillRect/>
                 </a:stretch>
               </a:blipFill>
             </p:spPr>
@@ -7877,7 +7877,7 @@
             </p:nvSpPr>
             <p:spPr>
               <a:xfrm rot="20581084">
-                <a:off x="4895823" y="414113"/>
+                <a:off x="4895823" y="611714"/>
                 <a:ext cx="1540214" cy="338554"/>
               </a:xfrm>
               <a:prstGeom prst="rect">
@@ -7894,13 +7894,13 @@
                 <a14:m>
                   <m:oMath xmlns:m="http://schemas.openxmlformats.org/officeDocument/2006/math">
                     <m:r>
-                      <a:rPr lang="en-US" altLang="zh-CN" sz="1600" i="1" dirty="0" smtClean="0">
+                      <a:rPr lang="en-US" altLang="zh-CN" sz="1600" i="1" dirty="0">
                         <a:latin typeface="Cambria Math" panose="02040503050406030204" pitchFamily="18" charset="0"/>
                       </a:rPr>
                       <m:t>𝐶</m:t>
                     </m:r>
                     <m:r>
-                      <a:rPr lang="en-US" altLang="zh-CN" sz="1600" i="1" dirty="0" smtClean="0">
+                      <a:rPr lang="en-US" altLang="zh-CN" sz="1600" i="1" dirty="0">
                         <a:latin typeface="Cambria Math" panose="02040503050406030204" pitchFamily="18" charset="0"/>
                       </a:rPr>
                       <m:t>=1</m:t>
@@ -7946,14 +7946,14 @@
             </p:nvSpPr>
             <p:spPr>
               <a:xfrm rot="20581084">
-                <a:off x="4895823" y="414113"/>
+                <a:off x="4895823" y="611714"/>
                 <a:ext cx="1540214" cy="338554"/>
               </a:xfrm>
               <a:prstGeom prst="rect">
                 <a:avLst/>
               </a:prstGeom>
               <a:blipFill>
-                <a:blip r:embed="rId25"/>
+                <a:blip r:embed="rId24"/>
                 <a:stretch>
                   <a:fillRect/>
                 </a:stretch>
@@ -7988,7 +7988,7 @@
         </p:nvSpPr>
         <p:spPr>
           <a:xfrm>
-            <a:off x="228074" y="1427396"/>
+            <a:off x="228077" y="1624997"/>
             <a:ext cx="1326249" cy="1233628"/>
           </a:xfrm>
           <a:prstGeom prst="roundRect">
@@ -8044,7 +8044,7 @@
         </p:nvCxnSpPr>
         <p:spPr>
           <a:xfrm flipH="1">
-            <a:off x="359792" y="2404506"/>
+            <a:off x="359792" y="2602107"/>
             <a:ext cx="1062812" cy="0"/>
           </a:xfrm>
           <a:prstGeom prst="line">
@@ -8083,7 +8083,7 @@
         </p:nvCxnSpPr>
         <p:spPr>
           <a:xfrm flipV="1">
-            <a:off x="340840" y="2098108"/>
+            <a:off x="340843" y="2295709"/>
             <a:ext cx="1053125" cy="212"/>
           </a:xfrm>
           <a:prstGeom prst="line">
@@ -8119,12 +8119,14 @@
               </a:ext>
             </a:extLst>
           </p:cNvPr>
-          <p:cNvCxnSpPr/>
+          <p:cNvCxnSpPr>
+            <a:cxnSpLocks/>
+          </p:cNvCxnSpPr>
           <p:nvPr/>
         </p:nvCxnSpPr>
         <p:spPr>
           <a:xfrm flipV="1">
-            <a:off x="886214" y="2410512"/>
+            <a:off x="886214" y="2608113"/>
             <a:ext cx="0" cy="40518"/>
           </a:xfrm>
           <a:prstGeom prst="line">
@@ -8165,7 +8167,7 @@
         </p:nvSpPr>
         <p:spPr>
           <a:xfrm>
-            <a:off x="-161396" y="1852013"/>
+            <a:off x="-161396" y="2049615"/>
             <a:ext cx="1044308" cy="863121"/>
           </a:xfrm>
           <a:prstGeom prst="arc">
@@ -8214,7 +8216,7 @@
         </p:nvSpPr>
         <p:spPr>
           <a:xfrm flipH="1">
-            <a:off x="889349" y="1852013"/>
+            <a:off x="889349" y="2049617"/>
             <a:ext cx="1044308" cy="863121"/>
           </a:xfrm>
           <a:prstGeom prst="arc">
@@ -8258,12 +8260,14 @@
               </a:ext>
             </a:extLst>
           </p:cNvPr>
-          <p:cNvCxnSpPr/>
+          <p:cNvCxnSpPr>
+            <a:cxnSpLocks/>
+          </p:cNvCxnSpPr>
           <p:nvPr/>
         </p:nvCxnSpPr>
         <p:spPr>
           <a:xfrm flipV="1">
-            <a:off x="371929" y="2416823"/>
+            <a:off x="371929" y="2614424"/>
             <a:ext cx="0" cy="40518"/>
           </a:xfrm>
           <a:prstGeom prst="line">
@@ -8299,12 +8303,14 @@
               </a:ext>
             </a:extLst>
           </p:cNvPr>
-          <p:cNvCxnSpPr/>
+          <p:cNvCxnSpPr>
+            <a:cxnSpLocks/>
+          </p:cNvCxnSpPr>
           <p:nvPr/>
         </p:nvCxnSpPr>
         <p:spPr>
           <a:xfrm flipV="1">
-            <a:off x="1408256" y="2412315"/>
+            <a:off x="1408256" y="2609916"/>
             <a:ext cx="0" cy="40518"/>
           </a:xfrm>
           <a:prstGeom prst="line">
@@ -8347,7 +8353,7 @@
             </p:nvSpPr>
             <p:spPr>
               <a:xfrm>
-                <a:off x="572559" y="1408616"/>
+                <a:off x="572559" y="1606217"/>
                 <a:ext cx="639416" cy="400110"/>
               </a:xfrm>
               <a:prstGeom prst="rect">
@@ -8369,25 +8375,25 @@
                     </m:oMathParaPr>
                     <m:oMath xmlns:m="http://schemas.openxmlformats.org/officeDocument/2006/math">
                       <m:r>
-                        <a:rPr lang="en-US" altLang="zh-CN" sz="2000" b="0" i="1" smtClean="0">
+                        <a:rPr lang="en-US" altLang="zh-CN" sz="2000" i="1">
                           <a:latin typeface="Cambria Math" panose="02040503050406030204" pitchFamily="18" charset="0"/>
                         </a:rPr>
                         <m:t>𝜎</m:t>
                       </m:r>
                       <m:r>
-                        <a:rPr lang="en-US" altLang="zh-CN" sz="2000" b="0" i="1" smtClean="0">
+                        <a:rPr lang="en-US" altLang="zh-CN" sz="2000" i="1">
                           <a:latin typeface="Cambria Math" panose="02040503050406030204" pitchFamily="18" charset="0"/>
                         </a:rPr>
                         <m:t>(</m:t>
                       </m:r>
                       <m:r>
-                        <a:rPr lang="en-US" altLang="zh-CN" sz="2000" b="0" i="1" smtClean="0">
+                        <a:rPr lang="en-US" altLang="zh-CN" sz="2000" i="1">
                           <a:latin typeface="Cambria Math" panose="02040503050406030204" pitchFamily="18" charset="0"/>
                         </a:rPr>
                         <m:t>𝑠</m:t>
                       </m:r>
                       <m:r>
-                        <a:rPr lang="en-US" altLang="zh-CN" sz="2000" b="0" i="1" smtClean="0">
+                        <a:rPr lang="en-US" altLang="zh-CN" sz="2000" i="1">
                           <a:latin typeface="Cambria Math" panose="02040503050406030204" pitchFamily="18" charset="0"/>
                         </a:rPr>
                         <m:t>)</m:t>
@@ -8417,14 +8423,14 @@
             </p:nvSpPr>
             <p:spPr>
               <a:xfrm>
-                <a:off x="572559" y="1408616"/>
+                <a:off x="572559" y="1606217"/>
                 <a:ext cx="639416" cy="400110"/>
               </a:xfrm>
               <a:prstGeom prst="rect">
                 <a:avLst/>
               </a:prstGeom>
               <a:blipFill>
-                <a:blip r:embed="rId26"/>
+                <a:blip r:embed="rId25"/>
                 <a:stretch>
                   <a:fillRect r="-9524" b="-15152"/>
                 </a:stretch>
@@ -8459,7 +8465,7 @@
         </p:nvSpPr>
         <p:spPr>
           <a:xfrm>
-            <a:off x="262029" y="2414337"/>
+            <a:off x="262029" y="2611941"/>
             <a:ext cx="1335994" cy="276999"/>
           </a:xfrm>
           <a:prstGeom prst="rect">
@@ -8478,22 +8484,7 @@
                 <a:latin typeface="Arial" panose="020B0604020202020204" pitchFamily="34" charset="0"/>
                 <a:cs typeface="Arial" panose="020B0604020202020204" pitchFamily="34" charset="0"/>
               </a:rPr>
-              <a:t>-45°     0°</a:t>
-            </a:r>
-            <a:r>
-              <a:rPr lang="en-US" altLang="zh-CN" sz="1200" b="0" i="0" u="none" strike="noStrike" dirty="0">
-                <a:effectLst/>
-                <a:latin typeface="Arial" panose="020B0604020202020204" pitchFamily="34" charset="0"/>
-                <a:cs typeface="Arial" panose="020B0604020202020204" pitchFamily="34" charset="0"/>
-              </a:rPr>
-              <a:t>     </a:t>
-            </a:r>
-            <a:r>
-              <a:rPr lang="en-US" altLang="zh-CN" sz="1200" dirty="0">
-                <a:latin typeface="Arial" panose="020B0604020202020204" pitchFamily="34" charset="0"/>
-                <a:cs typeface="Arial" panose="020B0604020202020204" pitchFamily="34" charset="0"/>
-              </a:rPr>
-              <a:t>45°</a:t>
+              <a:t>-45°     0°     45°</a:t>
             </a:r>
           </a:p>
         </p:txBody>
@@ -8512,7 +8503,7 @@
         </p:nvSpPr>
         <p:spPr>
           <a:xfrm>
-            <a:off x="247255" y="2952821"/>
+            <a:off x="247258" y="3150422"/>
             <a:ext cx="1326249" cy="1233628"/>
           </a:xfrm>
           <a:prstGeom prst="roundRect">
@@ -8568,7 +8559,7 @@
         </p:nvCxnSpPr>
         <p:spPr>
           <a:xfrm flipH="1">
-            <a:off x="378973" y="3927943"/>
+            <a:off x="378973" y="4125544"/>
             <a:ext cx="1062812" cy="0"/>
           </a:xfrm>
           <a:prstGeom prst="line">
@@ -8600,12 +8591,14 @@
               </a:ext>
             </a:extLst>
           </p:cNvPr>
-          <p:cNvCxnSpPr/>
+          <p:cNvCxnSpPr>
+            <a:cxnSpLocks/>
+          </p:cNvCxnSpPr>
           <p:nvPr/>
         </p:nvCxnSpPr>
         <p:spPr>
           <a:xfrm flipV="1">
-            <a:off x="903457" y="3935937"/>
+            <a:off x="903457" y="4133538"/>
             <a:ext cx="0" cy="40518"/>
           </a:xfrm>
           <a:prstGeom prst="line">
@@ -8641,12 +8634,14 @@
               </a:ext>
             </a:extLst>
           </p:cNvPr>
-          <p:cNvCxnSpPr/>
+          <p:cNvCxnSpPr>
+            <a:cxnSpLocks/>
+          </p:cNvCxnSpPr>
           <p:nvPr/>
         </p:nvCxnSpPr>
         <p:spPr>
           <a:xfrm flipV="1">
-            <a:off x="392767" y="3935620"/>
+            <a:off x="392767" y="4133221"/>
             <a:ext cx="0" cy="40518"/>
           </a:xfrm>
           <a:prstGeom prst="line">
@@ -8682,12 +8677,14 @@
               </a:ext>
             </a:extLst>
           </p:cNvPr>
-          <p:cNvCxnSpPr/>
+          <p:cNvCxnSpPr>
+            <a:cxnSpLocks/>
+          </p:cNvCxnSpPr>
           <p:nvPr/>
         </p:nvCxnSpPr>
         <p:spPr>
           <a:xfrm flipV="1">
-            <a:off x="1427437" y="3937740"/>
+            <a:off x="1427437" y="4135341"/>
             <a:ext cx="0" cy="40518"/>
           </a:xfrm>
           <a:prstGeom prst="line">
@@ -8730,7 +8727,7 @@
             </p:nvSpPr>
             <p:spPr>
               <a:xfrm>
-                <a:off x="598269" y="2949318"/>
+                <a:off x="598269" y="3146919"/>
                 <a:ext cx="639416" cy="400110"/>
               </a:xfrm>
               <a:prstGeom prst="rect">
@@ -8752,25 +8749,25 @@
                     </m:oMathParaPr>
                     <m:oMath xmlns:m="http://schemas.openxmlformats.org/officeDocument/2006/math">
                       <m:r>
-                        <a:rPr lang="en-US" altLang="zh-CN" sz="2000" b="0" i="1" smtClean="0">
+                        <a:rPr lang="en-US" altLang="zh-CN" sz="2000" i="1">
                           <a:latin typeface="Cambria Math" panose="02040503050406030204" pitchFamily="18" charset="0"/>
                         </a:rPr>
                         <m:t>𝑝</m:t>
                       </m:r>
                       <m:r>
-                        <a:rPr lang="en-US" altLang="zh-CN" sz="2000" b="0" i="1" smtClean="0">
+                        <a:rPr lang="en-US" altLang="zh-CN" sz="2000" i="1">
                           <a:latin typeface="Cambria Math" panose="02040503050406030204" pitchFamily="18" charset="0"/>
                         </a:rPr>
                         <m:t>(</m:t>
                       </m:r>
                       <m:r>
-                        <a:rPr lang="en-US" altLang="zh-CN" sz="2000" b="0" i="1" smtClean="0">
+                        <a:rPr lang="en-US" altLang="zh-CN" sz="2000" i="1">
                           <a:latin typeface="Cambria Math" panose="02040503050406030204" pitchFamily="18" charset="0"/>
                         </a:rPr>
                         <m:t>𝑠</m:t>
                       </m:r>
                       <m:r>
-                        <a:rPr lang="en-US" altLang="zh-CN" sz="2000" b="0" i="1" smtClean="0">
+                        <a:rPr lang="en-US" altLang="zh-CN" sz="2000" i="1">
                           <a:latin typeface="Cambria Math" panose="02040503050406030204" pitchFamily="18" charset="0"/>
                         </a:rPr>
                         <m:t>)</m:t>
@@ -8800,16 +8797,16 @@
             </p:nvSpPr>
             <p:spPr>
               <a:xfrm>
-                <a:off x="598269" y="2949318"/>
+                <a:off x="598269" y="3146919"/>
                 <a:ext cx="639416" cy="400110"/>
               </a:xfrm>
               <a:prstGeom prst="rect">
                 <a:avLst/>
               </a:prstGeom>
               <a:blipFill>
-                <a:blip r:embed="rId27"/>
+                <a:blip r:embed="rId26"/>
                 <a:stretch>
-                  <a:fillRect r="-7619" b="-15385"/>
+                  <a:fillRect r="-7619" b="-15152"/>
                 </a:stretch>
               </a:blipFill>
             </p:spPr>
@@ -8842,7 +8839,7 @@
         </p:nvSpPr>
         <p:spPr>
           <a:xfrm>
-            <a:off x="277912" y="3942942"/>
+            <a:off x="277912" y="4140546"/>
             <a:ext cx="1335994" cy="276999"/>
           </a:xfrm>
           <a:prstGeom prst="rect">
@@ -8861,22 +8858,7 @@
                 <a:latin typeface="Arial" panose="020B0604020202020204" pitchFamily="34" charset="0"/>
                 <a:cs typeface="Arial" panose="020B0604020202020204" pitchFamily="34" charset="0"/>
               </a:rPr>
-              <a:t>-45°     0°</a:t>
-            </a:r>
-            <a:r>
-              <a:rPr lang="en-US" altLang="zh-CN" sz="1200" b="0" i="0" u="none" strike="noStrike" dirty="0">
-                <a:effectLst/>
-                <a:latin typeface="Arial" panose="020B0604020202020204" pitchFamily="34" charset="0"/>
-                <a:cs typeface="Arial" panose="020B0604020202020204" pitchFamily="34" charset="0"/>
-              </a:rPr>
-              <a:t>     </a:t>
-            </a:r>
-            <a:r>
-              <a:rPr lang="en-US" altLang="zh-CN" sz="1200" dirty="0">
-                <a:latin typeface="Arial" panose="020B0604020202020204" pitchFamily="34" charset="0"/>
-                <a:cs typeface="Arial" panose="020B0604020202020204" pitchFamily="34" charset="0"/>
-              </a:rPr>
-              <a:t>45°</a:t>
+              <a:t>-45°     0°     45°</a:t>
             </a:r>
           </a:p>
         </p:txBody>
@@ -8895,7 +8877,7 @@
         </p:nvSpPr>
         <p:spPr>
           <a:xfrm>
-            <a:off x="254639" y="4426249"/>
+            <a:off x="254642" y="4623853"/>
             <a:ext cx="1326249" cy="2294345"/>
           </a:xfrm>
           <a:prstGeom prst="roundRect">
@@ -8951,7 +8933,7 @@
         </p:nvCxnSpPr>
         <p:spPr>
           <a:xfrm flipH="1">
-            <a:off x="386357" y="5424454"/>
+            <a:off x="386357" y="5622055"/>
             <a:ext cx="1062812" cy="0"/>
           </a:xfrm>
           <a:prstGeom prst="line">
@@ -8983,12 +8965,14 @@
               </a:ext>
             </a:extLst>
           </p:cNvPr>
-          <p:cNvCxnSpPr/>
+          <p:cNvCxnSpPr>
+            <a:cxnSpLocks/>
+          </p:cNvCxnSpPr>
           <p:nvPr/>
         </p:nvCxnSpPr>
         <p:spPr>
           <a:xfrm flipV="1">
-            <a:off x="912779" y="5424496"/>
+            <a:off x="912779" y="5622097"/>
             <a:ext cx="0" cy="40518"/>
           </a:xfrm>
           <a:prstGeom prst="line">
@@ -9024,12 +9008,14 @@
               </a:ext>
             </a:extLst>
           </p:cNvPr>
-          <p:cNvCxnSpPr/>
+          <p:cNvCxnSpPr>
+            <a:cxnSpLocks/>
+          </p:cNvCxnSpPr>
           <p:nvPr/>
         </p:nvCxnSpPr>
         <p:spPr>
           <a:xfrm flipV="1">
-            <a:off x="398957" y="5424843"/>
+            <a:off x="398957" y="5622444"/>
             <a:ext cx="0" cy="40518"/>
           </a:xfrm>
           <a:prstGeom prst="line">
@@ -9056,8 +9042,8 @@
           </a:fontRef>
         </p:style>
       </p:cxnSp>
-      <mc:AlternateContent xmlns:mc="http://schemas.openxmlformats.org/markup-compatibility/2006" xmlns:a14="http://schemas.microsoft.com/office/drawing/2010/main">
-        <mc:Choice Requires="a14">
+      <mc:AlternateContent xmlns:mc="http://schemas.openxmlformats.org/markup-compatibility/2006">
+        <mc:Choice xmlns:a14="http://schemas.microsoft.com/office/drawing/2010/main" Requires="a14">
           <p:sp>
             <p:nvSpPr>
               <p:cNvPr id="483" name="TextBox 482">
@@ -9072,7 +9058,7 @@
             </p:nvSpPr>
             <p:spPr>
               <a:xfrm>
-                <a:off x="246110" y="5426162"/>
+                <a:off x="246110" y="5623766"/>
                 <a:ext cx="1335994" cy="307777"/>
               </a:xfrm>
               <a:prstGeom prst="rect">
@@ -9097,7 +9083,7 @@
                         <m:accPr>
                           <m:chr m:val="̂"/>
                           <m:ctrlPr>
-                            <a:rPr lang="en-US" altLang="zh-CN" sz="1400" i="1" smtClean="0">
+                            <a:rPr lang="en-US" altLang="zh-CN" sz="1400" i="1">
                               <a:latin typeface="Cambria Math" panose="02040503050406030204" pitchFamily="18" charset="0"/>
                               <a:cs typeface="Arial" panose="020B0604020202020204" pitchFamily="34" charset="0"/>
                             </a:rPr>
@@ -9105,7 +9091,7 @@
                         </m:accPr>
                         <m:e>
                           <m:r>
-                            <a:rPr lang="en-US" altLang="zh-CN" sz="1400" b="0" i="1" smtClean="0">
+                            <a:rPr lang="en-US" altLang="zh-CN" sz="1400" i="1">
                               <a:latin typeface="Cambria Math" panose="02040503050406030204" pitchFamily="18" charset="0"/>
                               <a:cs typeface="Arial" panose="020B0604020202020204" pitchFamily="34" charset="0"/>
                             </a:rPr>
@@ -9124,7 +9110,7 @@
             </p:txBody>
           </p:sp>
         </mc:Choice>
-        <mc:Fallback xmlns="">
+        <mc:Fallback>
           <p:sp>
             <p:nvSpPr>
               <p:cNvPr id="483" name="TextBox 482">
@@ -9141,14 +9127,14 @@
             </p:nvSpPr>
             <p:spPr>
               <a:xfrm>
-                <a:off x="246110" y="5426162"/>
+                <a:off x="246110" y="5623766"/>
                 <a:ext cx="1335994" cy="307777"/>
               </a:xfrm>
               <a:prstGeom prst="rect">
                 <a:avLst/>
               </a:prstGeom>
               <a:blipFill>
-                <a:blip r:embed="rId28"/>
+                <a:blip r:embed="rId27"/>
                 <a:stretch>
                   <a:fillRect/>
                 </a:stretch>
@@ -9178,12 +9164,14 @@
               </a:ext>
             </a:extLst>
           </p:cNvPr>
-          <p:cNvCxnSpPr/>
+          <p:cNvCxnSpPr>
+            <a:cxnSpLocks/>
+          </p:cNvCxnSpPr>
           <p:nvPr/>
         </p:nvCxnSpPr>
         <p:spPr>
           <a:xfrm flipV="1">
-            <a:off x="1435284" y="5426299"/>
+            <a:off x="1435284" y="5623900"/>
             <a:ext cx="0" cy="40518"/>
           </a:xfrm>
           <a:prstGeom prst="line">
@@ -9210,8 +9198,8 @@
           </a:fontRef>
         </p:style>
       </p:cxnSp>
-      <mc:AlternateContent xmlns:mc="http://schemas.openxmlformats.org/markup-compatibility/2006" xmlns:a14="http://schemas.microsoft.com/office/drawing/2010/main">
-        <mc:Choice Requires="a14">
+      <mc:AlternateContent xmlns:mc="http://schemas.openxmlformats.org/markup-compatibility/2006">
+        <mc:Choice xmlns:a14="http://schemas.microsoft.com/office/drawing/2010/main" Requires="a14">
           <p:sp>
             <p:nvSpPr>
               <p:cNvPr id="485" name="TextBox 484">
@@ -9226,7 +9214,7 @@
             </p:nvSpPr>
             <p:spPr>
               <a:xfrm>
-                <a:off x="501060" y="4386696"/>
+                <a:off x="501060" y="4584297"/>
                 <a:ext cx="639416" cy="400110"/>
               </a:xfrm>
               <a:prstGeom prst="rect">
@@ -9250,14 +9238,14 @@
                       <m:sSub>
                         <m:sSubPr>
                           <m:ctrlPr>
-                            <a:rPr lang="en-US" altLang="zh-CN" sz="2000" i="1" smtClean="0">
+                            <a:rPr lang="en-US" altLang="zh-CN" sz="2000" i="1">
                               <a:latin typeface="Cambria Math" panose="02040503050406030204" pitchFamily="18" charset="0"/>
                             </a:rPr>
                           </m:ctrlPr>
                         </m:sSubPr>
                         <m:e>
                           <m:r>
-                            <a:rPr lang="en-US" altLang="zh-CN" sz="2000" b="0" i="1" smtClean="0">
+                            <a:rPr lang="en-US" altLang="zh-CN" sz="2000" i="1">
                               <a:latin typeface="Cambria Math" panose="02040503050406030204" pitchFamily="18" charset="0"/>
                             </a:rPr>
                             <m:t>𝜎</m:t>
@@ -9268,7 +9256,7 @@
                             <m:rPr>
                               <m:sty m:val="p"/>
                             </m:rPr>
-                            <a:rPr lang="en-US" altLang="zh-CN" sz="2000" b="0" i="0" smtClean="0">
+                            <a:rPr lang="en-US" altLang="zh-CN" sz="2000">
                               <a:latin typeface="Cambria Math" panose="02040503050406030204" pitchFamily="18" charset="0"/>
                             </a:rPr>
                             <m:t>motor</m:t>
@@ -9283,7 +9271,7 @@
             </p:txBody>
           </p:sp>
         </mc:Choice>
-        <mc:Fallback xmlns="">
+        <mc:Fallback>
           <p:sp>
             <p:nvSpPr>
               <p:cNvPr id="485" name="TextBox 484">
@@ -9300,14 +9288,14 @@
             </p:nvSpPr>
             <p:spPr>
               <a:xfrm>
-                <a:off x="501060" y="4386696"/>
+                <a:off x="501060" y="4584297"/>
                 <a:ext cx="639416" cy="400110"/>
               </a:xfrm>
               <a:prstGeom prst="rect">
                 <a:avLst/>
               </a:prstGeom>
               <a:blipFill>
-                <a:blip r:embed="rId29"/>
+                <a:blip r:embed="rId28"/>
                 <a:stretch>
                   <a:fillRect r="-32381"/>
                 </a:stretch>
@@ -9344,7 +9332,7 @@
         </p:nvCxnSpPr>
         <p:spPr>
           <a:xfrm flipH="1">
-            <a:off x="387541" y="6400896"/>
+            <a:off x="387541" y="6598497"/>
             <a:ext cx="1062812" cy="0"/>
           </a:xfrm>
           <a:prstGeom prst="line">
@@ -9376,12 +9364,14 @@
               </a:ext>
             </a:extLst>
           </p:cNvPr>
-          <p:cNvCxnSpPr/>
+          <p:cNvCxnSpPr>
+            <a:cxnSpLocks/>
+          </p:cNvCxnSpPr>
           <p:nvPr/>
         </p:nvCxnSpPr>
         <p:spPr>
           <a:xfrm flipV="1">
-            <a:off x="912025" y="6398707"/>
+            <a:off x="912025" y="6596308"/>
             <a:ext cx="0" cy="40518"/>
           </a:xfrm>
           <a:prstGeom prst="line">
@@ -9417,12 +9407,14 @@
               </a:ext>
             </a:extLst>
           </p:cNvPr>
-          <p:cNvCxnSpPr/>
+          <p:cNvCxnSpPr>
+            <a:cxnSpLocks/>
+          </p:cNvCxnSpPr>
           <p:nvPr/>
         </p:nvCxnSpPr>
         <p:spPr>
           <a:xfrm flipV="1">
-            <a:off x="400784" y="6403273"/>
+            <a:off x="400784" y="6600874"/>
             <a:ext cx="0" cy="40518"/>
           </a:xfrm>
           <a:prstGeom prst="line">
@@ -9458,12 +9450,14 @@
               </a:ext>
             </a:extLst>
           </p:cNvPr>
-          <p:cNvCxnSpPr/>
+          <p:cNvCxnSpPr>
+            <a:cxnSpLocks/>
+          </p:cNvCxnSpPr>
           <p:nvPr/>
         </p:nvCxnSpPr>
         <p:spPr>
           <a:xfrm flipV="1">
-            <a:off x="1435674" y="6398765"/>
+            <a:off x="1435674" y="6596366"/>
             <a:ext cx="0" cy="40518"/>
           </a:xfrm>
           <a:prstGeom prst="line">
@@ -9490,8 +9484,8 @@
           </a:fontRef>
         </p:style>
       </p:cxnSp>
-      <mc:AlternateContent xmlns:mc="http://schemas.openxmlformats.org/markup-compatibility/2006" xmlns:a14="http://schemas.microsoft.com/office/drawing/2010/main">
-        <mc:Choice Requires="a14">
+      <mc:AlternateContent xmlns:mc="http://schemas.openxmlformats.org/markup-compatibility/2006">
+        <mc:Choice xmlns:a14="http://schemas.microsoft.com/office/drawing/2010/main" Requires="a14">
           <p:sp>
             <p:nvSpPr>
               <p:cNvPr id="490" name="TextBox 489">
@@ -9506,7 +9500,7 @@
             </p:nvSpPr>
             <p:spPr>
               <a:xfrm>
-                <a:off x="576001" y="5807788"/>
+                <a:off x="576001" y="6005389"/>
                 <a:ext cx="639416" cy="400110"/>
               </a:xfrm>
               <a:prstGeom prst="rect">
@@ -9528,7 +9522,7 @@
                     </m:oMathParaPr>
                     <m:oMath xmlns:m="http://schemas.openxmlformats.org/officeDocument/2006/math">
                       <m:r>
-                        <a:rPr lang="en-US" altLang="zh-CN" sz="2000" b="0" i="1" smtClean="0">
+                        <a:rPr lang="en-US" altLang="zh-CN" sz="2000" i="1">
                           <a:latin typeface="Cambria Math" panose="02040503050406030204" pitchFamily="18" charset="0"/>
                         </a:rPr>
                         <m:t>𝜆</m:t>
@@ -9541,7 +9535,7 @@
             </p:txBody>
           </p:sp>
         </mc:Choice>
-        <mc:Fallback xmlns="">
+        <mc:Fallback>
           <p:sp>
             <p:nvSpPr>
               <p:cNvPr id="490" name="TextBox 489">
@@ -9558,14 +9552,14 @@
             </p:nvSpPr>
             <p:spPr>
               <a:xfrm>
-                <a:off x="576001" y="5807788"/>
+                <a:off x="576001" y="6005389"/>
                 <a:ext cx="639416" cy="400110"/>
               </a:xfrm>
               <a:prstGeom prst="rect">
                 <a:avLst/>
               </a:prstGeom>
               <a:blipFill>
-                <a:blip r:embed="rId30"/>
+                <a:blip r:embed="rId29"/>
                 <a:stretch>
                   <a:fillRect/>
                 </a:stretch>
@@ -9602,7 +9596,7 @@
         </p:nvCxnSpPr>
         <p:spPr>
           <a:xfrm flipV="1">
-            <a:off x="381678" y="6286769"/>
+            <a:off x="381681" y="6484370"/>
             <a:ext cx="1053125" cy="212"/>
           </a:xfrm>
           <a:prstGeom prst="line">
@@ -9643,7 +9637,7 @@
         </p:nvSpPr>
         <p:spPr>
           <a:xfrm>
-            <a:off x="289248" y="6401558"/>
+            <a:off x="289248" y="6599162"/>
             <a:ext cx="1335994" cy="276999"/>
           </a:xfrm>
           <a:prstGeom prst="rect">
@@ -9662,28 +9656,13 @@
                 <a:latin typeface="Arial" panose="020B0604020202020204" pitchFamily="34" charset="0"/>
                 <a:cs typeface="Arial" panose="020B0604020202020204" pitchFamily="34" charset="0"/>
               </a:rPr>
-              <a:t>-45°     0°</a:t>
-            </a:r>
-            <a:r>
-              <a:rPr lang="en-US" altLang="zh-CN" sz="1200" b="0" i="0" u="none" strike="noStrike" dirty="0">
-                <a:effectLst/>
-                <a:latin typeface="Arial" panose="020B0604020202020204" pitchFamily="34" charset="0"/>
-                <a:cs typeface="Arial" panose="020B0604020202020204" pitchFamily="34" charset="0"/>
-              </a:rPr>
-              <a:t>      45</a:t>
-            </a:r>
-            <a:r>
-              <a:rPr lang="en-US" altLang="zh-CN" sz="1200" dirty="0">
-                <a:latin typeface="Arial" panose="020B0604020202020204" pitchFamily="34" charset="0"/>
-                <a:cs typeface="Arial" panose="020B0604020202020204" pitchFamily="34" charset="0"/>
-              </a:rPr>
-              <a:t>°</a:t>
+              <a:t>-45°     0°      45°</a:t>
             </a:r>
           </a:p>
         </p:txBody>
       </p:sp>
-      <mc:AlternateContent xmlns:mc="http://schemas.openxmlformats.org/markup-compatibility/2006" xmlns:a14="http://schemas.microsoft.com/office/drawing/2010/main">
-        <mc:Choice Requires="a14">
+      <mc:AlternateContent xmlns:mc="http://schemas.openxmlformats.org/markup-compatibility/2006">
+        <mc:Choice xmlns:a14="http://schemas.microsoft.com/office/drawing/2010/main" Requires="a14">
           <p:sp>
             <p:nvSpPr>
               <p:cNvPr id="493" name="TextBox 492">
@@ -9698,7 +9677,7 @@
             </p:nvSpPr>
             <p:spPr>
               <a:xfrm>
-                <a:off x="1119299" y="1655135"/>
+                <a:off x="1119299" y="1852736"/>
                 <a:ext cx="710784" cy="369332"/>
               </a:xfrm>
               <a:prstGeom prst="rect">
@@ -9720,7 +9699,7 @@
                     </m:oMathParaPr>
                     <m:oMath xmlns:m="http://schemas.openxmlformats.org/officeDocument/2006/math">
                       <m:r>
-                        <a:rPr lang="en-US" altLang="zh-CN" b="1" i="1" dirty="0" smtClean="0">
+                        <a:rPr lang="en-US" altLang="zh-CN" b="1" i="1" dirty="0">
                           <a:solidFill>
                             <a:srgbClr val="C00000"/>
                           </a:solidFill>
@@ -9740,7 +9719,7 @@
             </p:txBody>
           </p:sp>
         </mc:Choice>
-        <mc:Fallback xmlns="">
+        <mc:Fallback>
           <p:sp>
             <p:nvSpPr>
               <p:cNvPr id="493" name="TextBox 492">
@@ -9757,14 +9736,14 @@
             </p:nvSpPr>
             <p:spPr>
               <a:xfrm>
-                <a:off x="1119299" y="1655135"/>
+                <a:off x="1119299" y="1852736"/>
                 <a:ext cx="710784" cy="369332"/>
               </a:xfrm>
               <a:prstGeom prst="rect">
                 <a:avLst/>
               </a:prstGeom>
               <a:blipFill>
-                <a:blip r:embed="rId31"/>
+                <a:blip r:embed="rId30"/>
                 <a:stretch>
                   <a:fillRect/>
                 </a:stretch>
@@ -9785,8 +9764,8 @@
           </p:sp>
         </mc:Fallback>
       </mc:AlternateContent>
-      <mc:AlternateContent xmlns:mc="http://schemas.openxmlformats.org/markup-compatibility/2006" xmlns:a14="http://schemas.microsoft.com/office/drawing/2010/main">
-        <mc:Choice Requires="a14">
+      <mc:AlternateContent xmlns:mc="http://schemas.openxmlformats.org/markup-compatibility/2006">
+        <mc:Choice xmlns:a14="http://schemas.microsoft.com/office/drawing/2010/main" Requires="a14">
           <p:sp>
             <p:nvSpPr>
               <p:cNvPr id="494" name="TextBox 493">
@@ -9801,7 +9780,7 @@
             </p:nvSpPr>
             <p:spPr>
               <a:xfrm>
-                <a:off x="1115968" y="1924688"/>
+                <a:off x="1115968" y="2122289"/>
                 <a:ext cx="710784" cy="369332"/>
               </a:xfrm>
               <a:prstGeom prst="rect">
@@ -9823,10 +9802,7 @@
                     </m:oMathParaPr>
                     <m:oMath xmlns:m="http://schemas.openxmlformats.org/officeDocument/2006/math">
                       <m:r>
-                        <a:rPr lang="en-US" altLang="zh-CN" b="1" i="1" dirty="0" smtClean="0">
-                          <a:solidFill>
-                            <a:schemeClr val="tx1"/>
-                          </a:solidFill>
+                        <a:rPr lang="en-US" altLang="zh-CN" b="1" i="1" dirty="0">
                           <a:latin typeface="Cambria Math" panose="02040503050406030204" pitchFamily="18" charset="0"/>
                         </a:rPr>
                         <m:t>?</m:t>
@@ -9834,16 +9810,12 @@
                     </m:oMath>
                   </m:oMathPara>
                 </a14:m>
-                <a:endParaRPr lang="zh-CN" altLang="en-US" b="1" dirty="0">
-                  <a:solidFill>
-                    <a:schemeClr val="tx1"/>
-                  </a:solidFill>
-                </a:endParaRPr>
+                <a:endParaRPr lang="zh-CN" altLang="en-US" b="1" dirty="0"/>
               </a:p>
             </p:txBody>
           </p:sp>
         </mc:Choice>
-        <mc:Fallback xmlns="">
+        <mc:Fallback>
           <p:sp>
             <p:nvSpPr>
               <p:cNvPr id="494" name="TextBox 493">
@@ -9860,14 +9832,14 @@
             </p:nvSpPr>
             <p:spPr>
               <a:xfrm>
-                <a:off x="1115968" y="1924688"/>
+                <a:off x="1115968" y="2122289"/>
                 <a:ext cx="710784" cy="369332"/>
               </a:xfrm>
               <a:prstGeom prst="rect">
                 <a:avLst/>
               </a:prstGeom>
               <a:blipFill>
-                <a:blip r:embed="rId32"/>
+                <a:blip r:embed="rId31"/>
                 <a:stretch>
                   <a:fillRect/>
                 </a:stretch>
@@ -9904,7 +9876,7 @@
             </p:nvSpPr>
             <p:spPr>
               <a:xfrm>
-                <a:off x="876035" y="3457324"/>
+                <a:off x="876035" y="3654925"/>
                 <a:ext cx="710784" cy="369332"/>
               </a:xfrm>
               <a:prstGeom prst="rect">
@@ -9926,10 +9898,7 @@
                     </m:oMathParaPr>
                     <m:oMath xmlns:m="http://schemas.openxmlformats.org/officeDocument/2006/math">
                       <m:r>
-                        <a:rPr lang="en-US" altLang="zh-CN" b="1" i="1" dirty="0" smtClean="0">
-                          <a:solidFill>
-                            <a:schemeClr val="tx1"/>
-                          </a:solidFill>
+                        <a:rPr lang="en-US" altLang="zh-CN" b="1" i="1" dirty="0">
                           <a:latin typeface="Cambria Math" panose="02040503050406030204" pitchFamily="18" charset="0"/>
                         </a:rPr>
                         <m:t>?</m:t>
@@ -9937,11 +9906,7 @@
                     </m:oMath>
                   </m:oMathPara>
                 </a14:m>
-                <a:endParaRPr lang="zh-CN" altLang="en-US" b="1" dirty="0">
-                  <a:solidFill>
-                    <a:schemeClr val="tx1"/>
-                  </a:solidFill>
-                </a:endParaRPr>
+                <a:endParaRPr lang="zh-CN" altLang="en-US" b="1" dirty="0"/>
               </a:p>
             </p:txBody>
           </p:sp>
@@ -9963,14 +9928,14 @@
             </p:nvSpPr>
             <p:spPr>
               <a:xfrm>
-                <a:off x="876035" y="3457324"/>
+                <a:off x="876035" y="3654925"/>
                 <a:ext cx="710784" cy="369332"/>
               </a:xfrm>
               <a:prstGeom prst="rect">
                 <a:avLst/>
               </a:prstGeom>
               <a:blipFill>
-                <a:blip r:embed="rId33"/>
+                <a:blip r:embed="rId32"/>
                 <a:stretch>
                   <a:fillRect/>
                 </a:stretch>
@@ -10000,12 +9965,14 @@
               </a:ext>
             </a:extLst>
           </p:cNvPr>
-          <p:cNvCxnSpPr/>
+          <p:cNvCxnSpPr>
+            <a:cxnSpLocks/>
+          </p:cNvCxnSpPr>
           <p:nvPr/>
         </p:nvCxnSpPr>
         <p:spPr>
           <a:xfrm>
-            <a:off x="1554323" y="2024467"/>
+            <a:off x="1554326" y="2222068"/>
             <a:ext cx="1136719" cy="0"/>
           </a:xfrm>
           <a:prstGeom prst="straightConnector1">
@@ -10044,12 +10011,14 @@
               </a:ext>
             </a:extLst>
           </p:cNvPr>
-          <p:cNvCxnSpPr/>
+          <p:cNvCxnSpPr>
+            <a:cxnSpLocks/>
+          </p:cNvCxnSpPr>
           <p:nvPr/>
         </p:nvCxnSpPr>
         <p:spPr>
           <a:xfrm>
-            <a:off x="1580888" y="3579506"/>
+            <a:off x="1580891" y="3777107"/>
             <a:ext cx="1136719" cy="0"/>
           </a:xfrm>
           <a:prstGeom prst="straightConnector1">
@@ -10095,7 +10064,7 @@
         </p:nvCxnSpPr>
         <p:spPr>
           <a:xfrm>
-            <a:off x="1573504" y="2024467"/>
+            <a:off x="1573504" y="2222071"/>
             <a:ext cx="1141818" cy="1549499"/>
           </a:xfrm>
           <a:prstGeom prst="straightConnector1">
@@ -10134,12 +10103,14 @@
               </a:ext>
             </a:extLst>
           </p:cNvPr>
-          <p:cNvCxnSpPr/>
+          <p:cNvCxnSpPr>
+            <a:cxnSpLocks/>
+          </p:cNvCxnSpPr>
           <p:nvPr/>
         </p:nvCxnSpPr>
         <p:spPr>
           <a:xfrm>
-            <a:off x="1590263" y="5485720"/>
+            <a:off x="1590266" y="5683321"/>
             <a:ext cx="1136719" cy="0"/>
           </a:xfrm>
           <a:prstGeom prst="straightConnector1">
@@ -10183,7 +10154,7 @@
         </p:nvSpPr>
         <p:spPr>
           <a:xfrm rot="16200000">
-            <a:off x="-507611" y="1854961"/>
+            <a:off x="-507611" y="3160557"/>
             <a:ext cx="1206900" cy="369332"/>
           </a:xfrm>
           <a:prstGeom prst="rect">
@@ -10220,7 +10191,7 @@
         </p:nvSpPr>
         <p:spPr>
           <a:xfrm rot="16200000">
-            <a:off x="-491109" y="3373338"/>
+            <a:off x="-491109" y="4678934"/>
             <a:ext cx="1206900" cy="369332"/>
           </a:xfrm>
           <a:prstGeom prst="rect">
@@ -10257,7 +10228,7 @@
         </p:nvSpPr>
         <p:spPr>
           <a:xfrm rot="16200000">
-            <a:off x="-914880" y="5360388"/>
+            <a:off x="-914880" y="6111987"/>
             <a:ext cx="2060476" cy="369332"/>
           </a:xfrm>
           <a:prstGeom prst="rect">
@@ -10296,7 +10267,7 @@
         </p:nvCxnSpPr>
         <p:spPr>
           <a:xfrm>
-            <a:off x="4493464" y="3093390"/>
+            <a:off x="4493467" y="3290994"/>
             <a:ext cx="1196753" cy="733351"/>
           </a:xfrm>
           <a:prstGeom prst="straightConnector1">
@@ -10341,7 +10312,7 @@
         </p:nvCxnSpPr>
         <p:spPr>
           <a:xfrm flipH="1">
-            <a:off x="4374819" y="3089676"/>
+            <a:off x="4374822" y="3287277"/>
             <a:ext cx="1227321" cy="735712"/>
           </a:xfrm>
           <a:prstGeom prst="straightConnector1">
@@ -10386,7 +10357,7 @@
         </p:nvCxnSpPr>
         <p:spPr>
           <a:xfrm>
-            <a:off x="7116916" y="3093799"/>
+            <a:off x="7116916" y="3291403"/>
             <a:ext cx="0" cy="748275"/>
           </a:xfrm>
           <a:prstGeom prst="straightConnector1">
@@ -10431,7 +10402,7 @@
         </p:nvCxnSpPr>
         <p:spPr>
           <a:xfrm>
-            <a:off x="7269343" y="3087173"/>
+            <a:off x="7269346" y="3284777"/>
             <a:ext cx="1196753" cy="733351"/>
           </a:xfrm>
           <a:prstGeom prst="straightConnector1">
@@ -10476,7 +10447,7 @@
         </p:nvCxnSpPr>
         <p:spPr>
           <a:xfrm flipH="1">
-            <a:off x="7153545" y="3083991"/>
+            <a:off x="7153548" y="3281592"/>
             <a:ext cx="1227321" cy="735712"/>
           </a:xfrm>
           <a:prstGeom prst="straightConnector1">
@@ -10519,7 +10490,7 @@
         </p:nvSpPr>
         <p:spPr>
           <a:xfrm>
-            <a:off x="596877" y="4886717"/>
+            <a:off x="596877" y="5084318"/>
             <a:ext cx="627004" cy="506508"/>
           </a:xfrm>
           <a:custGeom>
@@ -10629,7 +10600,7 @@
         </p:nvSpPr>
         <p:spPr>
           <a:xfrm flipH="1" flipV="1">
-            <a:off x="1209248" y="5356114"/>
+            <a:off x="1209251" y="5553718"/>
             <a:ext cx="315779" cy="45719"/>
           </a:xfrm>
           <a:prstGeom prst="arc">
@@ -10681,7 +10652,7 @@
         </p:nvSpPr>
         <p:spPr>
           <a:xfrm rot="21411082" flipV="1">
-            <a:off x="316428" y="5360949"/>
+            <a:off x="316431" y="5558553"/>
             <a:ext cx="315779" cy="45719"/>
           </a:xfrm>
           <a:prstGeom prst="arc">
@@ -10733,7 +10704,7 @@
         </p:nvSpPr>
         <p:spPr>
           <a:xfrm>
-            <a:off x="5119522" y="6110930"/>
+            <a:off x="5119522" y="6308534"/>
             <a:ext cx="1414104" cy="601561"/>
           </a:xfrm>
           <a:prstGeom prst="roundRect">
@@ -10789,7 +10760,7 @@
             </p:nvSpPr>
             <p:spPr>
               <a:xfrm>
-                <a:off x="5097548" y="6159389"/>
+                <a:off x="5097548" y="6356993"/>
                 <a:ext cx="1507004" cy="461665"/>
               </a:xfrm>
               <a:prstGeom prst="rect">
@@ -10816,14 +10787,14 @@
                       <m:sSub>
                         <m:sSubPr>
                           <m:ctrlPr>
-                            <a:rPr lang="en-US" altLang="zh-CN" sz="2400" b="0" i="1" smtClean="0">
+                            <a:rPr lang="en-US" altLang="zh-CN" sz="2400" i="1">
                               <a:latin typeface="Cambria Math" panose="02040503050406030204" pitchFamily="18" charset="0"/>
                             </a:rPr>
                           </m:ctrlPr>
                         </m:sSubPr>
                         <m:e>
                           <m:r>
-                            <a:rPr lang="en-US" altLang="zh-CN" sz="2400" b="0" i="1" smtClean="0">
+                            <a:rPr lang="en-US" altLang="zh-CN" sz="2400" i="1">
                               <a:latin typeface="Cambria Math" panose="02040503050406030204" pitchFamily="18" charset="0"/>
                             </a:rPr>
                             <m:t>𝑟</m:t>
@@ -10834,7 +10805,7 @@
                             <m:rPr>
                               <m:sty m:val="p"/>
                             </m:rPr>
-                            <a:rPr lang="en-US" altLang="zh-CN" sz="2400" b="0" i="0" smtClean="0">
+                            <a:rPr lang="en-US" altLang="zh-CN" sz="2400">
                               <a:latin typeface="Cambria Math" panose="02040503050406030204" pitchFamily="18" charset="0"/>
                             </a:rPr>
                             <m:t>C</m:t>
@@ -10842,7 +10813,7 @@
                         </m:sub>
                       </m:sSub>
                       <m:r>
-                        <a:rPr lang="en-US" altLang="zh-CN" sz="2400" b="0" i="1" smtClean="0">
+                        <a:rPr lang="en-US" altLang="zh-CN" sz="2400" i="1">
                           <a:latin typeface="Cambria Math" panose="02040503050406030204" pitchFamily="18" charset="0"/>
                         </a:rPr>
                         <m:t>∈{1, 2}</m:t>
@@ -10872,14 +10843,14 @@
             </p:nvSpPr>
             <p:spPr>
               <a:xfrm>
-                <a:off x="5097548" y="6159389"/>
+                <a:off x="5097548" y="6356993"/>
                 <a:ext cx="1507004" cy="461665"/>
               </a:xfrm>
               <a:prstGeom prst="rect">
                 <a:avLst/>
               </a:prstGeom>
               <a:blipFill>
-                <a:blip r:embed="rId34"/>
+                <a:blip r:embed="rId33"/>
                 <a:stretch>
                   <a:fillRect r="-3239" b="-17105"/>
                 </a:stretch>
@@ -10917,7 +10888,7 @@
         </p:nvSpPr>
         <p:spPr>
           <a:xfrm>
-            <a:off x="8221716" y="3847759"/>
+            <a:off x="8221716" y="4045360"/>
             <a:ext cx="789172" cy="662408"/>
           </a:xfrm>
           <a:prstGeom prst="ellipse">
@@ -10973,7 +10944,7 @@
             </p:nvSpPr>
             <p:spPr>
               <a:xfrm>
-                <a:off x="8185870" y="3912941"/>
+                <a:off x="8185873" y="4110545"/>
                 <a:ext cx="938195" cy="461665"/>
               </a:xfrm>
               <a:prstGeom prst="rect">
@@ -11000,7 +10971,7 @@
                       <m:sSub>
                         <m:sSubPr>
                           <m:ctrlPr>
-                            <a:rPr lang="en-US" altLang="zh-CN" sz="2400" b="0" i="1" smtClean="0">
+                            <a:rPr lang="en-US" altLang="zh-CN" sz="2400" i="1">
                               <a:latin typeface="Cambria Math" panose="02040503050406030204" pitchFamily="18" charset="0"/>
                             </a:rPr>
                           </m:ctrlPr>
@@ -11010,14 +10981,14 @@
                             <m:accPr>
                               <m:chr m:val="̂"/>
                               <m:ctrlPr>
-                                <a:rPr lang="en-US" altLang="zh-CN" sz="2400" b="0" i="1" smtClean="0">
+                                <a:rPr lang="en-US" altLang="zh-CN" sz="2400" i="1">
                                   <a:latin typeface="Cambria Math" panose="02040503050406030204" pitchFamily="18" charset="0"/>
                                 </a:rPr>
                               </m:ctrlPr>
                             </m:accPr>
                             <m:e>
                               <m:r>
-                                <a:rPr lang="en-US" altLang="zh-CN" sz="2400" b="0" i="1" smtClean="0">
+                                <a:rPr lang="en-US" altLang="zh-CN" sz="2400" i="1">
                                   <a:latin typeface="Cambria Math" panose="02040503050406030204" pitchFamily="18" charset="0"/>
                                 </a:rPr>
                                 <m:t>𝑠</m:t>
@@ -11027,13 +10998,13 @@
                         </m:e>
                         <m:sub>
                           <m:r>
-                            <a:rPr lang="en-US" altLang="zh-CN" sz="2400" b="0" i="1" smtClean="0">
+                            <a:rPr lang="en-US" altLang="zh-CN" sz="2400" i="1">
                               <a:latin typeface="Cambria Math" panose="02040503050406030204" pitchFamily="18" charset="0"/>
                             </a:rPr>
                             <m:t>𝐶</m:t>
                           </m:r>
                           <m:r>
-                            <a:rPr lang="en-US" altLang="zh-CN" sz="2400" b="0" i="1" smtClean="0">
+                            <a:rPr lang="en-US" altLang="zh-CN" sz="2400" i="1">
                               <a:latin typeface="Cambria Math" panose="02040503050406030204" pitchFamily="18" charset="0"/>
                             </a:rPr>
                             <m:t>=2 </m:t>
@@ -11065,14 +11036,14 @@
             </p:nvSpPr>
             <p:spPr>
               <a:xfrm>
-                <a:off x="8185870" y="3912941"/>
+                <a:off x="8185873" y="4110545"/>
                 <a:ext cx="938195" cy="461665"/>
               </a:xfrm>
               <a:prstGeom prst="rect">
                 <a:avLst/>
               </a:prstGeom>
               <a:blipFill>
-                <a:blip r:embed="rId35"/>
+                <a:blip r:embed="rId34"/>
                 <a:stretch>
                   <a:fillRect t="-3947" b="-1316"/>
                 </a:stretch>
@@ -11110,7 +11081,7 @@
         </p:nvSpPr>
         <p:spPr>
           <a:xfrm>
-            <a:off x="371168" y="3531702"/>
+            <a:off x="371171" y="3729306"/>
             <a:ext cx="1067437" cy="370869"/>
           </a:xfrm>
           <a:custGeom>
@@ -11320,7 +11291,7 @@
         </p:nvSpPr>
         <p:spPr>
           <a:xfrm flipV="1">
-            <a:off x="-140499" y="3045070"/>
+            <a:off x="-140499" y="3242672"/>
             <a:ext cx="1044308" cy="863121"/>
           </a:xfrm>
           <a:prstGeom prst="arc">
@@ -11372,7 +11343,7 @@
         </p:nvSpPr>
         <p:spPr>
           <a:xfrm flipH="1" flipV="1">
-            <a:off x="905666" y="3047130"/>
+            <a:off x="905666" y="3244734"/>
             <a:ext cx="1044308" cy="863121"/>
           </a:xfrm>
           <a:prstGeom prst="arc">
@@ -11410,8 +11381,8 @@
           </a:p>
         </p:txBody>
       </p:sp>
-      <mc:AlternateContent xmlns:mc="http://schemas.openxmlformats.org/markup-compatibility/2006" xmlns:a14="http://schemas.microsoft.com/office/drawing/2010/main">
-        <mc:Choice Requires="a14">
+      <mc:AlternateContent xmlns:mc="http://schemas.openxmlformats.org/markup-compatibility/2006">
+        <mc:Choice xmlns:a14="http://schemas.microsoft.com/office/drawing/2010/main" Requires="a14">
           <p:sp>
             <p:nvSpPr>
               <p:cNvPr id="495" name="TextBox 494">
@@ -11426,7 +11397,7 @@
             </p:nvSpPr>
             <p:spPr>
               <a:xfrm>
-                <a:off x="702202" y="3293933"/>
+                <a:off x="702202" y="3491534"/>
                 <a:ext cx="710784" cy="369332"/>
               </a:xfrm>
               <a:prstGeom prst="rect">
@@ -11451,7 +11422,7 @@
                     </m:oMathParaPr>
                     <m:oMath xmlns:m="http://schemas.openxmlformats.org/officeDocument/2006/math">
                       <m:r>
-                        <a:rPr lang="en-US" altLang="zh-CN" b="1" i="1" dirty="0" smtClean="0">
+                        <a:rPr lang="en-US" altLang="zh-CN" b="1" i="1" dirty="0">
                           <a:solidFill>
                             <a:srgbClr val="C00000"/>
                           </a:solidFill>
@@ -11471,7 +11442,7 @@
             </p:txBody>
           </p:sp>
         </mc:Choice>
-        <mc:Fallback xmlns="">
+        <mc:Fallback>
           <p:sp>
             <p:nvSpPr>
               <p:cNvPr id="495" name="TextBox 494">
@@ -11488,14 +11459,14 @@
             </p:nvSpPr>
             <p:spPr>
               <a:xfrm>
-                <a:off x="702202" y="3293933"/>
+                <a:off x="702202" y="3491534"/>
                 <a:ext cx="710784" cy="369332"/>
               </a:xfrm>
               <a:prstGeom prst="rect">
                 <a:avLst/>
               </a:prstGeom>
               <a:blipFill>
-                <a:blip r:embed="rId36"/>
+                <a:blip r:embed="rId35"/>
                 <a:stretch>
                   <a:fillRect/>
                 </a:stretch>
@@ -11519,6 +11490,144 @@
           </p:sp>
         </mc:Fallback>
       </mc:AlternateContent>
+      <p:sp>
+        <p:nvSpPr>
+          <p:cNvPr id="46" name="TextBox 45">
+            <a:extLst>
+              <a:ext uri="{FF2B5EF4-FFF2-40B4-BE49-F238E27FC236}">
+                <a16:creationId xmlns:a16="http://schemas.microsoft.com/office/drawing/2014/main" id="{60C0D9EE-87BF-3883-FFD1-7C85A8F1A0D5}"/>
+              </a:ext>
+            </a:extLst>
+          </p:cNvPr>
+          <p:cNvSpPr txBox="1"/>
+          <p:nvPr/>
+        </p:nvSpPr>
+        <p:spPr>
+          <a:xfrm>
+            <a:off x="-82086" y="1220748"/>
+            <a:ext cx="457136" cy="365836"/>
+          </a:xfrm>
+          <a:prstGeom prst="rect">
+            <a:avLst/>
+          </a:prstGeom>
+          <a:noFill/>
+          <a:ln w="19050">
+            <a:noFill/>
+          </a:ln>
+        </p:spPr>
+        <p:txBody>
+          <a:bodyPr wrap="square" rtlCol="0">
+            <a:spAutoFit/>
+          </a:bodyPr>
+          <a:lstStyle/>
+          <a:p>
+            <a:pPr algn="ctr"/>
+            <a:r>
+              <a:rPr lang="en-US" altLang="zh-CN" b="1" dirty="0">
+                <a:latin typeface="Arial" panose="020B0604020202020204" pitchFamily="34" charset="0"/>
+                <a:cs typeface="Arial" panose="020B0604020202020204" pitchFamily="34" charset="0"/>
+              </a:rPr>
+              <a:t>(c)</a:t>
+            </a:r>
+            <a:endParaRPr lang="zh-CN" altLang="en-US" b="1" dirty="0">
+              <a:latin typeface="Arial" panose="020B0604020202020204" pitchFamily="34" charset="0"/>
+              <a:cs typeface="Arial" panose="020B0604020202020204" pitchFamily="34" charset="0"/>
+            </a:endParaRPr>
+          </a:p>
+        </p:txBody>
+      </p:sp>
+      <p:sp>
+        <p:nvSpPr>
+          <p:cNvPr id="47" name="TextBox 46">
+            <a:extLst>
+              <a:ext uri="{FF2B5EF4-FFF2-40B4-BE49-F238E27FC236}">
+                <a16:creationId xmlns:a16="http://schemas.microsoft.com/office/drawing/2014/main" id="{D2E8F9F9-D5B0-1C85-44B0-00FEA98B5B8B}"/>
+              </a:ext>
+            </a:extLst>
+          </p:cNvPr>
+          <p:cNvSpPr txBox="1"/>
+          <p:nvPr/>
+        </p:nvSpPr>
+        <p:spPr>
+          <a:xfrm>
+            <a:off x="3551820" y="-49059"/>
+            <a:ext cx="457136" cy="365836"/>
+          </a:xfrm>
+          <a:prstGeom prst="rect">
+            <a:avLst/>
+          </a:prstGeom>
+          <a:noFill/>
+          <a:ln w="19050">
+            <a:noFill/>
+          </a:ln>
+        </p:spPr>
+        <p:txBody>
+          <a:bodyPr wrap="square" rtlCol="0">
+            <a:spAutoFit/>
+          </a:bodyPr>
+          <a:lstStyle/>
+          <a:p>
+            <a:pPr algn="ctr"/>
+            <a:r>
+              <a:rPr lang="en-US" altLang="zh-CN" b="1" dirty="0">
+                <a:latin typeface="Arial" panose="020B0604020202020204" pitchFamily="34" charset="0"/>
+                <a:cs typeface="Arial" panose="020B0604020202020204" pitchFamily="34" charset="0"/>
+              </a:rPr>
+              <a:t>(b)</a:t>
+            </a:r>
+            <a:endParaRPr lang="zh-CN" altLang="en-US" b="1" dirty="0">
+              <a:latin typeface="Arial" panose="020B0604020202020204" pitchFamily="34" charset="0"/>
+              <a:cs typeface="Arial" panose="020B0604020202020204" pitchFamily="34" charset="0"/>
+            </a:endParaRPr>
+          </a:p>
+        </p:txBody>
+      </p:sp>
+      <p:sp>
+        <p:nvSpPr>
+          <p:cNvPr id="48" name="TextBox 47">
+            <a:extLst>
+              <a:ext uri="{FF2B5EF4-FFF2-40B4-BE49-F238E27FC236}">
+                <a16:creationId xmlns:a16="http://schemas.microsoft.com/office/drawing/2014/main" id="{B00B2BE0-216F-B12E-9204-BC43ED908DA4}"/>
+              </a:ext>
+            </a:extLst>
+          </p:cNvPr>
+          <p:cNvSpPr txBox="1"/>
+          <p:nvPr/>
+        </p:nvSpPr>
+        <p:spPr>
+          <a:xfrm>
+            <a:off x="1546391" y="-49693"/>
+            <a:ext cx="457136" cy="365836"/>
+          </a:xfrm>
+          <a:prstGeom prst="rect">
+            <a:avLst/>
+          </a:prstGeom>
+          <a:noFill/>
+          <a:ln w="19050">
+            <a:noFill/>
+          </a:ln>
+        </p:spPr>
+        <p:txBody>
+          <a:bodyPr wrap="square" rtlCol="0">
+            <a:spAutoFit/>
+          </a:bodyPr>
+          <a:lstStyle/>
+          <a:p>
+            <a:pPr algn="ctr"/>
+            <a:r>
+              <a:rPr lang="en-US" altLang="zh-CN" b="1" dirty="0">
+                <a:latin typeface="Arial" panose="020B0604020202020204" pitchFamily="34" charset="0"/>
+                <a:cs typeface="Arial" panose="020B0604020202020204" pitchFamily="34" charset="0"/>
+              </a:rPr>
+              <a:t>(a)</a:t>
+            </a:r>
+            <a:endParaRPr lang="zh-CN" altLang="en-US" b="1" dirty="0">
+              <a:latin typeface="Arial" panose="020B0604020202020204" pitchFamily="34" charset="0"/>
+              <a:cs typeface="Arial" panose="020B0604020202020204" pitchFamily="34" charset="0"/>
+            </a:endParaRPr>
+          </a:p>
+        </p:txBody>
+      </p:sp>
     </p:spTree>
     <p:extLst>
       <p:ext uri="{BB962C8B-B14F-4D97-AF65-F5344CB8AC3E}">

</xml_diff>

<commit_message>
Resize Fig 2 PDF
</commit_message>
<xml_diff>
--- a/plots/ModelOverview.pptx
+++ b/plots/ModelOverview.pptx
@@ -4,6 +4,9 @@
   <p:sldMasterIdLst>
     <p:sldMasterId id="2147483672" r:id="rId1"/>
   </p:sldMasterIdLst>
+  <p:notesMasterIdLst>
+    <p:notesMasterId r:id="rId3"/>
+  </p:notesMasterIdLst>
   <p:sldIdLst>
     <p:sldId id="257" r:id="rId2"/>
   </p:sldIdLst>
@@ -112,6 +115,448 @@
 </p:presentation>
 </file>
 
+<file path=ppt/notesMasters/notesMaster1.xml><?xml version="1.0" encoding="utf-8"?>
+<p:notesMaster xmlns:a="http://schemas.openxmlformats.org/drawingml/2006/main" xmlns:r="http://schemas.openxmlformats.org/officeDocument/2006/relationships" xmlns:p="http://schemas.openxmlformats.org/presentationml/2006/main">
+  <p:cSld>
+    <p:bg>
+      <p:bgRef idx="1001">
+        <a:schemeClr val="bg1"/>
+      </p:bgRef>
+    </p:bg>
+    <p:spTree>
+      <p:nvGrpSpPr>
+        <p:cNvPr id="1" name=""/>
+        <p:cNvGrpSpPr/>
+        <p:nvPr/>
+      </p:nvGrpSpPr>
+      <p:grpSpPr>
+        <a:xfrm>
+          <a:off x="0" y="0"/>
+          <a:ext cx="0" cy="0"/>
+          <a:chOff x="0" y="0"/>
+          <a:chExt cx="0" cy="0"/>
+        </a:xfrm>
+      </p:grpSpPr>
+      <p:sp>
+        <p:nvSpPr>
+          <p:cNvPr id="2" name="Header Placeholder 1"/>
+          <p:cNvSpPr>
+            <a:spLocks noGrp="1"/>
+          </p:cNvSpPr>
+          <p:nvPr>
+            <p:ph type="hdr" sz="quarter"/>
+          </p:nvPr>
+        </p:nvSpPr>
+        <p:spPr>
+          <a:xfrm>
+            <a:off x="0" y="0"/>
+            <a:ext cx="2971800" cy="458788"/>
+          </a:xfrm>
+          <a:prstGeom prst="rect">
+            <a:avLst/>
+          </a:prstGeom>
+        </p:spPr>
+        <p:txBody>
+          <a:bodyPr vert="horz" lIns="91440" tIns="45720" rIns="91440" bIns="45720" rtlCol="0"/>
+          <a:lstStyle>
+            <a:lvl1pPr algn="l">
+              <a:defRPr sz="1200"/>
+            </a:lvl1pPr>
+          </a:lstStyle>
+          <a:p>
+            <a:endParaRPr lang="zh-CN" altLang="en-US"/>
+          </a:p>
+        </p:txBody>
+      </p:sp>
+      <p:sp>
+        <p:nvSpPr>
+          <p:cNvPr id="3" name="Date Placeholder 2"/>
+          <p:cNvSpPr>
+            <a:spLocks noGrp="1"/>
+          </p:cNvSpPr>
+          <p:nvPr>
+            <p:ph type="dt" idx="1"/>
+          </p:nvPr>
+        </p:nvSpPr>
+        <p:spPr>
+          <a:xfrm>
+            <a:off x="3884613" y="0"/>
+            <a:ext cx="2971800" cy="458788"/>
+          </a:xfrm>
+          <a:prstGeom prst="rect">
+            <a:avLst/>
+          </a:prstGeom>
+        </p:spPr>
+        <p:txBody>
+          <a:bodyPr vert="horz" lIns="91440" tIns="45720" rIns="91440" bIns="45720" rtlCol="0"/>
+          <a:lstStyle>
+            <a:lvl1pPr algn="r">
+              <a:defRPr sz="1200"/>
+            </a:lvl1pPr>
+          </a:lstStyle>
+          <a:p>
+            <a:fld id="{745049D8-4E34-4176-B609-2AE4CB5AE01A}" type="datetimeFigureOut">
+              <a:rPr lang="zh-CN" altLang="en-US" smtClean="0"/>
+              <a:t>2023/6/15</a:t>
+            </a:fld>
+            <a:endParaRPr lang="zh-CN" altLang="en-US"/>
+          </a:p>
+        </p:txBody>
+      </p:sp>
+      <p:sp>
+        <p:nvSpPr>
+          <p:cNvPr id="4" name="Slide Image Placeholder 3"/>
+          <p:cNvSpPr>
+            <a:spLocks noGrp="1" noRot="1" noChangeAspect="1"/>
+          </p:cNvSpPr>
+          <p:nvPr>
+            <p:ph type="sldImg" idx="2"/>
+          </p:nvPr>
+        </p:nvSpPr>
+        <p:spPr>
+          <a:xfrm>
+            <a:off x="1425575" y="1143000"/>
+            <a:ext cx="4006850" cy="3086100"/>
+          </a:xfrm>
+          <a:prstGeom prst="rect">
+            <a:avLst/>
+          </a:prstGeom>
+          <a:noFill/>
+          <a:ln w="12700">
+            <a:solidFill>
+              <a:prstClr val="black"/>
+            </a:solidFill>
+          </a:ln>
+        </p:spPr>
+        <p:txBody>
+          <a:bodyPr vert="horz" lIns="91440" tIns="45720" rIns="91440" bIns="45720" rtlCol="0" anchor="ctr"/>
+          <a:lstStyle/>
+          <a:p>
+            <a:endParaRPr lang="zh-CN" altLang="en-US"/>
+          </a:p>
+        </p:txBody>
+      </p:sp>
+      <p:sp>
+        <p:nvSpPr>
+          <p:cNvPr id="5" name="Notes Placeholder 4"/>
+          <p:cNvSpPr>
+            <a:spLocks noGrp="1"/>
+          </p:cNvSpPr>
+          <p:nvPr>
+            <p:ph type="body" sz="quarter" idx="3"/>
+          </p:nvPr>
+        </p:nvSpPr>
+        <p:spPr>
+          <a:xfrm>
+            <a:off x="685800" y="4400550"/>
+            <a:ext cx="5486400" cy="3600450"/>
+          </a:xfrm>
+          <a:prstGeom prst="rect">
+            <a:avLst/>
+          </a:prstGeom>
+        </p:spPr>
+        <p:txBody>
+          <a:bodyPr vert="horz" lIns="91440" tIns="45720" rIns="91440" bIns="45720" rtlCol="0"/>
+          <a:lstStyle/>
+          <a:p>
+            <a:pPr lvl="0"/>
+            <a:r>
+              <a:rPr lang="en-US" altLang="zh-CN"/>
+              <a:t>Click to edit Master text styles</a:t>
+            </a:r>
+          </a:p>
+          <a:p>
+            <a:pPr lvl="1"/>
+            <a:r>
+              <a:rPr lang="en-US" altLang="zh-CN"/>
+              <a:t>Second level</a:t>
+            </a:r>
+          </a:p>
+          <a:p>
+            <a:pPr lvl="2"/>
+            <a:r>
+              <a:rPr lang="en-US" altLang="zh-CN"/>
+              <a:t>Third level</a:t>
+            </a:r>
+          </a:p>
+          <a:p>
+            <a:pPr lvl="3"/>
+            <a:r>
+              <a:rPr lang="en-US" altLang="zh-CN"/>
+              <a:t>Fourth level</a:t>
+            </a:r>
+          </a:p>
+          <a:p>
+            <a:pPr lvl="4"/>
+            <a:r>
+              <a:rPr lang="en-US" altLang="zh-CN"/>
+              <a:t>Fifth level</a:t>
+            </a:r>
+            <a:endParaRPr lang="zh-CN" altLang="en-US"/>
+          </a:p>
+        </p:txBody>
+      </p:sp>
+      <p:sp>
+        <p:nvSpPr>
+          <p:cNvPr id="6" name="Footer Placeholder 5"/>
+          <p:cNvSpPr>
+            <a:spLocks noGrp="1"/>
+          </p:cNvSpPr>
+          <p:nvPr>
+            <p:ph type="ftr" sz="quarter" idx="4"/>
+          </p:nvPr>
+        </p:nvSpPr>
+        <p:spPr>
+          <a:xfrm>
+            <a:off x="0" y="8685213"/>
+            <a:ext cx="2971800" cy="458787"/>
+          </a:xfrm>
+          <a:prstGeom prst="rect">
+            <a:avLst/>
+          </a:prstGeom>
+        </p:spPr>
+        <p:txBody>
+          <a:bodyPr vert="horz" lIns="91440" tIns="45720" rIns="91440" bIns="45720" rtlCol="0" anchor="b"/>
+          <a:lstStyle>
+            <a:lvl1pPr algn="l">
+              <a:defRPr sz="1200"/>
+            </a:lvl1pPr>
+          </a:lstStyle>
+          <a:p>
+            <a:endParaRPr lang="zh-CN" altLang="en-US"/>
+          </a:p>
+        </p:txBody>
+      </p:sp>
+      <p:sp>
+        <p:nvSpPr>
+          <p:cNvPr id="7" name="Slide Number Placeholder 6"/>
+          <p:cNvSpPr>
+            <a:spLocks noGrp="1"/>
+          </p:cNvSpPr>
+          <p:nvPr>
+            <p:ph type="sldNum" sz="quarter" idx="5"/>
+          </p:nvPr>
+        </p:nvSpPr>
+        <p:spPr>
+          <a:xfrm>
+            <a:off x="3884613" y="8685213"/>
+            <a:ext cx="2971800" cy="458787"/>
+          </a:xfrm>
+          <a:prstGeom prst="rect">
+            <a:avLst/>
+          </a:prstGeom>
+        </p:spPr>
+        <p:txBody>
+          <a:bodyPr vert="horz" lIns="91440" tIns="45720" rIns="91440" bIns="45720" rtlCol="0" anchor="b"/>
+          <a:lstStyle>
+            <a:lvl1pPr algn="r">
+              <a:defRPr sz="1200"/>
+            </a:lvl1pPr>
+          </a:lstStyle>
+          <a:p>
+            <a:fld id="{A43BB5AD-DEAD-4774-9964-964FF55FF586}" type="slidenum">
+              <a:rPr lang="zh-CN" altLang="en-US" smtClean="0"/>
+              <a:t>‹#›</a:t>
+            </a:fld>
+            <a:endParaRPr lang="zh-CN" altLang="en-US"/>
+          </a:p>
+        </p:txBody>
+      </p:sp>
+    </p:spTree>
+    <p:extLst>
+      <p:ext uri="{BB962C8B-B14F-4D97-AF65-F5344CB8AC3E}">
+        <p14:creationId xmlns:p14="http://schemas.microsoft.com/office/powerpoint/2010/main" val="1846857011"/>
+      </p:ext>
+    </p:extLst>
+  </p:cSld>
+  <p:clrMap bg1="lt1" tx1="dk1" bg2="lt2" tx2="dk2" accent1="accent1" accent2="accent2" accent3="accent3" accent4="accent4" accent5="accent5" accent6="accent6" hlink="hlink" folHlink="folHlink"/>
+  <p:notesStyle>
+    <a:lvl1pPr marL="0" algn="l" defTabSz="914400" rtl="0" eaLnBrk="1" latinLnBrk="0" hangingPunct="1">
+      <a:defRPr sz="1200" kern="1200">
+        <a:solidFill>
+          <a:schemeClr val="tx1"/>
+        </a:solidFill>
+        <a:latin typeface="+mn-lt"/>
+        <a:ea typeface="+mn-ea"/>
+        <a:cs typeface="+mn-cs"/>
+      </a:defRPr>
+    </a:lvl1pPr>
+    <a:lvl2pPr marL="457200" algn="l" defTabSz="914400" rtl="0" eaLnBrk="1" latinLnBrk="0" hangingPunct="1">
+      <a:defRPr sz="1200" kern="1200">
+        <a:solidFill>
+          <a:schemeClr val="tx1"/>
+        </a:solidFill>
+        <a:latin typeface="+mn-lt"/>
+        <a:ea typeface="+mn-ea"/>
+        <a:cs typeface="+mn-cs"/>
+      </a:defRPr>
+    </a:lvl2pPr>
+    <a:lvl3pPr marL="914400" algn="l" defTabSz="914400" rtl="0" eaLnBrk="1" latinLnBrk="0" hangingPunct="1">
+      <a:defRPr sz="1200" kern="1200">
+        <a:solidFill>
+          <a:schemeClr val="tx1"/>
+        </a:solidFill>
+        <a:latin typeface="+mn-lt"/>
+        <a:ea typeface="+mn-ea"/>
+        <a:cs typeface="+mn-cs"/>
+      </a:defRPr>
+    </a:lvl3pPr>
+    <a:lvl4pPr marL="1371600" algn="l" defTabSz="914400" rtl="0" eaLnBrk="1" latinLnBrk="0" hangingPunct="1">
+      <a:defRPr sz="1200" kern="1200">
+        <a:solidFill>
+          <a:schemeClr val="tx1"/>
+        </a:solidFill>
+        <a:latin typeface="+mn-lt"/>
+        <a:ea typeface="+mn-ea"/>
+        <a:cs typeface="+mn-cs"/>
+      </a:defRPr>
+    </a:lvl4pPr>
+    <a:lvl5pPr marL="1828800" algn="l" defTabSz="914400" rtl="0" eaLnBrk="1" latinLnBrk="0" hangingPunct="1">
+      <a:defRPr sz="1200" kern="1200">
+        <a:solidFill>
+          <a:schemeClr val="tx1"/>
+        </a:solidFill>
+        <a:latin typeface="+mn-lt"/>
+        <a:ea typeface="+mn-ea"/>
+        <a:cs typeface="+mn-cs"/>
+      </a:defRPr>
+    </a:lvl5pPr>
+    <a:lvl6pPr marL="2286000" algn="l" defTabSz="914400" rtl="0" eaLnBrk="1" latinLnBrk="0" hangingPunct="1">
+      <a:defRPr sz="1200" kern="1200">
+        <a:solidFill>
+          <a:schemeClr val="tx1"/>
+        </a:solidFill>
+        <a:latin typeface="+mn-lt"/>
+        <a:ea typeface="+mn-ea"/>
+        <a:cs typeface="+mn-cs"/>
+      </a:defRPr>
+    </a:lvl6pPr>
+    <a:lvl7pPr marL="2743200" algn="l" defTabSz="914400" rtl="0" eaLnBrk="1" latinLnBrk="0" hangingPunct="1">
+      <a:defRPr sz="1200" kern="1200">
+        <a:solidFill>
+          <a:schemeClr val="tx1"/>
+        </a:solidFill>
+        <a:latin typeface="+mn-lt"/>
+        <a:ea typeface="+mn-ea"/>
+        <a:cs typeface="+mn-cs"/>
+      </a:defRPr>
+    </a:lvl7pPr>
+    <a:lvl8pPr marL="3200400" algn="l" defTabSz="914400" rtl="0" eaLnBrk="1" latinLnBrk="0" hangingPunct="1">
+      <a:defRPr sz="1200" kern="1200">
+        <a:solidFill>
+          <a:schemeClr val="tx1"/>
+        </a:solidFill>
+        <a:latin typeface="+mn-lt"/>
+        <a:ea typeface="+mn-ea"/>
+        <a:cs typeface="+mn-cs"/>
+      </a:defRPr>
+    </a:lvl8pPr>
+    <a:lvl9pPr marL="3657600" algn="l" defTabSz="914400" rtl="0" eaLnBrk="1" latinLnBrk="0" hangingPunct="1">
+      <a:defRPr sz="1200" kern="1200">
+        <a:solidFill>
+          <a:schemeClr val="tx1"/>
+        </a:solidFill>
+        <a:latin typeface="+mn-lt"/>
+        <a:ea typeface="+mn-ea"/>
+        <a:cs typeface="+mn-cs"/>
+      </a:defRPr>
+    </a:lvl9pPr>
+  </p:notesStyle>
+</p:notesMaster>
+</file>
+
+<file path=ppt/notesSlides/notesSlide1.xml><?xml version="1.0" encoding="utf-8"?>
+<p:notes xmlns:a="http://schemas.openxmlformats.org/drawingml/2006/main" xmlns:r="http://schemas.openxmlformats.org/officeDocument/2006/relationships" xmlns:p="http://schemas.openxmlformats.org/presentationml/2006/main">
+  <p:cSld>
+    <p:spTree>
+      <p:nvGrpSpPr>
+        <p:cNvPr id="1" name=""/>
+        <p:cNvGrpSpPr/>
+        <p:nvPr/>
+      </p:nvGrpSpPr>
+      <p:grpSpPr>
+        <a:xfrm>
+          <a:off x="0" y="0"/>
+          <a:ext cx="0" cy="0"/>
+          <a:chOff x="0" y="0"/>
+          <a:chExt cx="0" cy="0"/>
+        </a:xfrm>
+      </p:grpSpPr>
+      <p:sp>
+        <p:nvSpPr>
+          <p:cNvPr id="2" name="Slide Image Placeholder 1"/>
+          <p:cNvSpPr>
+            <a:spLocks noGrp="1" noRot="1" noChangeAspect="1"/>
+          </p:cNvSpPr>
+          <p:nvPr>
+            <p:ph type="sldImg"/>
+          </p:nvPr>
+        </p:nvSpPr>
+        <p:spPr/>
+      </p:sp>
+      <p:sp>
+        <p:nvSpPr>
+          <p:cNvPr id="3" name="Notes Placeholder 2"/>
+          <p:cNvSpPr>
+            <a:spLocks noGrp="1"/>
+          </p:cNvSpPr>
+          <p:nvPr>
+            <p:ph type="body" idx="1"/>
+          </p:nvPr>
+        </p:nvSpPr>
+        <p:spPr/>
+        <p:txBody>
+          <a:bodyPr/>
+          <a:lstStyle/>
+          <a:p>
+            <a:r>
+              <a:rPr lang="en-US" altLang="zh-CN" dirty="0"/>
+              <a:t>Need to save as PDF. Then use online software to rescale to 5.2in </a:t>
+            </a:r>
+            <a:r>
+              <a:rPr lang="en-US" altLang="zh-CN"/>
+              <a:t>* 3.9in. </a:t>
+            </a:r>
+            <a:endParaRPr lang="zh-CN" altLang="en-US"/>
+          </a:p>
+        </p:txBody>
+      </p:sp>
+      <p:sp>
+        <p:nvSpPr>
+          <p:cNvPr id="4" name="Slide Number Placeholder 3"/>
+          <p:cNvSpPr>
+            <a:spLocks noGrp="1"/>
+          </p:cNvSpPr>
+          <p:nvPr>
+            <p:ph type="sldNum" sz="quarter" idx="5"/>
+          </p:nvPr>
+        </p:nvSpPr>
+        <p:spPr/>
+        <p:txBody>
+          <a:bodyPr/>
+          <a:lstStyle/>
+          <a:p>
+            <a:fld id="{A43BB5AD-DEAD-4774-9964-964FF55FF586}" type="slidenum">
+              <a:rPr lang="zh-CN" altLang="en-US" smtClean="0"/>
+              <a:t>1</a:t>
+            </a:fld>
+            <a:endParaRPr lang="zh-CN" altLang="en-US"/>
+          </a:p>
+        </p:txBody>
+      </p:sp>
+    </p:spTree>
+    <p:extLst>
+      <p:ext uri="{BB962C8B-B14F-4D97-AF65-F5344CB8AC3E}">
+        <p14:creationId xmlns:p14="http://schemas.microsoft.com/office/powerpoint/2010/main" val="693354743"/>
+      </p:ext>
+    </p:extLst>
+  </p:cSld>
+  <p:clrMapOvr>
+    <a:masterClrMapping/>
+  </p:clrMapOvr>
+</p:notes>
+</file>
+
 <file path=ppt/slideLayouts/slideLayout1.xml><?xml version="1.0" encoding="utf-8"?>
 <p:sldLayout xmlns:a="http://schemas.openxmlformats.org/drawingml/2006/main" xmlns:r="http://schemas.openxmlformats.org/officeDocument/2006/relationships" xmlns:p="http://schemas.openxmlformats.org/presentationml/2006/main" type="title" preserve="1">
   <p:cSld name="Title Slide">
@@ -243,7 +688,7 @@
           <a:p>
             <a:fld id="{EB9CE717-B66F-42F4-9EDB-EAEF10641B24}" type="datetimeFigureOut">
               <a:rPr lang="zh-CN" altLang="en-US" smtClean="0"/>
-              <a:t>2023/6/13</a:t>
+              <a:t>2023/6/15</a:t>
             </a:fld>
             <a:endParaRPr lang="zh-CN" altLang="en-US"/>
           </a:p>
@@ -413,7 +858,7 @@
           <a:p>
             <a:fld id="{EB9CE717-B66F-42F4-9EDB-EAEF10641B24}" type="datetimeFigureOut">
               <a:rPr lang="zh-CN" altLang="en-US" smtClean="0"/>
-              <a:t>2023/6/13</a:t>
+              <a:t>2023/6/15</a:t>
             </a:fld>
             <a:endParaRPr lang="zh-CN" altLang="en-US"/>
           </a:p>
@@ -593,7 +1038,7 @@
           <a:p>
             <a:fld id="{EB9CE717-B66F-42F4-9EDB-EAEF10641B24}" type="datetimeFigureOut">
               <a:rPr lang="zh-CN" altLang="en-US" smtClean="0"/>
-              <a:t>2023/6/13</a:t>
+              <a:t>2023/6/15</a:t>
             </a:fld>
             <a:endParaRPr lang="zh-CN" altLang="en-US"/>
           </a:p>
@@ -763,7 +1208,7 @@
           <a:p>
             <a:fld id="{EB9CE717-B66F-42F4-9EDB-EAEF10641B24}" type="datetimeFigureOut">
               <a:rPr lang="zh-CN" altLang="en-US" smtClean="0"/>
-              <a:t>2023/6/13</a:t>
+              <a:t>2023/6/15</a:t>
             </a:fld>
             <a:endParaRPr lang="zh-CN" altLang="en-US"/>
           </a:p>
@@ -1007,7 +1452,7 @@
           <a:p>
             <a:fld id="{EB9CE717-B66F-42F4-9EDB-EAEF10641B24}" type="datetimeFigureOut">
               <a:rPr lang="zh-CN" altLang="en-US" smtClean="0"/>
-              <a:t>2023/6/13</a:t>
+              <a:t>2023/6/15</a:t>
             </a:fld>
             <a:endParaRPr lang="zh-CN" altLang="en-US"/>
           </a:p>
@@ -1239,7 +1684,7 @@
           <a:p>
             <a:fld id="{EB9CE717-B66F-42F4-9EDB-EAEF10641B24}" type="datetimeFigureOut">
               <a:rPr lang="zh-CN" altLang="en-US" smtClean="0"/>
-              <a:t>2023/6/13</a:t>
+              <a:t>2023/6/15</a:t>
             </a:fld>
             <a:endParaRPr lang="zh-CN" altLang="en-US"/>
           </a:p>
@@ -1606,7 +2051,7 @@
           <a:p>
             <a:fld id="{EB9CE717-B66F-42F4-9EDB-EAEF10641B24}" type="datetimeFigureOut">
               <a:rPr lang="zh-CN" altLang="en-US" smtClean="0"/>
-              <a:t>2023/6/13</a:t>
+              <a:t>2023/6/15</a:t>
             </a:fld>
             <a:endParaRPr lang="zh-CN" altLang="en-US"/>
           </a:p>
@@ -1724,7 +2169,7 @@
           <a:p>
             <a:fld id="{EB9CE717-B66F-42F4-9EDB-EAEF10641B24}" type="datetimeFigureOut">
               <a:rPr lang="zh-CN" altLang="en-US" smtClean="0"/>
-              <a:t>2023/6/13</a:t>
+              <a:t>2023/6/15</a:t>
             </a:fld>
             <a:endParaRPr lang="zh-CN" altLang="en-US"/>
           </a:p>
@@ -1819,7 +2264,7 @@
           <a:p>
             <a:fld id="{EB9CE717-B66F-42F4-9EDB-EAEF10641B24}" type="datetimeFigureOut">
               <a:rPr lang="zh-CN" altLang="en-US" smtClean="0"/>
-              <a:t>2023/6/13</a:t>
+              <a:t>2023/6/15</a:t>
             </a:fld>
             <a:endParaRPr lang="zh-CN" altLang="en-US"/>
           </a:p>
@@ -2096,7 +2541,7 @@
           <a:p>
             <a:fld id="{EB9CE717-B66F-42F4-9EDB-EAEF10641B24}" type="datetimeFigureOut">
               <a:rPr lang="zh-CN" altLang="en-US" smtClean="0"/>
-              <a:t>2023/6/13</a:t>
+              <a:t>2023/6/15</a:t>
             </a:fld>
             <a:endParaRPr lang="zh-CN" altLang="en-US"/>
           </a:p>
@@ -2353,7 +2798,7 @@
           <a:p>
             <a:fld id="{EB9CE717-B66F-42F4-9EDB-EAEF10641B24}" type="datetimeFigureOut">
               <a:rPr lang="zh-CN" altLang="en-US" smtClean="0"/>
-              <a:t>2023/6/13</a:t>
+              <a:t>2023/6/15</a:t>
             </a:fld>
             <a:endParaRPr lang="zh-CN" altLang="en-US"/>
           </a:p>
@@ -2566,7 +3011,7 @@
           <a:p>
             <a:fld id="{EB9CE717-B66F-42F4-9EDB-EAEF10641B24}" type="datetimeFigureOut">
               <a:rPr lang="zh-CN" altLang="en-US" smtClean="0"/>
-              <a:t>2023/6/13</a:t>
+              <a:t>2023/6/15</a:t>
             </a:fld>
             <a:endParaRPr lang="zh-CN" altLang="en-US"/>
           </a:p>
@@ -3375,8 +3820,8 @@
           </a:fontRef>
         </p:style>
       </p:cxnSp>
-      <mc:AlternateContent xmlns:mc="http://schemas.openxmlformats.org/markup-compatibility/2006">
-        <mc:Choice xmlns:a14="http://schemas.microsoft.com/office/drawing/2010/main" Requires="a14">
+      <mc:AlternateContent xmlns:mc="http://schemas.openxmlformats.org/markup-compatibility/2006" xmlns:a14="http://schemas.microsoft.com/office/drawing/2010/main">
+        <mc:Choice Requires="a14">
           <p:sp>
             <p:nvSpPr>
               <p:cNvPr id="395" name="Oval 394">
@@ -3459,7 +3904,7 @@
             </p:txBody>
           </p:sp>
         </mc:Choice>
-        <mc:Fallback>
+        <mc:Fallback xmlns="">
           <p:sp>
             <p:nvSpPr>
               <p:cNvPr id="395" name="Oval 394">
@@ -3483,7 +3928,7 @@
                 <a:avLst/>
               </a:prstGeom>
               <a:blipFill>
-                <a:blip r:embed="rId2"/>
+                <a:blip r:embed="rId3"/>
                 <a:stretch>
                   <a:fillRect/>
                 </a:stretch>
@@ -4253,8 +4698,8 @@
           </a:p>
         </p:txBody>
       </p:sp>
-      <mc:AlternateContent xmlns:mc="http://schemas.openxmlformats.org/markup-compatibility/2006">
-        <mc:Choice xmlns:a14="http://schemas.microsoft.com/office/drawing/2010/main" Requires="a14">
+      <mc:AlternateContent xmlns:mc="http://schemas.openxmlformats.org/markup-compatibility/2006" xmlns:a14="http://schemas.microsoft.com/office/drawing/2010/main">
+        <mc:Choice Requires="a14">
           <p:sp>
             <p:nvSpPr>
               <p:cNvPr id="410" name="Oval 409">
@@ -4328,7 +4773,7 @@
             </p:txBody>
           </p:sp>
         </mc:Choice>
-        <mc:Fallback>
+        <mc:Fallback xmlns="">
           <p:sp>
             <p:nvSpPr>
               <p:cNvPr id="410" name="Oval 409">
@@ -4352,7 +4797,7 @@
                 <a:avLst/>
               </a:prstGeom>
               <a:blipFill>
-                <a:blip r:embed="rId3"/>
+                <a:blip r:embed="rId4"/>
                 <a:stretch>
                   <a:fillRect/>
                 </a:stretch>
@@ -4432,8 +4877,8 @@
           </a:p>
         </p:txBody>
       </p:sp>
-      <mc:AlternateContent xmlns:mc="http://schemas.openxmlformats.org/markup-compatibility/2006">
-        <mc:Choice xmlns:a14="http://schemas.microsoft.com/office/drawing/2010/main" Requires="a14">
+      <mc:AlternateContent xmlns:mc="http://schemas.openxmlformats.org/markup-compatibility/2006" xmlns:a14="http://schemas.microsoft.com/office/drawing/2010/main">
+        <mc:Choice Requires="a14">
           <p:sp>
             <p:nvSpPr>
               <p:cNvPr id="412" name="TextBox 411">
@@ -4486,7 +4931,7 @@
             </p:txBody>
           </p:sp>
         </mc:Choice>
-        <mc:Fallback>
+        <mc:Fallback xmlns="">
           <p:sp>
             <p:nvSpPr>
               <p:cNvPr id="412" name="TextBox 411">
@@ -4510,7 +4955,7 @@
                 <a:avLst/>
               </a:prstGeom>
               <a:blipFill>
-                <a:blip r:embed="rId4"/>
+                <a:blip r:embed="rId5"/>
                 <a:stretch>
                   <a:fillRect/>
                 </a:stretch>
@@ -4534,8 +4979,8 @@
           </p:sp>
         </mc:Fallback>
       </mc:AlternateContent>
-      <mc:AlternateContent xmlns:mc="http://schemas.openxmlformats.org/markup-compatibility/2006">
-        <mc:Choice xmlns:a14="http://schemas.microsoft.com/office/drawing/2010/main" Requires="a14">
+      <mc:AlternateContent xmlns:mc="http://schemas.openxmlformats.org/markup-compatibility/2006" xmlns:a14="http://schemas.microsoft.com/office/drawing/2010/main">
+        <mc:Choice Requires="a14">
           <p:sp>
             <p:nvSpPr>
               <p:cNvPr id="413" name="TextBox 412">
@@ -4610,7 +5055,7 @@
             </p:txBody>
           </p:sp>
         </mc:Choice>
-        <mc:Fallback>
+        <mc:Fallback xmlns="">
           <p:sp>
             <p:nvSpPr>
               <p:cNvPr id="413" name="TextBox 412">
@@ -4634,7 +5079,7 @@
                 <a:avLst/>
               </a:prstGeom>
               <a:blipFill>
-                <a:blip r:embed="rId5"/>
+                <a:blip r:embed="rId6"/>
                 <a:stretch>
                   <a:fillRect b="-1316"/>
                 </a:stretch>
@@ -4658,8 +5103,8 @@
           </p:sp>
         </mc:Fallback>
       </mc:AlternateContent>
-      <mc:AlternateContent xmlns:mc="http://schemas.openxmlformats.org/markup-compatibility/2006">
-        <mc:Choice xmlns:a14="http://schemas.microsoft.com/office/drawing/2010/main" Requires="a14">
+      <mc:AlternateContent xmlns:mc="http://schemas.openxmlformats.org/markup-compatibility/2006" xmlns:a14="http://schemas.microsoft.com/office/drawing/2010/main">
+        <mc:Choice Requires="a14">
           <p:sp>
             <p:nvSpPr>
               <p:cNvPr id="414" name="TextBox 413">
@@ -4712,7 +5157,7 @@
             </p:txBody>
           </p:sp>
         </mc:Choice>
-        <mc:Fallback>
+        <mc:Fallback xmlns="">
           <p:sp>
             <p:nvSpPr>
               <p:cNvPr id="414" name="TextBox 413">
@@ -4736,7 +5181,7 @@
                 <a:avLst/>
               </a:prstGeom>
               <a:blipFill>
-                <a:blip r:embed="rId6"/>
+                <a:blip r:embed="rId7"/>
                 <a:stretch>
                   <a:fillRect/>
                 </a:stretch>
@@ -4760,8 +5205,8 @@
           </p:sp>
         </mc:Fallback>
       </mc:AlternateContent>
-      <mc:AlternateContent xmlns:mc="http://schemas.openxmlformats.org/markup-compatibility/2006">
-        <mc:Choice xmlns:a14="http://schemas.microsoft.com/office/drawing/2010/main" Requires="a14">
+      <mc:AlternateContent xmlns:mc="http://schemas.openxmlformats.org/markup-compatibility/2006" xmlns:a14="http://schemas.microsoft.com/office/drawing/2010/main">
+        <mc:Choice Requires="a14">
           <p:sp>
             <p:nvSpPr>
               <p:cNvPr id="415" name="TextBox 414">
@@ -4814,7 +5259,7 @@
             </p:txBody>
           </p:sp>
         </mc:Choice>
-        <mc:Fallback>
+        <mc:Fallback xmlns="">
           <p:sp>
             <p:nvSpPr>
               <p:cNvPr id="415" name="TextBox 414">
@@ -4838,7 +5283,7 @@
                 <a:avLst/>
               </a:prstGeom>
               <a:blipFill>
-                <a:blip r:embed="rId7"/>
+                <a:blip r:embed="rId8"/>
                 <a:stretch>
                   <a:fillRect/>
                 </a:stretch>
@@ -4862,8 +5307,8 @@
           </p:sp>
         </mc:Fallback>
       </mc:AlternateContent>
-      <mc:AlternateContent xmlns:mc="http://schemas.openxmlformats.org/markup-compatibility/2006">
-        <mc:Choice xmlns:a14="http://schemas.microsoft.com/office/drawing/2010/main" Requires="a14">
+      <mc:AlternateContent xmlns:mc="http://schemas.openxmlformats.org/markup-compatibility/2006" xmlns:a14="http://schemas.microsoft.com/office/drawing/2010/main">
+        <mc:Choice Requires="a14">
           <p:sp>
             <p:nvSpPr>
               <p:cNvPr id="416" name="TextBox 415">
@@ -4938,7 +5383,7 @@
             </p:txBody>
           </p:sp>
         </mc:Choice>
-        <mc:Fallback>
+        <mc:Fallback xmlns="">
           <p:sp>
             <p:nvSpPr>
               <p:cNvPr id="416" name="TextBox 415">
@@ -4962,7 +5407,7 @@
                 <a:avLst/>
               </a:prstGeom>
               <a:blipFill>
-                <a:blip r:embed="rId8"/>
+                <a:blip r:embed="rId9"/>
                 <a:stretch>
                   <a:fillRect b="-1316"/>
                 </a:stretch>
@@ -4986,8 +5431,8 @@
           </p:sp>
         </mc:Fallback>
       </mc:AlternateContent>
-      <mc:AlternateContent xmlns:mc="http://schemas.openxmlformats.org/markup-compatibility/2006">
-        <mc:Choice xmlns:a14="http://schemas.microsoft.com/office/drawing/2010/main" Requires="a14">
+      <mc:AlternateContent xmlns:mc="http://schemas.openxmlformats.org/markup-compatibility/2006" xmlns:a14="http://schemas.microsoft.com/office/drawing/2010/main">
+        <mc:Choice Requires="a14">
           <p:sp>
             <p:nvSpPr>
               <p:cNvPr id="417" name="TextBox 416">
@@ -5052,7 +5497,7 @@
             </p:txBody>
           </p:sp>
         </mc:Choice>
-        <mc:Fallback>
+        <mc:Fallback xmlns="">
           <p:sp>
             <p:nvSpPr>
               <p:cNvPr id="417" name="TextBox 416">
@@ -5076,7 +5521,7 @@
                 <a:avLst/>
               </a:prstGeom>
               <a:blipFill>
-                <a:blip r:embed="rId9"/>
+                <a:blip r:embed="rId10"/>
                 <a:stretch>
                   <a:fillRect t="-3947" r="-44828"/>
                 </a:stretch>
@@ -5100,8 +5545,8 @@
           </p:sp>
         </mc:Fallback>
       </mc:AlternateContent>
-      <mc:AlternateContent xmlns:mc="http://schemas.openxmlformats.org/markup-compatibility/2006">
-        <mc:Choice xmlns:a14="http://schemas.microsoft.com/office/drawing/2010/main" Requires="a14">
+      <mc:AlternateContent xmlns:mc="http://schemas.openxmlformats.org/markup-compatibility/2006" xmlns:a14="http://schemas.microsoft.com/office/drawing/2010/main">
+        <mc:Choice Requires="a14">
           <p:sp>
             <p:nvSpPr>
               <p:cNvPr id="418" name="TextBox 417">
@@ -5176,7 +5621,7 @@
             </p:txBody>
           </p:sp>
         </mc:Choice>
-        <mc:Fallback>
+        <mc:Fallback xmlns="">
           <p:sp>
             <p:nvSpPr>
               <p:cNvPr id="418" name="TextBox 417">
@@ -5200,7 +5645,7 @@
                 <a:avLst/>
               </a:prstGeom>
               <a:blipFill>
-                <a:blip r:embed="rId10"/>
+                <a:blip r:embed="rId11"/>
                 <a:stretch>
                   <a:fillRect b="-2632"/>
                 </a:stretch>
@@ -5224,8 +5669,8 @@
           </p:sp>
         </mc:Fallback>
       </mc:AlternateContent>
-      <mc:AlternateContent xmlns:mc="http://schemas.openxmlformats.org/markup-compatibility/2006">
-        <mc:Choice xmlns:a14="http://schemas.microsoft.com/office/drawing/2010/main" Requires="a14">
+      <mc:AlternateContent xmlns:mc="http://schemas.openxmlformats.org/markup-compatibility/2006" xmlns:a14="http://schemas.microsoft.com/office/drawing/2010/main">
+        <mc:Choice Requires="a14">
           <p:sp>
             <p:nvSpPr>
               <p:cNvPr id="419" name="TextBox 418">
@@ -5300,7 +5745,7 @@
             </p:txBody>
           </p:sp>
         </mc:Choice>
-        <mc:Fallback>
+        <mc:Fallback xmlns="">
           <p:sp>
             <p:nvSpPr>
               <p:cNvPr id="419" name="TextBox 418">
@@ -5324,7 +5769,7 @@
                 <a:avLst/>
               </a:prstGeom>
               <a:blipFill>
-                <a:blip r:embed="rId11"/>
+                <a:blip r:embed="rId12"/>
                 <a:stretch>
                   <a:fillRect b="-2632"/>
                 </a:stretch>
@@ -5348,8 +5793,8 @@
           </p:sp>
         </mc:Fallback>
       </mc:AlternateContent>
-      <mc:AlternateContent xmlns:mc="http://schemas.openxmlformats.org/markup-compatibility/2006">
-        <mc:Choice xmlns:a14="http://schemas.microsoft.com/office/drawing/2010/main" Requires="a14">
+      <mc:AlternateContent xmlns:mc="http://schemas.openxmlformats.org/markup-compatibility/2006" xmlns:a14="http://schemas.microsoft.com/office/drawing/2010/main">
+        <mc:Choice Requires="a14">
           <p:sp>
             <p:nvSpPr>
               <p:cNvPr id="420" name="TextBox 419">
@@ -5424,7 +5869,7 @@
             </p:txBody>
           </p:sp>
         </mc:Choice>
-        <mc:Fallback>
+        <mc:Fallback xmlns="">
           <p:sp>
             <p:nvSpPr>
               <p:cNvPr id="420" name="TextBox 419">
@@ -5448,7 +5893,7 @@
                 <a:avLst/>
               </a:prstGeom>
               <a:blipFill>
-                <a:blip r:embed="rId12"/>
+                <a:blip r:embed="rId13"/>
                 <a:stretch>
                   <a:fillRect b="-2632"/>
                 </a:stretch>
@@ -5472,8 +5917,8 @@
           </p:sp>
         </mc:Fallback>
       </mc:AlternateContent>
-      <mc:AlternateContent xmlns:mc="http://schemas.openxmlformats.org/markup-compatibility/2006">
-        <mc:Choice xmlns:a14="http://schemas.microsoft.com/office/drawing/2010/main" Requires="a14">
+      <mc:AlternateContent xmlns:mc="http://schemas.openxmlformats.org/markup-compatibility/2006" xmlns:a14="http://schemas.microsoft.com/office/drawing/2010/main">
+        <mc:Choice Requires="a14">
           <p:sp>
             <p:nvSpPr>
               <p:cNvPr id="421" name="TextBox 420">
@@ -5548,7 +5993,7 @@
             </p:txBody>
           </p:sp>
         </mc:Choice>
-        <mc:Fallback>
+        <mc:Fallback xmlns="">
           <p:sp>
             <p:nvSpPr>
               <p:cNvPr id="421" name="TextBox 420">
@@ -5572,7 +6017,7 @@
                 <a:avLst/>
               </a:prstGeom>
               <a:blipFill>
-                <a:blip r:embed="rId13"/>
+                <a:blip r:embed="rId14"/>
                 <a:stretch>
                   <a:fillRect b="-2667"/>
                 </a:stretch>
@@ -5650,8 +6095,8 @@
           </a:p>
         </p:txBody>
       </p:sp>
-      <mc:AlternateContent xmlns:mc="http://schemas.openxmlformats.org/markup-compatibility/2006">
-        <mc:Choice xmlns:a14="http://schemas.microsoft.com/office/drawing/2010/main" Requires="a14">
+      <mc:AlternateContent xmlns:mc="http://schemas.openxmlformats.org/markup-compatibility/2006" xmlns:a14="http://schemas.microsoft.com/office/drawing/2010/main">
+        <mc:Choice Requires="a14">
           <p:sp>
             <p:nvSpPr>
               <p:cNvPr id="423" name="TextBox 422">
@@ -5741,7 +6186,7 @@
             </p:txBody>
           </p:sp>
         </mc:Choice>
-        <mc:Fallback>
+        <mc:Fallback xmlns="">
           <p:sp>
             <p:nvSpPr>
               <p:cNvPr id="423" name="TextBox 422">
@@ -5765,7 +6210,7 @@
                 <a:avLst/>
               </a:prstGeom>
               <a:blipFill>
-                <a:blip r:embed="rId14"/>
+                <a:blip r:embed="rId15"/>
                 <a:stretch>
                   <a:fillRect t="-4000" b="-2667"/>
                 </a:stretch>
@@ -5789,8 +6234,8 @@
           </p:sp>
         </mc:Fallback>
       </mc:AlternateContent>
-      <mc:AlternateContent xmlns:mc="http://schemas.openxmlformats.org/markup-compatibility/2006">
-        <mc:Choice xmlns:a14="http://schemas.microsoft.com/office/drawing/2010/main" Requires="a14">
+      <mc:AlternateContent xmlns:mc="http://schemas.openxmlformats.org/markup-compatibility/2006" xmlns:a14="http://schemas.microsoft.com/office/drawing/2010/main">
+        <mc:Choice Requires="a14">
           <p:sp>
             <p:nvSpPr>
               <p:cNvPr id="424" name="TextBox 423">
@@ -5929,7 +6374,7 @@
             </p:txBody>
           </p:sp>
         </mc:Choice>
-        <mc:Fallback>
+        <mc:Fallback xmlns="">
           <p:sp>
             <p:nvSpPr>
               <p:cNvPr id="424" name="TextBox 423">
@@ -5953,7 +6398,7 @@
                 <a:avLst/>
               </a:prstGeom>
               <a:blipFill>
-                <a:blip r:embed="rId15"/>
+                <a:blip r:embed="rId16"/>
                 <a:stretch>
                   <a:fillRect b="-13115"/>
                 </a:stretch>
@@ -6031,8 +6476,8 @@
           </a:p>
         </p:txBody>
       </p:sp>
-      <mc:AlternateContent xmlns:mc="http://schemas.openxmlformats.org/markup-compatibility/2006">
-        <mc:Choice xmlns:a14="http://schemas.microsoft.com/office/drawing/2010/main" Requires="a14">
+      <mc:AlternateContent xmlns:mc="http://schemas.openxmlformats.org/markup-compatibility/2006" xmlns:a14="http://schemas.microsoft.com/office/drawing/2010/main">
+        <mc:Choice Requires="a14">
           <p:sp>
             <p:nvSpPr>
               <p:cNvPr id="428" name="TextBox 427">
@@ -6171,7 +6616,7 @@
             </p:txBody>
           </p:sp>
         </mc:Choice>
-        <mc:Fallback>
+        <mc:Fallback xmlns="">
           <p:sp>
             <p:nvSpPr>
               <p:cNvPr id="428" name="TextBox 427">
@@ -6195,7 +6640,7 @@
                 <a:avLst/>
               </a:prstGeom>
               <a:blipFill>
-                <a:blip r:embed="rId16"/>
+                <a:blip r:embed="rId17"/>
                 <a:stretch>
                   <a:fillRect b="-13115"/>
                 </a:stretch>
@@ -6219,8 +6664,8 @@
           </p:sp>
         </mc:Fallback>
       </mc:AlternateContent>
-      <mc:AlternateContent xmlns:mc="http://schemas.openxmlformats.org/markup-compatibility/2006">
-        <mc:Choice xmlns:a14="http://schemas.microsoft.com/office/drawing/2010/main" Requires="a14">
+      <mc:AlternateContent xmlns:mc="http://schemas.openxmlformats.org/markup-compatibility/2006" xmlns:a14="http://schemas.microsoft.com/office/drawing/2010/main">
+        <mc:Choice Requires="a14">
           <p:sp>
             <p:nvSpPr>
               <p:cNvPr id="429" name="TextBox 428">
@@ -6295,7 +6740,7 @@
             </p:txBody>
           </p:sp>
         </mc:Choice>
-        <mc:Fallback>
+        <mc:Fallback xmlns="">
           <p:sp>
             <p:nvSpPr>
               <p:cNvPr id="429" name="TextBox 428">
@@ -6319,7 +6764,7 @@
                 <a:avLst/>
               </a:prstGeom>
               <a:blipFill>
-                <a:blip r:embed="rId17"/>
+                <a:blip r:embed="rId18"/>
                 <a:stretch>
                   <a:fillRect b="-2632"/>
                 </a:stretch>
@@ -6343,8 +6788,8 @@
           </p:sp>
         </mc:Fallback>
       </mc:AlternateContent>
-      <mc:AlternateContent xmlns:mc="http://schemas.openxmlformats.org/markup-compatibility/2006">
-        <mc:Choice xmlns:a14="http://schemas.microsoft.com/office/drawing/2010/main" Requires="a14">
+      <mc:AlternateContent xmlns:mc="http://schemas.openxmlformats.org/markup-compatibility/2006" xmlns:a14="http://schemas.microsoft.com/office/drawing/2010/main">
+        <mc:Choice Requires="a14">
           <p:sp>
             <p:nvSpPr>
               <p:cNvPr id="430" name="TextBox 429">
@@ -6419,7 +6864,7 @@
             </p:txBody>
           </p:sp>
         </mc:Choice>
-        <mc:Fallback>
+        <mc:Fallback xmlns="">
           <p:sp>
             <p:nvSpPr>
               <p:cNvPr id="430" name="TextBox 429">
@@ -6443,7 +6888,7 @@
                 <a:avLst/>
               </a:prstGeom>
               <a:blipFill>
-                <a:blip r:embed="rId18"/>
+                <a:blip r:embed="rId19"/>
                 <a:stretch>
                   <a:fillRect b="-2632"/>
                 </a:stretch>
@@ -6761,8 +7206,8 @@
           </a:p>
         </p:txBody>
       </p:sp>
-      <mc:AlternateContent xmlns:mc="http://schemas.openxmlformats.org/markup-compatibility/2006">
-        <mc:Choice xmlns:a14="http://schemas.microsoft.com/office/drawing/2010/main" Requires="a14">
+      <mc:AlternateContent xmlns:mc="http://schemas.openxmlformats.org/markup-compatibility/2006" xmlns:a14="http://schemas.microsoft.com/office/drawing/2010/main">
+        <mc:Choice Requires="a14">
           <p:sp>
             <p:nvSpPr>
               <p:cNvPr id="437" name="TextBox 436">
@@ -6824,7 +7269,7 @@
             </p:txBody>
           </p:sp>
         </mc:Choice>
-        <mc:Fallback>
+        <mc:Fallback xmlns="">
           <p:sp>
             <p:nvSpPr>
               <p:cNvPr id="437" name="TextBox 436">
@@ -6848,7 +7293,7 @@
                 <a:avLst/>
               </a:prstGeom>
               <a:blipFill>
-                <a:blip r:embed="rId19"/>
+                <a:blip r:embed="rId20"/>
                 <a:stretch>
                   <a:fillRect/>
                 </a:stretch>
@@ -6872,8 +7317,8 @@
           </p:sp>
         </mc:Fallback>
       </mc:AlternateContent>
-      <mc:AlternateContent xmlns:mc="http://schemas.openxmlformats.org/markup-compatibility/2006">
-        <mc:Choice xmlns:a14="http://schemas.microsoft.com/office/drawing/2010/main" Requires="a14">
+      <mc:AlternateContent xmlns:mc="http://schemas.openxmlformats.org/markup-compatibility/2006" xmlns:a14="http://schemas.microsoft.com/office/drawing/2010/main">
+        <mc:Choice Requires="a14">
           <p:sp>
             <p:nvSpPr>
               <p:cNvPr id="438" name="TextBox 437">
@@ -6935,7 +7380,7 @@
             </p:txBody>
           </p:sp>
         </mc:Choice>
-        <mc:Fallback>
+        <mc:Fallback xmlns="">
           <p:sp>
             <p:nvSpPr>
               <p:cNvPr id="438" name="TextBox 437">
@@ -6959,7 +7404,7 @@
                 <a:avLst/>
               </a:prstGeom>
               <a:blipFill>
-                <a:blip r:embed="rId20"/>
+                <a:blip r:embed="rId21"/>
                 <a:stretch>
                   <a:fillRect/>
                 </a:stretch>
@@ -6998,13 +7443,13 @@
           <p:nvPr/>
         </p:nvPicPr>
         <p:blipFill>
-          <a:blip r:embed="rId21">
+          <a:blip r:embed="rId22">
             <a:extLst>
               <a:ext uri="{28A0092B-C50C-407E-A947-70E740481C1C}">
                 <a14:useLocalDpi xmlns:a14="http://schemas.microsoft.com/office/drawing/2010/main" val="0"/>
               </a:ext>
               <a:ext uri="{96DAC541-7B7A-43D3-8B79-37D633B846F1}">
-                <asvg:svgBlip xmlns:asvg="http://schemas.microsoft.com/office/drawing/2016/SVG/main" r:embed="rId22"/>
+                <asvg:svgBlip xmlns:asvg="http://schemas.microsoft.com/office/drawing/2016/SVG/main" r:embed="rId23"/>
               </a:ext>
             </a:extLst>
           </a:blip>
@@ -7748,8 +8193,8 @@
           </a:p>
         </p:txBody>
       </p:sp>
-      <mc:AlternateContent xmlns:mc="http://schemas.openxmlformats.org/markup-compatibility/2006">
-        <mc:Choice xmlns:a14="http://schemas.microsoft.com/office/drawing/2010/main" Requires="a14">
+      <mc:AlternateContent xmlns:mc="http://schemas.openxmlformats.org/markup-compatibility/2006" xmlns:a14="http://schemas.microsoft.com/office/drawing/2010/main">
+        <mc:Choice Requires="a14">
           <p:sp>
             <p:nvSpPr>
               <p:cNvPr id="456" name="TextBox 455">
@@ -7816,7 +8261,7 @@
             </p:txBody>
           </p:sp>
         </mc:Choice>
-        <mc:Fallback>
+        <mc:Fallback xmlns="">
           <p:sp>
             <p:nvSpPr>
               <p:cNvPr id="456" name="TextBox 455">
@@ -7840,7 +8285,7 @@
                 <a:avLst/>
               </a:prstGeom>
               <a:blipFill>
-                <a:blip r:embed="rId23"/>
+                <a:blip r:embed="rId24"/>
                 <a:stretch>
                   <a:fillRect/>
                 </a:stretch>
@@ -7861,8 +8306,8 @@
           </p:sp>
         </mc:Fallback>
       </mc:AlternateContent>
-      <mc:AlternateContent xmlns:mc="http://schemas.openxmlformats.org/markup-compatibility/2006">
-        <mc:Choice xmlns:a14="http://schemas.microsoft.com/office/drawing/2010/main" Requires="a14">
+      <mc:AlternateContent xmlns:mc="http://schemas.openxmlformats.org/markup-compatibility/2006" xmlns:a14="http://schemas.microsoft.com/office/drawing/2010/main">
+        <mc:Choice Requires="a14">
           <p:sp>
             <p:nvSpPr>
               <p:cNvPr id="457" name="TextBox 456">
@@ -7929,7 +8374,7 @@
             </p:txBody>
           </p:sp>
         </mc:Choice>
-        <mc:Fallback>
+        <mc:Fallback xmlns="">
           <p:sp>
             <p:nvSpPr>
               <p:cNvPr id="457" name="TextBox 456">
@@ -7953,7 +8398,7 @@
                 <a:avLst/>
               </a:prstGeom>
               <a:blipFill>
-                <a:blip r:embed="rId24"/>
+                <a:blip r:embed="rId25"/>
                 <a:stretch>
                   <a:fillRect/>
                 </a:stretch>
@@ -8337,8 +8782,8 @@
           </a:fontRef>
         </p:style>
       </p:cxnSp>
-      <mc:AlternateContent xmlns:mc="http://schemas.openxmlformats.org/markup-compatibility/2006">
-        <mc:Choice xmlns:a14="http://schemas.microsoft.com/office/drawing/2010/main" Requires="a14">
+      <mc:AlternateContent xmlns:mc="http://schemas.openxmlformats.org/markup-compatibility/2006" xmlns:a14="http://schemas.microsoft.com/office/drawing/2010/main">
+        <mc:Choice Requires="a14">
           <p:sp>
             <p:nvSpPr>
               <p:cNvPr id="466" name="TextBox 465">
@@ -8406,7 +8851,7 @@
             </p:txBody>
           </p:sp>
         </mc:Choice>
-        <mc:Fallback>
+        <mc:Fallback xmlns="">
           <p:sp>
             <p:nvSpPr>
               <p:cNvPr id="466" name="TextBox 465">
@@ -8430,7 +8875,7 @@
                 <a:avLst/>
               </a:prstGeom>
               <a:blipFill>
-                <a:blip r:embed="rId25"/>
+                <a:blip r:embed="rId26"/>
                 <a:stretch>
                   <a:fillRect r="-9524" b="-15152"/>
                 </a:stretch>
@@ -8711,8 +9156,8 @@
           </a:fontRef>
         </p:style>
       </p:cxnSp>
-      <mc:AlternateContent xmlns:mc="http://schemas.openxmlformats.org/markup-compatibility/2006">
-        <mc:Choice xmlns:a14="http://schemas.microsoft.com/office/drawing/2010/main" Requires="a14">
+      <mc:AlternateContent xmlns:mc="http://schemas.openxmlformats.org/markup-compatibility/2006" xmlns:a14="http://schemas.microsoft.com/office/drawing/2010/main">
+        <mc:Choice Requires="a14">
           <p:sp>
             <p:nvSpPr>
               <p:cNvPr id="476" name="TextBox 475">
@@ -8780,7 +9225,7 @@
             </p:txBody>
           </p:sp>
         </mc:Choice>
-        <mc:Fallback>
+        <mc:Fallback xmlns="">
           <p:sp>
             <p:nvSpPr>
               <p:cNvPr id="476" name="TextBox 475">
@@ -8804,7 +9249,7 @@
                 <a:avLst/>
               </a:prstGeom>
               <a:blipFill>
-                <a:blip r:embed="rId26"/>
+                <a:blip r:embed="rId27"/>
                 <a:stretch>
                   <a:fillRect r="-7619" b="-15152"/>
                 </a:stretch>
@@ -9042,8 +9487,8 @@
           </a:fontRef>
         </p:style>
       </p:cxnSp>
-      <mc:AlternateContent xmlns:mc="http://schemas.openxmlformats.org/markup-compatibility/2006">
-        <mc:Choice xmlns:a14="http://schemas.microsoft.com/office/drawing/2010/main" Requires="a14">
+      <mc:AlternateContent xmlns:mc="http://schemas.openxmlformats.org/markup-compatibility/2006" xmlns:a14="http://schemas.microsoft.com/office/drawing/2010/main">
+        <mc:Choice Requires="a14">
           <p:sp>
             <p:nvSpPr>
               <p:cNvPr id="483" name="TextBox 482">
@@ -9110,7 +9555,7 @@
             </p:txBody>
           </p:sp>
         </mc:Choice>
-        <mc:Fallback>
+        <mc:Fallback xmlns="">
           <p:sp>
             <p:nvSpPr>
               <p:cNvPr id="483" name="TextBox 482">
@@ -9134,7 +9579,7 @@
                 <a:avLst/>
               </a:prstGeom>
               <a:blipFill>
-                <a:blip r:embed="rId27"/>
+                <a:blip r:embed="rId28"/>
                 <a:stretch>
                   <a:fillRect/>
                 </a:stretch>
@@ -9198,8 +9643,8 @@
           </a:fontRef>
         </p:style>
       </p:cxnSp>
-      <mc:AlternateContent xmlns:mc="http://schemas.openxmlformats.org/markup-compatibility/2006">
-        <mc:Choice xmlns:a14="http://schemas.microsoft.com/office/drawing/2010/main" Requires="a14">
+      <mc:AlternateContent xmlns:mc="http://schemas.openxmlformats.org/markup-compatibility/2006" xmlns:a14="http://schemas.microsoft.com/office/drawing/2010/main">
+        <mc:Choice Requires="a14">
           <p:sp>
             <p:nvSpPr>
               <p:cNvPr id="485" name="TextBox 484">
@@ -9271,7 +9716,7 @@
             </p:txBody>
           </p:sp>
         </mc:Choice>
-        <mc:Fallback>
+        <mc:Fallback xmlns="">
           <p:sp>
             <p:nvSpPr>
               <p:cNvPr id="485" name="TextBox 484">
@@ -9295,7 +9740,7 @@
                 <a:avLst/>
               </a:prstGeom>
               <a:blipFill>
-                <a:blip r:embed="rId28"/>
+                <a:blip r:embed="rId29"/>
                 <a:stretch>
                   <a:fillRect r="-32381"/>
                 </a:stretch>
@@ -9484,8 +9929,8 @@
           </a:fontRef>
         </p:style>
       </p:cxnSp>
-      <mc:AlternateContent xmlns:mc="http://schemas.openxmlformats.org/markup-compatibility/2006">
-        <mc:Choice xmlns:a14="http://schemas.microsoft.com/office/drawing/2010/main" Requires="a14">
+      <mc:AlternateContent xmlns:mc="http://schemas.openxmlformats.org/markup-compatibility/2006" xmlns:a14="http://schemas.microsoft.com/office/drawing/2010/main">
+        <mc:Choice Requires="a14">
           <p:sp>
             <p:nvSpPr>
               <p:cNvPr id="490" name="TextBox 489">
@@ -9535,7 +9980,7 @@
             </p:txBody>
           </p:sp>
         </mc:Choice>
-        <mc:Fallback>
+        <mc:Fallback xmlns="">
           <p:sp>
             <p:nvSpPr>
               <p:cNvPr id="490" name="TextBox 489">
@@ -9559,7 +10004,7 @@
                 <a:avLst/>
               </a:prstGeom>
               <a:blipFill>
-                <a:blip r:embed="rId29"/>
+                <a:blip r:embed="rId30"/>
                 <a:stretch>
                   <a:fillRect/>
                 </a:stretch>
@@ -9661,8 +10106,8 @@
           </a:p>
         </p:txBody>
       </p:sp>
-      <mc:AlternateContent xmlns:mc="http://schemas.openxmlformats.org/markup-compatibility/2006">
-        <mc:Choice xmlns:a14="http://schemas.microsoft.com/office/drawing/2010/main" Requires="a14">
+      <mc:AlternateContent xmlns:mc="http://schemas.openxmlformats.org/markup-compatibility/2006" xmlns:a14="http://schemas.microsoft.com/office/drawing/2010/main">
+        <mc:Choice Requires="a14">
           <p:sp>
             <p:nvSpPr>
               <p:cNvPr id="493" name="TextBox 492">
@@ -9719,7 +10164,7 @@
             </p:txBody>
           </p:sp>
         </mc:Choice>
-        <mc:Fallback>
+        <mc:Fallback xmlns="">
           <p:sp>
             <p:nvSpPr>
               <p:cNvPr id="493" name="TextBox 492">
@@ -9743,7 +10188,7 @@
                 <a:avLst/>
               </a:prstGeom>
               <a:blipFill>
-                <a:blip r:embed="rId30"/>
+                <a:blip r:embed="rId31"/>
                 <a:stretch>
                   <a:fillRect/>
                 </a:stretch>
@@ -9764,8 +10209,8 @@
           </p:sp>
         </mc:Fallback>
       </mc:AlternateContent>
-      <mc:AlternateContent xmlns:mc="http://schemas.openxmlformats.org/markup-compatibility/2006">
-        <mc:Choice xmlns:a14="http://schemas.microsoft.com/office/drawing/2010/main" Requires="a14">
+      <mc:AlternateContent xmlns:mc="http://schemas.openxmlformats.org/markup-compatibility/2006" xmlns:a14="http://schemas.microsoft.com/office/drawing/2010/main">
+        <mc:Choice Requires="a14">
           <p:sp>
             <p:nvSpPr>
               <p:cNvPr id="494" name="TextBox 493">
@@ -9815,7 +10260,7 @@
             </p:txBody>
           </p:sp>
         </mc:Choice>
-        <mc:Fallback>
+        <mc:Fallback xmlns="">
           <p:sp>
             <p:nvSpPr>
               <p:cNvPr id="494" name="TextBox 493">
@@ -9839,7 +10284,7 @@
                 <a:avLst/>
               </a:prstGeom>
               <a:blipFill>
-                <a:blip r:embed="rId31"/>
+                <a:blip r:embed="rId32"/>
                 <a:stretch>
                   <a:fillRect/>
                 </a:stretch>
@@ -9860,8 +10305,8 @@
           </p:sp>
         </mc:Fallback>
       </mc:AlternateContent>
-      <mc:AlternateContent xmlns:mc="http://schemas.openxmlformats.org/markup-compatibility/2006">
-        <mc:Choice xmlns:a14="http://schemas.microsoft.com/office/drawing/2010/main" Requires="a14">
+      <mc:AlternateContent xmlns:mc="http://schemas.openxmlformats.org/markup-compatibility/2006" xmlns:a14="http://schemas.microsoft.com/office/drawing/2010/main">
+        <mc:Choice Requires="a14">
           <p:sp>
             <p:nvSpPr>
               <p:cNvPr id="496" name="TextBox 495">
@@ -9911,7 +10356,7 @@
             </p:txBody>
           </p:sp>
         </mc:Choice>
-        <mc:Fallback>
+        <mc:Fallback xmlns="">
           <p:sp>
             <p:nvSpPr>
               <p:cNvPr id="496" name="TextBox 495">
@@ -9935,7 +10380,7 @@
                 <a:avLst/>
               </a:prstGeom>
               <a:blipFill>
-                <a:blip r:embed="rId32"/>
+                <a:blip r:embed="rId33"/>
                 <a:stretch>
                   <a:fillRect/>
                 </a:stretch>
@@ -10744,8 +11189,8 @@
           </a:p>
         </p:txBody>
       </p:sp>
-      <mc:AlternateContent xmlns:mc="http://schemas.openxmlformats.org/markup-compatibility/2006">
-        <mc:Choice xmlns:a14="http://schemas.microsoft.com/office/drawing/2010/main" Requires="a14">
+      <mc:AlternateContent xmlns:mc="http://schemas.openxmlformats.org/markup-compatibility/2006" xmlns:a14="http://schemas.microsoft.com/office/drawing/2010/main">
+        <mc:Choice Requires="a14">
           <p:sp>
             <p:nvSpPr>
               <p:cNvPr id="513" name="TextBox 512">
@@ -10826,7 +11271,7 @@
             </p:txBody>
           </p:sp>
         </mc:Choice>
-        <mc:Fallback>
+        <mc:Fallback xmlns="">
           <p:sp>
             <p:nvSpPr>
               <p:cNvPr id="513" name="TextBox 512">
@@ -10850,7 +11295,7 @@
                 <a:avLst/>
               </a:prstGeom>
               <a:blipFill>
-                <a:blip r:embed="rId33"/>
+                <a:blip r:embed="rId34"/>
                 <a:stretch>
                   <a:fillRect r="-3239" b="-17105"/>
                 </a:stretch>
@@ -10928,8 +11373,8 @@
           </a:p>
         </p:txBody>
       </p:sp>
-      <mc:AlternateContent xmlns:mc="http://schemas.openxmlformats.org/markup-compatibility/2006">
-        <mc:Choice xmlns:a14="http://schemas.microsoft.com/office/drawing/2010/main" Requires="a14">
+      <mc:AlternateContent xmlns:mc="http://schemas.openxmlformats.org/markup-compatibility/2006" xmlns:a14="http://schemas.microsoft.com/office/drawing/2010/main">
+        <mc:Choice Requires="a14">
           <p:sp>
             <p:nvSpPr>
               <p:cNvPr id="427" name="TextBox 426">
@@ -11019,7 +11464,7 @@
             </p:txBody>
           </p:sp>
         </mc:Choice>
-        <mc:Fallback>
+        <mc:Fallback xmlns="">
           <p:sp>
             <p:nvSpPr>
               <p:cNvPr id="427" name="TextBox 426">
@@ -11043,7 +11488,7 @@
                 <a:avLst/>
               </a:prstGeom>
               <a:blipFill>
-                <a:blip r:embed="rId34"/>
+                <a:blip r:embed="rId35"/>
                 <a:stretch>
                   <a:fillRect t="-3947" b="-1316"/>
                 </a:stretch>
@@ -11381,8 +11826,8 @@
           </a:p>
         </p:txBody>
       </p:sp>
-      <mc:AlternateContent xmlns:mc="http://schemas.openxmlformats.org/markup-compatibility/2006">
-        <mc:Choice xmlns:a14="http://schemas.microsoft.com/office/drawing/2010/main" Requires="a14">
+      <mc:AlternateContent xmlns:mc="http://schemas.openxmlformats.org/markup-compatibility/2006" xmlns:a14="http://schemas.microsoft.com/office/drawing/2010/main">
+        <mc:Choice Requires="a14">
           <p:sp>
             <p:nvSpPr>
               <p:cNvPr id="495" name="TextBox 494">
@@ -11442,7 +11887,7 @@
             </p:txBody>
           </p:sp>
         </mc:Choice>
-        <mc:Fallback>
+        <mc:Fallback xmlns="">
           <p:sp>
             <p:nvSpPr>
               <p:cNvPr id="495" name="TextBox 494">
@@ -11466,7 +11911,7 @@
                 <a:avLst/>
               </a:prstGeom>
               <a:blipFill>
-                <a:blip r:embed="rId35"/>
+                <a:blip r:embed="rId36"/>
                 <a:stretch>
                   <a:fillRect/>
                 </a:stretch>
@@ -11900,4 +12345,299 @@
     </a:ext>
   </a:extLst>
 </a:theme>
+</file>
+
+<file path=ppt/theme/theme2.xml><?xml version="1.0" encoding="utf-8"?>
+<a:theme xmlns:a="http://schemas.openxmlformats.org/drawingml/2006/main" name="Office Theme">
+  <a:themeElements>
+    <a:clrScheme name="Office">
+      <a:dk1>
+        <a:sysClr val="windowText" lastClr="000000"/>
+      </a:dk1>
+      <a:lt1>
+        <a:sysClr val="window" lastClr="FFFFFF"/>
+      </a:lt1>
+      <a:dk2>
+        <a:srgbClr val="44546A"/>
+      </a:dk2>
+      <a:lt2>
+        <a:srgbClr val="E7E6E6"/>
+      </a:lt2>
+      <a:accent1>
+        <a:srgbClr val="4472C4"/>
+      </a:accent1>
+      <a:accent2>
+        <a:srgbClr val="ED7D31"/>
+      </a:accent2>
+      <a:accent3>
+        <a:srgbClr val="A5A5A5"/>
+      </a:accent3>
+      <a:accent4>
+        <a:srgbClr val="FFC000"/>
+      </a:accent4>
+      <a:accent5>
+        <a:srgbClr val="5B9BD5"/>
+      </a:accent5>
+      <a:accent6>
+        <a:srgbClr val="70AD47"/>
+      </a:accent6>
+      <a:hlink>
+        <a:srgbClr val="0563C1"/>
+      </a:hlink>
+      <a:folHlink>
+        <a:srgbClr val="954F72"/>
+      </a:folHlink>
+    </a:clrScheme>
+    <a:fontScheme name="Office">
+      <a:majorFont>
+        <a:latin typeface="等线 Light" panose="020F0302020204030204"/>
+        <a:ea typeface=""/>
+        <a:cs typeface=""/>
+        <a:font script="Jpan" typeface="游ゴシック Light"/>
+        <a:font script="Hang" typeface="맑은 고딕"/>
+        <a:font script="Hans" typeface="等线 Light"/>
+        <a:font script="Hant" typeface="新細明體"/>
+        <a:font script="Arab" typeface="Times New Roman"/>
+        <a:font script="Hebr" typeface="Times New Roman"/>
+        <a:font script="Thai" typeface="Angsana New"/>
+        <a:font script="Ethi" typeface="Nyala"/>
+        <a:font script="Beng" typeface="Vrinda"/>
+        <a:font script="Gujr" typeface="Shruti"/>
+        <a:font script="Khmr" typeface="MoolBoran"/>
+        <a:font script="Knda" typeface="Tunga"/>
+        <a:font script="Guru" typeface="Raavi"/>
+        <a:font script="Cans" typeface="Euphemia"/>
+        <a:font script="Cher" typeface="Plantagenet Cherokee"/>
+        <a:font script="Yiii" typeface="Microsoft Yi Baiti"/>
+        <a:font script="Tibt" typeface="Microsoft Himalaya"/>
+        <a:font script="Thaa" typeface="MV Boli"/>
+        <a:font script="Deva" typeface="Mangal"/>
+        <a:font script="Telu" typeface="Gautami"/>
+        <a:font script="Taml" typeface="Latha"/>
+        <a:font script="Syrc" typeface="Estrangelo Edessa"/>
+        <a:font script="Orya" typeface="Kalinga"/>
+        <a:font script="Mlym" typeface="Kartika"/>
+        <a:font script="Laoo" typeface="DokChampa"/>
+        <a:font script="Sinh" typeface="Iskoola Pota"/>
+        <a:font script="Mong" typeface="Mongolian Baiti"/>
+        <a:font script="Viet" typeface="Times New Roman"/>
+        <a:font script="Uigh" typeface="Microsoft Uighur"/>
+        <a:font script="Geor" typeface="Sylfaen"/>
+        <a:font script="Armn" typeface="Arial"/>
+        <a:font script="Bugi" typeface="Leelawadee UI"/>
+        <a:font script="Bopo" typeface="Microsoft JhengHei"/>
+        <a:font script="Java" typeface="Javanese Text"/>
+        <a:font script="Lisu" typeface="Segoe UI"/>
+        <a:font script="Mymr" typeface="Myanmar Text"/>
+        <a:font script="Nkoo" typeface="Ebrima"/>
+        <a:font script="Olck" typeface="Nirmala UI"/>
+        <a:font script="Osma" typeface="Ebrima"/>
+        <a:font script="Phag" typeface="Phagspa"/>
+        <a:font script="Syrn" typeface="Estrangelo Edessa"/>
+        <a:font script="Syrj" typeface="Estrangelo Edessa"/>
+        <a:font script="Syre" typeface="Estrangelo Edessa"/>
+        <a:font script="Sora" typeface="Nirmala UI"/>
+        <a:font script="Tale" typeface="Microsoft Tai Le"/>
+        <a:font script="Talu" typeface="Microsoft New Tai Lue"/>
+        <a:font script="Tfng" typeface="Ebrima"/>
+      </a:majorFont>
+      <a:minorFont>
+        <a:latin typeface="等线" panose="020F0502020204030204"/>
+        <a:ea typeface=""/>
+        <a:cs typeface=""/>
+        <a:font script="Jpan" typeface="游ゴシック"/>
+        <a:font script="Hang" typeface="맑은 고딕"/>
+        <a:font script="Hans" typeface="等线"/>
+        <a:font script="Hant" typeface="新細明體"/>
+        <a:font script="Arab" typeface="Arial"/>
+        <a:font script="Hebr" typeface="Arial"/>
+        <a:font script="Thai" typeface="Cordia New"/>
+        <a:font script="Ethi" typeface="Nyala"/>
+        <a:font script="Beng" typeface="Vrinda"/>
+        <a:font script="Gujr" typeface="Shruti"/>
+        <a:font script="Khmr" typeface="DaunPenh"/>
+        <a:font script="Knda" typeface="Tunga"/>
+        <a:font script="Guru" typeface="Raavi"/>
+        <a:font script="Cans" typeface="Euphemia"/>
+        <a:font script="Cher" typeface="Plantagenet Cherokee"/>
+        <a:font script="Yiii" typeface="Microsoft Yi Baiti"/>
+        <a:font script="Tibt" typeface="Microsoft Himalaya"/>
+        <a:font script="Thaa" typeface="MV Boli"/>
+        <a:font script="Deva" typeface="Mangal"/>
+        <a:font script="Telu" typeface="Gautami"/>
+        <a:font script="Taml" typeface="Latha"/>
+        <a:font script="Syrc" typeface="Estrangelo Edessa"/>
+        <a:font script="Orya" typeface="Kalinga"/>
+        <a:font script="Mlym" typeface="Kartika"/>
+        <a:font script="Laoo" typeface="DokChampa"/>
+        <a:font script="Sinh" typeface="Iskoola Pota"/>
+        <a:font script="Mong" typeface="Mongolian Baiti"/>
+        <a:font script="Viet" typeface="Arial"/>
+        <a:font script="Uigh" typeface="Microsoft Uighur"/>
+        <a:font script="Geor" typeface="Sylfaen"/>
+        <a:font script="Armn" typeface="Arial"/>
+        <a:font script="Bugi" typeface="Leelawadee UI"/>
+        <a:font script="Bopo" typeface="Microsoft JhengHei"/>
+        <a:font script="Java" typeface="Javanese Text"/>
+        <a:font script="Lisu" typeface="Segoe UI"/>
+        <a:font script="Mymr" typeface="Myanmar Text"/>
+        <a:font script="Nkoo" typeface="Ebrima"/>
+        <a:font script="Olck" typeface="Nirmala UI"/>
+        <a:font script="Osma" typeface="Ebrima"/>
+        <a:font script="Phag" typeface="Phagspa"/>
+        <a:font script="Syrn" typeface="Estrangelo Edessa"/>
+        <a:font script="Syrj" typeface="Estrangelo Edessa"/>
+        <a:font script="Syre" typeface="Estrangelo Edessa"/>
+        <a:font script="Sora" typeface="Nirmala UI"/>
+        <a:font script="Tale" typeface="Microsoft Tai Le"/>
+        <a:font script="Talu" typeface="Microsoft New Tai Lue"/>
+        <a:font script="Tfng" typeface="Ebrima"/>
+      </a:minorFont>
+    </a:fontScheme>
+    <a:fmtScheme name="Office">
+      <a:fillStyleLst>
+        <a:solidFill>
+          <a:schemeClr val="phClr"/>
+        </a:solidFill>
+        <a:gradFill rotWithShape="1">
+          <a:gsLst>
+            <a:gs pos="0">
+              <a:schemeClr val="phClr">
+                <a:lumMod val="110000"/>
+                <a:satMod val="105000"/>
+                <a:tint val="67000"/>
+              </a:schemeClr>
+            </a:gs>
+            <a:gs pos="50000">
+              <a:schemeClr val="phClr">
+                <a:lumMod val="105000"/>
+                <a:satMod val="103000"/>
+                <a:tint val="73000"/>
+              </a:schemeClr>
+            </a:gs>
+            <a:gs pos="100000">
+              <a:schemeClr val="phClr">
+                <a:lumMod val="105000"/>
+                <a:satMod val="109000"/>
+                <a:tint val="81000"/>
+              </a:schemeClr>
+            </a:gs>
+          </a:gsLst>
+          <a:lin ang="5400000" scaled="0"/>
+        </a:gradFill>
+        <a:gradFill rotWithShape="1">
+          <a:gsLst>
+            <a:gs pos="0">
+              <a:schemeClr val="phClr">
+                <a:satMod val="103000"/>
+                <a:lumMod val="102000"/>
+                <a:tint val="94000"/>
+              </a:schemeClr>
+            </a:gs>
+            <a:gs pos="50000">
+              <a:schemeClr val="phClr">
+                <a:satMod val="110000"/>
+                <a:lumMod val="100000"/>
+                <a:shade val="100000"/>
+              </a:schemeClr>
+            </a:gs>
+            <a:gs pos="100000">
+              <a:schemeClr val="phClr">
+                <a:lumMod val="99000"/>
+                <a:satMod val="120000"/>
+                <a:shade val="78000"/>
+              </a:schemeClr>
+            </a:gs>
+          </a:gsLst>
+          <a:lin ang="5400000" scaled="0"/>
+        </a:gradFill>
+      </a:fillStyleLst>
+      <a:lnStyleLst>
+        <a:ln w="6350" cap="flat" cmpd="sng" algn="ctr">
+          <a:solidFill>
+            <a:schemeClr val="phClr"/>
+          </a:solidFill>
+          <a:prstDash val="solid"/>
+          <a:miter lim="800000"/>
+        </a:ln>
+        <a:ln w="12700" cap="flat" cmpd="sng" algn="ctr">
+          <a:solidFill>
+            <a:schemeClr val="phClr"/>
+          </a:solidFill>
+          <a:prstDash val="solid"/>
+          <a:miter lim="800000"/>
+        </a:ln>
+        <a:ln w="19050" cap="flat" cmpd="sng" algn="ctr">
+          <a:solidFill>
+            <a:schemeClr val="phClr"/>
+          </a:solidFill>
+          <a:prstDash val="solid"/>
+          <a:miter lim="800000"/>
+        </a:ln>
+      </a:lnStyleLst>
+      <a:effectStyleLst>
+        <a:effectStyle>
+          <a:effectLst/>
+        </a:effectStyle>
+        <a:effectStyle>
+          <a:effectLst/>
+        </a:effectStyle>
+        <a:effectStyle>
+          <a:effectLst>
+            <a:outerShdw blurRad="57150" dist="19050" dir="5400000" algn="ctr" rotWithShape="0">
+              <a:srgbClr val="000000">
+                <a:alpha val="63000"/>
+              </a:srgbClr>
+            </a:outerShdw>
+          </a:effectLst>
+        </a:effectStyle>
+      </a:effectStyleLst>
+      <a:bgFillStyleLst>
+        <a:solidFill>
+          <a:schemeClr val="phClr"/>
+        </a:solidFill>
+        <a:solidFill>
+          <a:schemeClr val="phClr">
+            <a:tint val="95000"/>
+            <a:satMod val="170000"/>
+          </a:schemeClr>
+        </a:solidFill>
+        <a:gradFill rotWithShape="1">
+          <a:gsLst>
+            <a:gs pos="0">
+              <a:schemeClr val="phClr">
+                <a:tint val="93000"/>
+                <a:satMod val="150000"/>
+                <a:shade val="98000"/>
+                <a:lumMod val="102000"/>
+              </a:schemeClr>
+            </a:gs>
+            <a:gs pos="50000">
+              <a:schemeClr val="phClr">
+                <a:tint val="98000"/>
+                <a:satMod val="130000"/>
+                <a:shade val="90000"/>
+                <a:lumMod val="103000"/>
+              </a:schemeClr>
+            </a:gs>
+            <a:gs pos="100000">
+              <a:schemeClr val="phClr">
+                <a:shade val="63000"/>
+                <a:satMod val="120000"/>
+              </a:schemeClr>
+            </a:gs>
+          </a:gsLst>
+          <a:lin ang="5400000" scaled="0"/>
+        </a:gradFill>
+      </a:bgFillStyleLst>
+    </a:fmtScheme>
+  </a:themeElements>
+  <a:objectDefaults/>
+  <a:extraClrSchemeLst/>
+  <a:extLst>
+    <a:ext uri="{05A4C25C-085E-4340-85A3-A5531E510DB2}">
+      <thm15:themeFamily xmlns:thm15="http://schemas.microsoft.com/office/thememl/2012/main" name="Office Theme" id="{62F939B6-93AF-4DB8-9C6B-D6C7DFDC589F}" vid="{4A3C46E8-61CC-4603-A589-7422A47A8E4A}"/>
+    </a:ext>
+  </a:extLst>
+</a:theme>
 </file>
</xml_diff>